<commit_message>
Start description of the specs
</commit_message>
<xml_diff>
--- a/doc/pitch/Presentation-Conception.pptx
+++ b/doc/pitch/Presentation-Conception.pptx
@@ -5,7 +5,7 @@
     <p:sldMasterId id="2147483648" r:id="rId1"/>
   </p:sldMasterIdLst>
   <p:notesMasterIdLst>
-    <p:notesMasterId r:id="rId21"/>
+    <p:notesMasterId r:id="rId29"/>
   </p:notesMasterIdLst>
   <p:sldIdLst>
     <p:sldId id="256" r:id="rId2"/>
@@ -27,6 +27,14 @@
     <p:sldId id="282" r:id="rId18"/>
     <p:sldId id="283" r:id="rId19"/>
     <p:sldId id="284" r:id="rId20"/>
+    <p:sldId id="286" r:id="rId21"/>
+    <p:sldId id="287" r:id="rId22"/>
+    <p:sldId id="289" r:id="rId23"/>
+    <p:sldId id="288" r:id="rId24"/>
+    <p:sldId id="285" r:id="rId25"/>
+    <p:sldId id="290" r:id="rId26"/>
+    <p:sldId id="291" r:id="rId27"/>
+    <p:sldId id="292" r:id="rId28"/>
   </p:sldIdLst>
   <p:sldSz cx="12192000" cy="6858000"/>
   <p:notesSz cx="6858000" cy="9144000"/>
@@ -215,7 +223,7 @@
           <a:p>
             <a:fld id="{F6BEB917-1F9D-42E2-AB2F-DA9E66BE3035}" type="datetimeFigureOut">
               <a:rPr lang="fr-FR" smtClean="0"/>
-              <a:t>19/01/2021</a:t>
+              <a:t>01/02/2021</a:t>
             </a:fld>
             <a:endParaRPr lang="fr-FR"/>
           </a:p>
@@ -1402,6 +1410,98 @@
 </p:notes>
 </file>
 
+<file path=ppt/notesSlides/notesSlide19.xml><?xml version="1.0" encoding="utf-8"?>
+<p:notes xmlns:a="http://schemas.openxmlformats.org/drawingml/2006/main" xmlns:r="http://schemas.openxmlformats.org/officeDocument/2006/relationships" xmlns:p="http://schemas.openxmlformats.org/presentationml/2006/main">
+  <p:cSld>
+    <p:spTree>
+      <p:nvGrpSpPr>
+        <p:cNvPr id="1" name=""/>
+        <p:cNvGrpSpPr/>
+        <p:nvPr/>
+      </p:nvGrpSpPr>
+      <p:grpSpPr>
+        <a:xfrm>
+          <a:off x="0" y="0"/>
+          <a:ext cx="0" cy="0"/>
+          <a:chOff x="0" y="0"/>
+          <a:chExt cx="0" cy="0"/>
+        </a:xfrm>
+      </p:grpSpPr>
+      <p:sp>
+        <p:nvSpPr>
+          <p:cNvPr id="2" name="Espace réservé de l'image des diapositives 1"/>
+          <p:cNvSpPr>
+            <a:spLocks noGrp="1" noRot="1" noChangeAspect="1"/>
+          </p:cNvSpPr>
+          <p:nvPr>
+            <p:ph type="sldImg"/>
+          </p:nvPr>
+        </p:nvSpPr>
+        <p:spPr>
+          <a:xfrm>
+            <a:off x="381000" y="685800"/>
+            <a:ext cx="6096000" cy="3429000"/>
+          </a:xfrm>
+        </p:spPr>
+      </p:sp>
+      <p:sp>
+        <p:nvSpPr>
+          <p:cNvPr id="3" name="Espace réservé des commentaires 2"/>
+          <p:cNvSpPr>
+            <a:spLocks noGrp="1"/>
+          </p:cNvSpPr>
+          <p:nvPr>
+            <p:ph type="body" idx="1"/>
+          </p:nvPr>
+        </p:nvSpPr>
+        <p:spPr/>
+        <p:txBody>
+          <a:bodyPr/>
+          <a:lstStyle/>
+          <a:p>
+            <a:r>
+              <a:rPr lang="fr-FR" baseline="0" dirty="0"/>
+              <a:t>Thomas</a:t>
+            </a:r>
+          </a:p>
+        </p:txBody>
+      </p:sp>
+      <p:sp>
+        <p:nvSpPr>
+          <p:cNvPr id="4" name="Espace réservé du numéro de diapositive 3"/>
+          <p:cNvSpPr>
+            <a:spLocks noGrp="1"/>
+          </p:cNvSpPr>
+          <p:nvPr>
+            <p:ph type="sldNum" sz="quarter" idx="10"/>
+          </p:nvPr>
+        </p:nvSpPr>
+        <p:spPr/>
+        <p:txBody>
+          <a:bodyPr/>
+          <a:lstStyle/>
+          <a:p>
+            <a:fld id="{A8A338DB-4614-4EB6-8F24-D592A5BC5FE8}" type="slidenum">
+              <a:rPr lang="fr-FR" smtClean="0"/>
+              <a:t>20</a:t>
+            </a:fld>
+            <a:endParaRPr lang="fr-FR"/>
+          </a:p>
+        </p:txBody>
+      </p:sp>
+    </p:spTree>
+    <p:extLst>
+      <p:ext uri="{BB962C8B-B14F-4D97-AF65-F5344CB8AC3E}">
+        <p14:creationId xmlns:p14="http://schemas.microsoft.com/office/powerpoint/2010/main" val="4272557772"/>
+      </p:ext>
+    </p:extLst>
+  </p:cSld>
+  <p:clrMapOvr>
+    <a:masterClrMapping/>
+  </p:clrMapOvr>
+</p:notes>
+</file>
+
 <file path=ppt/notesSlides/notesSlide2.xml><?xml version="1.0" encoding="utf-8"?>
 <p:notes xmlns:a="http://schemas.openxmlformats.org/drawingml/2006/main" xmlns:r="http://schemas.openxmlformats.org/officeDocument/2006/relationships" xmlns:p="http://schemas.openxmlformats.org/presentationml/2006/main">
   <p:cSld>
@@ -1485,6 +1585,650 @@
     <p:extLst>
       <p:ext uri="{BB962C8B-B14F-4D97-AF65-F5344CB8AC3E}">
         <p14:creationId xmlns:p14="http://schemas.microsoft.com/office/powerpoint/2010/main" val="2301404298"/>
+      </p:ext>
+    </p:extLst>
+  </p:cSld>
+  <p:clrMapOvr>
+    <a:masterClrMapping/>
+  </p:clrMapOvr>
+</p:notes>
+</file>
+
+<file path=ppt/notesSlides/notesSlide20.xml><?xml version="1.0" encoding="utf-8"?>
+<p:notes xmlns:a="http://schemas.openxmlformats.org/drawingml/2006/main" xmlns:r="http://schemas.openxmlformats.org/officeDocument/2006/relationships" xmlns:p="http://schemas.openxmlformats.org/presentationml/2006/main">
+  <p:cSld>
+    <p:spTree>
+      <p:nvGrpSpPr>
+        <p:cNvPr id="1" name=""/>
+        <p:cNvGrpSpPr/>
+        <p:nvPr/>
+      </p:nvGrpSpPr>
+      <p:grpSpPr>
+        <a:xfrm>
+          <a:off x="0" y="0"/>
+          <a:ext cx="0" cy="0"/>
+          <a:chOff x="0" y="0"/>
+          <a:chExt cx="0" cy="0"/>
+        </a:xfrm>
+      </p:grpSpPr>
+      <p:sp>
+        <p:nvSpPr>
+          <p:cNvPr id="2" name="Espace réservé de l'image des diapositives 1"/>
+          <p:cNvSpPr>
+            <a:spLocks noGrp="1" noRot="1" noChangeAspect="1"/>
+          </p:cNvSpPr>
+          <p:nvPr>
+            <p:ph type="sldImg"/>
+          </p:nvPr>
+        </p:nvSpPr>
+        <p:spPr>
+          <a:xfrm>
+            <a:off x="381000" y="685800"/>
+            <a:ext cx="6096000" cy="3429000"/>
+          </a:xfrm>
+        </p:spPr>
+      </p:sp>
+      <p:sp>
+        <p:nvSpPr>
+          <p:cNvPr id="3" name="Espace réservé des commentaires 2"/>
+          <p:cNvSpPr>
+            <a:spLocks noGrp="1"/>
+          </p:cNvSpPr>
+          <p:nvPr>
+            <p:ph type="body" idx="1"/>
+          </p:nvPr>
+        </p:nvSpPr>
+        <p:spPr/>
+        <p:txBody>
+          <a:bodyPr/>
+          <a:lstStyle/>
+          <a:p>
+            <a:r>
+              <a:rPr lang="fr-FR" baseline="0" dirty="0"/>
+              <a:t>Thomas</a:t>
+            </a:r>
+          </a:p>
+        </p:txBody>
+      </p:sp>
+      <p:sp>
+        <p:nvSpPr>
+          <p:cNvPr id="4" name="Espace réservé du numéro de diapositive 3"/>
+          <p:cNvSpPr>
+            <a:spLocks noGrp="1"/>
+          </p:cNvSpPr>
+          <p:nvPr>
+            <p:ph type="sldNum" sz="quarter" idx="10"/>
+          </p:nvPr>
+        </p:nvSpPr>
+        <p:spPr/>
+        <p:txBody>
+          <a:bodyPr/>
+          <a:lstStyle/>
+          <a:p>
+            <a:fld id="{A8A338DB-4614-4EB6-8F24-D592A5BC5FE8}" type="slidenum">
+              <a:rPr lang="fr-FR" smtClean="0"/>
+              <a:t>21</a:t>
+            </a:fld>
+            <a:endParaRPr lang="fr-FR"/>
+          </a:p>
+        </p:txBody>
+      </p:sp>
+    </p:spTree>
+    <p:extLst>
+      <p:ext uri="{BB962C8B-B14F-4D97-AF65-F5344CB8AC3E}">
+        <p14:creationId xmlns:p14="http://schemas.microsoft.com/office/powerpoint/2010/main" val="3453485690"/>
+      </p:ext>
+    </p:extLst>
+  </p:cSld>
+  <p:clrMapOvr>
+    <a:masterClrMapping/>
+  </p:clrMapOvr>
+</p:notes>
+</file>
+
+<file path=ppt/notesSlides/notesSlide21.xml><?xml version="1.0" encoding="utf-8"?>
+<p:notes xmlns:a="http://schemas.openxmlformats.org/drawingml/2006/main" xmlns:r="http://schemas.openxmlformats.org/officeDocument/2006/relationships" xmlns:p="http://schemas.openxmlformats.org/presentationml/2006/main">
+  <p:cSld>
+    <p:spTree>
+      <p:nvGrpSpPr>
+        <p:cNvPr id="1" name=""/>
+        <p:cNvGrpSpPr/>
+        <p:nvPr/>
+      </p:nvGrpSpPr>
+      <p:grpSpPr>
+        <a:xfrm>
+          <a:off x="0" y="0"/>
+          <a:ext cx="0" cy="0"/>
+          <a:chOff x="0" y="0"/>
+          <a:chExt cx="0" cy="0"/>
+        </a:xfrm>
+      </p:grpSpPr>
+      <p:sp>
+        <p:nvSpPr>
+          <p:cNvPr id="2" name="Espace réservé de l'image des diapositives 1"/>
+          <p:cNvSpPr>
+            <a:spLocks noGrp="1" noRot="1" noChangeAspect="1"/>
+          </p:cNvSpPr>
+          <p:nvPr>
+            <p:ph type="sldImg"/>
+          </p:nvPr>
+        </p:nvSpPr>
+        <p:spPr>
+          <a:xfrm>
+            <a:off x="381000" y="685800"/>
+            <a:ext cx="6096000" cy="3429000"/>
+          </a:xfrm>
+        </p:spPr>
+      </p:sp>
+      <p:sp>
+        <p:nvSpPr>
+          <p:cNvPr id="3" name="Espace réservé des commentaires 2"/>
+          <p:cNvSpPr>
+            <a:spLocks noGrp="1"/>
+          </p:cNvSpPr>
+          <p:nvPr>
+            <p:ph type="body" idx="1"/>
+          </p:nvPr>
+        </p:nvSpPr>
+        <p:spPr/>
+        <p:txBody>
+          <a:bodyPr/>
+          <a:lstStyle/>
+          <a:p>
+            <a:r>
+              <a:rPr lang="fr-FR" baseline="0" dirty="0"/>
+              <a:t>Thomas</a:t>
+            </a:r>
+          </a:p>
+        </p:txBody>
+      </p:sp>
+      <p:sp>
+        <p:nvSpPr>
+          <p:cNvPr id="4" name="Espace réservé du numéro de diapositive 3"/>
+          <p:cNvSpPr>
+            <a:spLocks noGrp="1"/>
+          </p:cNvSpPr>
+          <p:nvPr>
+            <p:ph type="sldNum" sz="quarter" idx="10"/>
+          </p:nvPr>
+        </p:nvSpPr>
+        <p:spPr/>
+        <p:txBody>
+          <a:bodyPr/>
+          <a:lstStyle/>
+          <a:p>
+            <a:fld id="{A8A338DB-4614-4EB6-8F24-D592A5BC5FE8}" type="slidenum">
+              <a:rPr lang="fr-FR" smtClean="0"/>
+              <a:t>22</a:t>
+            </a:fld>
+            <a:endParaRPr lang="fr-FR"/>
+          </a:p>
+        </p:txBody>
+      </p:sp>
+    </p:spTree>
+    <p:extLst>
+      <p:ext uri="{BB962C8B-B14F-4D97-AF65-F5344CB8AC3E}">
+        <p14:creationId xmlns:p14="http://schemas.microsoft.com/office/powerpoint/2010/main" val="2647322987"/>
+      </p:ext>
+    </p:extLst>
+  </p:cSld>
+  <p:clrMapOvr>
+    <a:masterClrMapping/>
+  </p:clrMapOvr>
+</p:notes>
+</file>
+
+<file path=ppt/notesSlides/notesSlide22.xml><?xml version="1.0" encoding="utf-8"?>
+<p:notes xmlns:a="http://schemas.openxmlformats.org/drawingml/2006/main" xmlns:r="http://schemas.openxmlformats.org/officeDocument/2006/relationships" xmlns:p="http://schemas.openxmlformats.org/presentationml/2006/main">
+  <p:cSld>
+    <p:spTree>
+      <p:nvGrpSpPr>
+        <p:cNvPr id="1" name=""/>
+        <p:cNvGrpSpPr/>
+        <p:nvPr/>
+      </p:nvGrpSpPr>
+      <p:grpSpPr>
+        <a:xfrm>
+          <a:off x="0" y="0"/>
+          <a:ext cx="0" cy="0"/>
+          <a:chOff x="0" y="0"/>
+          <a:chExt cx="0" cy="0"/>
+        </a:xfrm>
+      </p:grpSpPr>
+      <p:sp>
+        <p:nvSpPr>
+          <p:cNvPr id="2" name="Espace réservé de l'image des diapositives 1"/>
+          <p:cNvSpPr>
+            <a:spLocks noGrp="1" noRot="1" noChangeAspect="1"/>
+          </p:cNvSpPr>
+          <p:nvPr>
+            <p:ph type="sldImg"/>
+          </p:nvPr>
+        </p:nvSpPr>
+        <p:spPr>
+          <a:xfrm>
+            <a:off x="381000" y="685800"/>
+            <a:ext cx="6096000" cy="3429000"/>
+          </a:xfrm>
+        </p:spPr>
+      </p:sp>
+      <p:sp>
+        <p:nvSpPr>
+          <p:cNvPr id="3" name="Espace réservé des commentaires 2"/>
+          <p:cNvSpPr>
+            <a:spLocks noGrp="1"/>
+          </p:cNvSpPr>
+          <p:nvPr>
+            <p:ph type="body" idx="1"/>
+          </p:nvPr>
+        </p:nvSpPr>
+        <p:spPr/>
+        <p:txBody>
+          <a:bodyPr/>
+          <a:lstStyle/>
+          <a:p>
+            <a:r>
+              <a:rPr lang="fr-FR" baseline="0" dirty="0"/>
+              <a:t>Thomas</a:t>
+            </a:r>
+          </a:p>
+        </p:txBody>
+      </p:sp>
+      <p:sp>
+        <p:nvSpPr>
+          <p:cNvPr id="4" name="Espace réservé du numéro de diapositive 3"/>
+          <p:cNvSpPr>
+            <a:spLocks noGrp="1"/>
+          </p:cNvSpPr>
+          <p:nvPr>
+            <p:ph type="sldNum" sz="quarter" idx="10"/>
+          </p:nvPr>
+        </p:nvSpPr>
+        <p:spPr/>
+        <p:txBody>
+          <a:bodyPr/>
+          <a:lstStyle/>
+          <a:p>
+            <a:fld id="{A8A338DB-4614-4EB6-8F24-D592A5BC5FE8}" type="slidenum">
+              <a:rPr lang="fr-FR" smtClean="0"/>
+              <a:t>23</a:t>
+            </a:fld>
+            <a:endParaRPr lang="fr-FR"/>
+          </a:p>
+        </p:txBody>
+      </p:sp>
+    </p:spTree>
+    <p:extLst>
+      <p:ext uri="{BB962C8B-B14F-4D97-AF65-F5344CB8AC3E}">
+        <p14:creationId xmlns:p14="http://schemas.microsoft.com/office/powerpoint/2010/main" val="3408378122"/>
+      </p:ext>
+    </p:extLst>
+  </p:cSld>
+  <p:clrMapOvr>
+    <a:masterClrMapping/>
+  </p:clrMapOvr>
+</p:notes>
+</file>
+
+<file path=ppt/notesSlides/notesSlide23.xml><?xml version="1.0" encoding="utf-8"?>
+<p:notes xmlns:a="http://schemas.openxmlformats.org/drawingml/2006/main" xmlns:r="http://schemas.openxmlformats.org/officeDocument/2006/relationships" xmlns:p="http://schemas.openxmlformats.org/presentationml/2006/main">
+  <p:cSld>
+    <p:spTree>
+      <p:nvGrpSpPr>
+        <p:cNvPr id="1" name=""/>
+        <p:cNvGrpSpPr/>
+        <p:nvPr/>
+      </p:nvGrpSpPr>
+      <p:grpSpPr>
+        <a:xfrm>
+          <a:off x="0" y="0"/>
+          <a:ext cx="0" cy="0"/>
+          <a:chOff x="0" y="0"/>
+          <a:chExt cx="0" cy="0"/>
+        </a:xfrm>
+      </p:grpSpPr>
+      <p:sp>
+        <p:nvSpPr>
+          <p:cNvPr id="2" name="Espace réservé de l'image des diapositives 1"/>
+          <p:cNvSpPr>
+            <a:spLocks noGrp="1" noRot="1" noChangeAspect="1"/>
+          </p:cNvSpPr>
+          <p:nvPr>
+            <p:ph type="sldImg"/>
+          </p:nvPr>
+        </p:nvSpPr>
+        <p:spPr>
+          <a:xfrm>
+            <a:off x="381000" y="685800"/>
+            <a:ext cx="6096000" cy="3429000"/>
+          </a:xfrm>
+        </p:spPr>
+      </p:sp>
+      <p:sp>
+        <p:nvSpPr>
+          <p:cNvPr id="3" name="Espace réservé des commentaires 2"/>
+          <p:cNvSpPr>
+            <a:spLocks noGrp="1"/>
+          </p:cNvSpPr>
+          <p:nvPr>
+            <p:ph type="body" idx="1"/>
+          </p:nvPr>
+        </p:nvSpPr>
+        <p:spPr/>
+        <p:txBody>
+          <a:bodyPr/>
+          <a:lstStyle/>
+          <a:p>
+            <a:r>
+              <a:rPr lang="fr-FR" baseline="0" dirty="0"/>
+              <a:t>Thomas</a:t>
+            </a:r>
+          </a:p>
+        </p:txBody>
+      </p:sp>
+      <p:sp>
+        <p:nvSpPr>
+          <p:cNvPr id="4" name="Espace réservé du numéro de diapositive 3"/>
+          <p:cNvSpPr>
+            <a:spLocks noGrp="1"/>
+          </p:cNvSpPr>
+          <p:nvPr>
+            <p:ph type="sldNum" sz="quarter" idx="10"/>
+          </p:nvPr>
+        </p:nvSpPr>
+        <p:spPr/>
+        <p:txBody>
+          <a:bodyPr/>
+          <a:lstStyle/>
+          <a:p>
+            <a:fld id="{A8A338DB-4614-4EB6-8F24-D592A5BC5FE8}" type="slidenum">
+              <a:rPr lang="fr-FR" smtClean="0"/>
+              <a:t>24</a:t>
+            </a:fld>
+            <a:endParaRPr lang="fr-FR"/>
+          </a:p>
+        </p:txBody>
+      </p:sp>
+    </p:spTree>
+    <p:extLst>
+      <p:ext uri="{BB962C8B-B14F-4D97-AF65-F5344CB8AC3E}">
+        <p14:creationId xmlns:p14="http://schemas.microsoft.com/office/powerpoint/2010/main" val="724953128"/>
+      </p:ext>
+    </p:extLst>
+  </p:cSld>
+  <p:clrMapOvr>
+    <a:masterClrMapping/>
+  </p:clrMapOvr>
+</p:notes>
+</file>
+
+<file path=ppt/notesSlides/notesSlide24.xml><?xml version="1.0" encoding="utf-8"?>
+<p:notes xmlns:a="http://schemas.openxmlformats.org/drawingml/2006/main" xmlns:r="http://schemas.openxmlformats.org/officeDocument/2006/relationships" xmlns:p="http://schemas.openxmlformats.org/presentationml/2006/main">
+  <p:cSld>
+    <p:spTree>
+      <p:nvGrpSpPr>
+        <p:cNvPr id="1" name=""/>
+        <p:cNvGrpSpPr/>
+        <p:nvPr/>
+      </p:nvGrpSpPr>
+      <p:grpSpPr>
+        <a:xfrm>
+          <a:off x="0" y="0"/>
+          <a:ext cx="0" cy="0"/>
+          <a:chOff x="0" y="0"/>
+          <a:chExt cx="0" cy="0"/>
+        </a:xfrm>
+      </p:grpSpPr>
+      <p:sp>
+        <p:nvSpPr>
+          <p:cNvPr id="2" name="Espace réservé de l'image des diapositives 1"/>
+          <p:cNvSpPr>
+            <a:spLocks noGrp="1" noRot="1" noChangeAspect="1"/>
+          </p:cNvSpPr>
+          <p:nvPr>
+            <p:ph type="sldImg"/>
+          </p:nvPr>
+        </p:nvSpPr>
+        <p:spPr>
+          <a:xfrm>
+            <a:off x="381000" y="685800"/>
+            <a:ext cx="6096000" cy="3429000"/>
+          </a:xfrm>
+        </p:spPr>
+      </p:sp>
+      <p:sp>
+        <p:nvSpPr>
+          <p:cNvPr id="3" name="Espace réservé des commentaires 2"/>
+          <p:cNvSpPr>
+            <a:spLocks noGrp="1"/>
+          </p:cNvSpPr>
+          <p:nvPr>
+            <p:ph type="body" idx="1"/>
+          </p:nvPr>
+        </p:nvSpPr>
+        <p:spPr/>
+        <p:txBody>
+          <a:bodyPr/>
+          <a:lstStyle/>
+          <a:p>
+            <a:r>
+              <a:rPr lang="fr-FR" baseline="0" dirty="0"/>
+              <a:t>Thomas</a:t>
+            </a:r>
+          </a:p>
+        </p:txBody>
+      </p:sp>
+      <p:sp>
+        <p:nvSpPr>
+          <p:cNvPr id="4" name="Espace réservé du numéro de diapositive 3"/>
+          <p:cNvSpPr>
+            <a:spLocks noGrp="1"/>
+          </p:cNvSpPr>
+          <p:nvPr>
+            <p:ph type="sldNum" sz="quarter" idx="10"/>
+          </p:nvPr>
+        </p:nvSpPr>
+        <p:spPr/>
+        <p:txBody>
+          <a:bodyPr/>
+          <a:lstStyle/>
+          <a:p>
+            <a:fld id="{A8A338DB-4614-4EB6-8F24-D592A5BC5FE8}" type="slidenum">
+              <a:rPr lang="fr-FR" smtClean="0"/>
+              <a:t>25</a:t>
+            </a:fld>
+            <a:endParaRPr lang="fr-FR"/>
+          </a:p>
+        </p:txBody>
+      </p:sp>
+    </p:spTree>
+    <p:extLst>
+      <p:ext uri="{BB962C8B-B14F-4D97-AF65-F5344CB8AC3E}">
+        <p14:creationId xmlns:p14="http://schemas.microsoft.com/office/powerpoint/2010/main" val="2809198432"/>
+      </p:ext>
+    </p:extLst>
+  </p:cSld>
+  <p:clrMapOvr>
+    <a:masterClrMapping/>
+  </p:clrMapOvr>
+</p:notes>
+</file>
+
+<file path=ppt/notesSlides/notesSlide25.xml><?xml version="1.0" encoding="utf-8"?>
+<p:notes xmlns:a="http://schemas.openxmlformats.org/drawingml/2006/main" xmlns:r="http://schemas.openxmlformats.org/officeDocument/2006/relationships" xmlns:p="http://schemas.openxmlformats.org/presentationml/2006/main">
+  <p:cSld>
+    <p:spTree>
+      <p:nvGrpSpPr>
+        <p:cNvPr id="1" name=""/>
+        <p:cNvGrpSpPr/>
+        <p:nvPr/>
+      </p:nvGrpSpPr>
+      <p:grpSpPr>
+        <a:xfrm>
+          <a:off x="0" y="0"/>
+          <a:ext cx="0" cy="0"/>
+          <a:chOff x="0" y="0"/>
+          <a:chExt cx="0" cy="0"/>
+        </a:xfrm>
+      </p:grpSpPr>
+      <p:sp>
+        <p:nvSpPr>
+          <p:cNvPr id="2" name="Espace réservé de l'image des diapositives 1"/>
+          <p:cNvSpPr>
+            <a:spLocks noGrp="1" noRot="1" noChangeAspect="1"/>
+          </p:cNvSpPr>
+          <p:nvPr>
+            <p:ph type="sldImg"/>
+          </p:nvPr>
+        </p:nvSpPr>
+        <p:spPr>
+          <a:xfrm>
+            <a:off x="381000" y="685800"/>
+            <a:ext cx="6096000" cy="3429000"/>
+          </a:xfrm>
+        </p:spPr>
+      </p:sp>
+      <p:sp>
+        <p:nvSpPr>
+          <p:cNvPr id="3" name="Espace réservé des commentaires 2"/>
+          <p:cNvSpPr>
+            <a:spLocks noGrp="1"/>
+          </p:cNvSpPr>
+          <p:nvPr>
+            <p:ph type="body" idx="1"/>
+          </p:nvPr>
+        </p:nvSpPr>
+        <p:spPr/>
+        <p:txBody>
+          <a:bodyPr/>
+          <a:lstStyle/>
+          <a:p>
+            <a:r>
+              <a:rPr lang="fr-FR" baseline="0" dirty="0"/>
+              <a:t>Thomas</a:t>
+            </a:r>
+          </a:p>
+        </p:txBody>
+      </p:sp>
+      <p:sp>
+        <p:nvSpPr>
+          <p:cNvPr id="4" name="Espace réservé du numéro de diapositive 3"/>
+          <p:cNvSpPr>
+            <a:spLocks noGrp="1"/>
+          </p:cNvSpPr>
+          <p:nvPr>
+            <p:ph type="sldNum" sz="quarter" idx="10"/>
+          </p:nvPr>
+        </p:nvSpPr>
+        <p:spPr/>
+        <p:txBody>
+          <a:bodyPr/>
+          <a:lstStyle/>
+          <a:p>
+            <a:fld id="{A8A338DB-4614-4EB6-8F24-D592A5BC5FE8}" type="slidenum">
+              <a:rPr lang="fr-FR" smtClean="0"/>
+              <a:t>26</a:t>
+            </a:fld>
+            <a:endParaRPr lang="fr-FR"/>
+          </a:p>
+        </p:txBody>
+      </p:sp>
+    </p:spTree>
+    <p:extLst>
+      <p:ext uri="{BB962C8B-B14F-4D97-AF65-F5344CB8AC3E}">
+        <p14:creationId xmlns:p14="http://schemas.microsoft.com/office/powerpoint/2010/main" val="1117360745"/>
+      </p:ext>
+    </p:extLst>
+  </p:cSld>
+  <p:clrMapOvr>
+    <a:masterClrMapping/>
+  </p:clrMapOvr>
+</p:notes>
+</file>
+
+<file path=ppt/notesSlides/notesSlide26.xml><?xml version="1.0" encoding="utf-8"?>
+<p:notes xmlns:a="http://schemas.openxmlformats.org/drawingml/2006/main" xmlns:r="http://schemas.openxmlformats.org/officeDocument/2006/relationships" xmlns:p="http://schemas.openxmlformats.org/presentationml/2006/main">
+  <p:cSld>
+    <p:spTree>
+      <p:nvGrpSpPr>
+        <p:cNvPr id="1" name=""/>
+        <p:cNvGrpSpPr/>
+        <p:nvPr/>
+      </p:nvGrpSpPr>
+      <p:grpSpPr>
+        <a:xfrm>
+          <a:off x="0" y="0"/>
+          <a:ext cx="0" cy="0"/>
+          <a:chOff x="0" y="0"/>
+          <a:chExt cx="0" cy="0"/>
+        </a:xfrm>
+      </p:grpSpPr>
+      <p:sp>
+        <p:nvSpPr>
+          <p:cNvPr id="2" name="Espace réservé de l'image des diapositives 1"/>
+          <p:cNvSpPr>
+            <a:spLocks noGrp="1" noRot="1" noChangeAspect="1"/>
+          </p:cNvSpPr>
+          <p:nvPr>
+            <p:ph type="sldImg"/>
+          </p:nvPr>
+        </p:nvSpPr>
+        <p:spPr>
+          <a:xfrm>
+            <a:off x="381000" y="685800"/>
+            <a:ext cx="6096000" cy="3429000"/>
+          </a:xfrm>
+        </p:spPr>
+      </p:sp>
+      <p:sp>
+        <p:nvSpPr>
+          <p:cNvPr id="3" name="Espace réservé des commentaires 2"/>
+          <p:cNvSpPr>
+            <a:spLocks noGrp="1"/>
+          </p:cNvSpPr>
+          <p:nvPr>
+            <p:ph type="body" idx="1"/>
+          </p:nvPr>
+        </p:nvSpPr>
+        <p:spPr/>
+        <p:txBody>
+          <a:bodyPr/>
+          <a:lstStyle/>
+          <a:p>
+            <a:r>
+              <a:rPr lang="fr-FR" baseline="0" dirty="0"/>
+              <a:t>Thomas</a:t>
+            </a:r>
+          </a:p>
+        </p:txBody>
+      </p:sp>
+      <p:sp>
+        <p:nvSpPr>
+          <p:cNvPr id="4" name="Espace réservé du numéro de diapositive 3"/>
+          <p:cNvSpPr>
+            <a:spLocks noGrp="1"/>
+          </p:cNvSpPr>
+          <p:nvPr>
+            <p:ph type="sldNum" sz="quarter" idx="10"/>
+          </p:nvPr>
+        </p:nvSpPr>
+        <p:spPr/>
+        <p:txBody>
+          <a:bodyPr/>
+          <a:lstStyle/>
+          <a:p>
+            <a:fld id="{A8A338DB-4614-4EB6-8F24-D592A5BC5FE8}" type="slidenum">
+              <a:rPr lang="fr-FR" smtClean="0"/>
+              <a:t>27</a:t>
+            </a:fld>
+            <a:endParaRPr lang="fr-FR"/>
+          </a:p>
+        </p:txBody>
+      </p:sp>
+    </p:spTree>
+    <p:extLst>
+      <p:ext uri="{BB962C8B-B14F-4D97-AF65-F5344CB8AC3E}">
+        <p14:creationId xmlns:p14="http://schemas.microsoft.com/office/powerpoint/2010/main" val="3143041290"/>
       </p:ext>
     </p:extLst>
   </p:cSld>
@@ -2285,7 +3029,7 @@
           <a:p>
             <a:fld id="{8E456E47-09BE-4F0B-A607-76863A385685}" type="datetime1">
               <a:rPr lang="fr-FR" smtClean="0"/>
-              <a:t>19/01/2021</a:t>
+              <a:t>01/02/2021</a:t>
             </a:fld>
             <a:endParaRPr lang="fr-FR"/>
           </a:p>
@@ -2486,7 +3230,7 @@
           <a:p>
             <a:fld id="{656C7797-979F-426F-8113-4B36935FE22D}" type="datetime1">
               <a:rPr lang="fr-FR" smtClean="0"/>
-              <a:t>19/01/2021</a:t>
+              <a:t>01/02/2021</a:t>
             </a:fld>
             <a:endParaRPr lang="fr-FR"/>
           </a:p>
@@ -2697,7 +3441,7 @@
           <a:p>
             <a:fld id="{97524F34-8B98-494A-8857-F499183F830E}" type="datetime1">
               <a:rPr lang="fr-FR" smtClean="0"/>
-              <a:t>19/01/2021</a:t>
+              <a:t>01/02/2021</a:t>
             </a:fld>
             <a:endParaRPr lang="fr-FR"/>
           </a:p>
@@ -2898,7 +3642,7 @@
           <a:p>
             <a:fld id="{AC5DC7DD-1E67-44E3-9781-44D1A37D3BFE}" type="datetime1">
               <a:rPr lang="fr-FR" smtClean="0"/>
-              <a:t>19/01/2021</a:t>
+              <a:t>01/02/2021</a:t>
             </a:fld>
             <a:endParaRPr lang="fr-FR"/>
           </a:p>
@@ -3176,7 +3920,7 @@
           <a:p>
             <a:fld id="{022C904C-DB92-46D5-B9D3-C3CFC8D3C3AD}" type="datetime1">
               <a:rPr lang="fr-FR" smtClean="0"/>
-              <a:t>19/01/2021</a:t>
+              <a:t>01/02/2021</a:t>
             </a:fld>
             <a:endParaRPr lang="fr-FR"/>
           </a:p>
@@ -3444,7 +4188,7 @@
           <a:p>
             <a:fld id="{33D02AF7-01EC-422B-8B8F-583C341765CD}" type="datetime1">
               <a:rPr lang="fr-FR" smtClean="0"/>
-              <a:t>19/01/2021</a:t>
+              <a:t>01/02/2021</a:t>
             </a:fld>
             <a:endParaRPr lang="fr-FR"/>
           </a:p>
@@ -3859,7 +4603,7 @@
           <a:p>
             <a:fld id="{02C7BDD6-B409-452D-A54D-CE517282C24E}" type="datetime1">
               <a:rPr lang="fr-FR" smtClean="0"/>
-              <a:t>19/01/2021</a:t>
+              <a:t>01/02/2021</a:t>
             </a:fld>
             <a:endParaRPr lang="fr-FR"/>
           </a:p>
@@ -4003,7 +4747,7 @@
           <a:p>
             <a:fld id="{4DF29CC9-A9DE-462E-A362-CF7B2B446041}" type="datetime1">
               <a:rPr lang="fr-FR" smtClean="0"/>
-              <a:t>19/01/2021</a:t>
+              <a:t>01/02/2021</a:t>
             </a:fld>
             <a:endParaRPr lang="fr-FR"/>
           </a:p>
@@ -4119,7 +4863,7 @@
           <a:p>
             <a:fld id="{2578ECAF-7B2C-442E-8E5C-FAC0949CB9CC}" type="datetime1">
               <a:rPr lang="fr-FR" smtClean="0"/>
-              <a:t>19/01/2021</a:t>
+              <a:t>01/02/2021</a:t>
             </a:fld>
             <a:endParaRPr lang="fr-FR"/>
           </a:p>
@@ -4433,7 +5177,7 @@
           <a:p>
             <a:fld id="{8D2B5F36-1A52-4FD1-9F6E-A2D43B96372C}" type="datetime1">
               <a:rPr lang="fr-FR" smtClean="0"/>
-              <a:t>19/01/2021</a:t>
+              <a:t>01/02/2021</a:t>
             </a:fld>
             <a:endParaRPr lang="fr-FR"/>
           </a:p>
@@ -4724,7 +5468,7 @@
           <a:p>
             <a:fld id="{0B89A1FA-1301-4071-96C9-C7DC9578DBB1}" type="datetime1">
               <a:rPr lang="fr-FR" smtClean="0"/>
-              <a:t>19/01/2021</a:t>
+              <a:t>01/02/2021</a:t>
             </a:fld>
             <a:endParaRPr lang="fr-FR"/>
           </a:p>
@@ -4968,7 +5712,7 @@
           <a:p>
             <a:fld id="{4AFCBC2A-6B84-4A42-9DBC-ED1FFAD42688}" type="datetime1">
               <a:rPr lang="fr-FR" smtClean="0"/>
-              <a:t>19/01/2021</a:t>
+              <a:t>01/02/2021</a:t>
             </a:fld>
             <a:endParaRPr lang="fr-FR"/>
           </a:p>
@@ -11488,6 +12232,3055 @@
     <p:extLst>
       <p:ext uri="{BB962C8B-B14F-4D97-AF65-F5344CB8AC3E}">
         <p14:creationId xmlns:p14="http://schemas.microsoft.com/office/powerpoint/2010/main" val="2038139196"/>
+      </p:ext>
+    </p:extLst>
+  </p:cSld>
+  <p:clrMapOvr>
+    <a:masterClrMapping/>
+  </p:clrMapOvr>
+  <mc:AlternateContent xmlns:mc="http://schemas.openxmlformats.org/markup-compatibility/2006" xmlns:p14="http://schemas.microsoft.com/office/powerpoint/2010/main">
+    <mc:Choice Requires="p14">
+      <p:transition spd="med" p14:dur="700">
+        <p:fade/>
+      </p:transition>
+    </mc:Choice>
+    <mc:Fallback xmlns="">
+      <p:transition spd="med">
+        <p:fade/>
+      </p:transition>
+    </mc:Fallback>
+  </mc:AlternateContent>
+</p:sld>
+</file>
+
+<file path=ppt/slides/slide20.xml><?xml version="1.0" encoding="utf-8"?>
+<p:sld xmlns:a="http://schemas.openxmlformats.org/drawingml/2006/main" xmlns:r="http://schemas.openxmlformats.org/officeDocument/2006/relationships" xmlns:p="http://schemas.openxmlformats.org/presentationml/2006/main">
+  <p:cSld>
+    <p:spTree>
+      <p:nvGrpSpPr>
+        <p:cNvPr id="1" name=""/>
+        <p:cNvGrpSpPr/>
+        <p:nvPr/>
+      </p:nvGrpSpPr>
+      <p:grpSpPr>
+        <a:xfrm>
+          <a:off x="0" y="0"/>
+          <a:ext cx="0" cy="0"/>
+          <a:chOff x="0" y="0"/>
+          <a:chExt cx="0" cy="0"/>
+        </a:xfrm>
+      </p:grpSpPr>
+      <p:sp>
+        <p:nvSpPr>
+          <p:cNvPr id="2" name="Titre 1"/>
+          <p:cNvSpPr>
+            <a:spLocks noGrp="1"/>
+          </p:cNvSpPr>
+          <p:nvPr>
+            <p:ph type="title"/>
+          </p:nvPr>
+        </p:nvSpPr>
+        <p:spPr>
+          <a:xfrm>
+            <a:off x="263117" y="781425"/>
+            <a:ext cx="6765755" cy="724942"/>
+          </a:xfrm>
+        </p:spPr>
+        <p:txBody>
+          <a:bodyPr>
+            <a:normAutofit/>
+          </a:bodyPr>
+          <a:lstStyle/>
+          <a:p>
+            <a:r>
+              <a:rPr lang="fr-FR" sz="3200" dirty="0"/>
+              <a:t>Explorateur de fichiers – Liste de fichiers</a:t>
+            </a:r>
+          </a:p>
+        </p:txBody>
+      </p:sp>
+      <p:cxnSp>
+        <p:nvCxnSpPr>
+          <p:cNvPr id="10" name="Connecteur droit 9"/>
+          <p:cNvCxnSpPr>
+            <a:cxnSpLocks/>
+          </p:cNvCxnSpPr>
+          <p:nvPr/>
+        </p:nvCxnSpPr>
+        <p:spPr>
+          <a:xfrm>
+            <a:off x="263118" y="1506367"/>
+            <a:ext cx="10709682" cy="0"/>
+          </a:xfrm>
+          <a:prstGeom prst="line">
+            <a:avLst/>
+          </a:prstGeom>
+          <a:ln w="19050">
+            <a:solidFill>
+              <a:schemeClr val="tx1"/>
+            </a:solidFill>
+          </a:ln>
+        </p:spPr>
+        <p:style>
+          <a:lnRef idx="1">
+            <a:schemeClr val="accent1"/>
+          </a:lnRef>
+          <a:fillRef idx="0">
+            <a:schemeClr val="accent1"/>
+          </a:fillRef>
+          <a:effectRef idx="0">
+            <a:schemeClr val="accent1"/>
+          </a:effectRef>
+          <a:fontRef idx="minor">
+            <a:schemeClr val="tx1"/>
+          </a:fontRef>
+        </p:style>
+      </p:cxnSp>
+      <p:sp>
+        <p:nvSpPr>
+          <p:cNvPr id="30" name="Espace réservé du contenu 2">
+            <a:extLst>
+              <a:ext uri="{FF2B5EF4-FFF2-40B4-BE49-F238E27FC236}">
+                <a16:creationId xmlns:a16="http://schemas.microsoft.com/office/drawing/2014/main" id="{17374925-2B5F-48B8-8155-9BB171EB9DDB}"/>
+              </a:ext>
+            </a:extLst>
+          </p:cNvPr>
+          <p:cNvSpPr>
+            <a:spLocks noGrp="1"/>
+          </p:cNvSpPr>
+          <p:nvPr>
+            <p:ph idx="1"/>
+          </p:nvPr>
+        </p:nvSpPr>
+        <p:spPr>
+          <a:xfrm>
+            <a:off x="263117" y="1725237"/>
+            <a:ext cx="11733713" cy="4631112"/>
+          </a:xfrm>
+        </p:spPr>
+        <p:txBody>
+          <a:bodyPr>
+            <a:normAutofit/>
+          </a:bodyPr>
+          <a:lstStyle/>
+          <a:p>
+            <a:r>
+              <a:rPr lang="fr-FR" sz="2400" dirty="0"/>
+              <a:t>Alexis</a:t>
+            </a:r>
+            <a:endParaRPr lang="fr-FR" sz="2000" dirty="0"/>
+          </a:p>
+        </p:txBody>
+      </p:sp>
+      <p:sp>
+        <p:nvSpPr>
+          <p:cNvPr id="8" name="Espace réservé du numéro de diapositive 7">
+            <a:extLst>
+              <a:ext uri="{FF2B5EF4-FFF2-40B4-BE49-F238E27FC236}">
+                <a16:creationId xmlns:a16="http://schemas.microsoft.com/office/drawing/2014/main" id="{B8B2E558-E863-4B5B-959A-AB1349969143}"/>
+              </a:ext>
+            </a:extLst>
+          </p:cNvPr>
+          <p:cNvSpPr>
+            <a:spLocks noGrp="1"/>
+          </p:cNvSpPr>
+          <p:nvPr>
+            <p:ph type="sldNum" sz="quarter" idx="12"/>
+          </p:nvPr>
+        </p:nvSpPr>
+        <p:spPr/>
+        <p:txBody>
+          <a:bodyPr/>
+          <a:lstStyle/>
+          <a:p>
+            <a:fld id="{8BBF28A3-E1F2-408E-9BE0-DB29BF40A39D}" type="slidenum">
+              <a:rPr lang="fr-FR" smtClean="0"/>
+              <a:t>20</a:t>
+            </a:fld>
+            <a:endParaRPr lang="fr-FR"/>
+          </a:p>
+        </p:txBody>
+      </p:sp>
+      <p:sp>
+        <p:nvSpPr>
+          <p:cNvPr id="9" name="Espace réservé du pied de page 3">
+            <a:extLst>
+              <a:ext uri="{FF2B5EF4-FFF2-40B4-BE49-F238E27FC236}">
+                <a16:creationId xmlns:a16="http://schemas.microsoft.com/office/drawing/2014/main" id="{2CD2AF13-957F-4245-8516-C9776ADE7978}"/>
+              </a:ext>
+            </a:extLst>
+          </p:cNvPr>
+          <p:cNvSpPr txBox="1">
+            <a:spLocks/>
+          </p:cNvSpPr>
+          <p:nvPr/>
+        </p:nvSpPr>
+        <p:spPr>
+          <a:xfrm>
+            <a:off x="5445839" y="105090"/>
+            <a:ext cx="1443870" cy="676309"/>
+          </a:xfrm>
+          <a:prstGeom prst="rect">
+            <a:avLst/>
+          </a:prstGeom>
+        </p:spPr>
+        <p:txBody>
+          <a:bodyPr vert="horz" lIns="91440" tIns="45720" rIns="91440" bIns="45720" rtlCol="0" anchor="ctr"/>
+          <a:lstStyle>
+            <a:defPPr>
+              <a:defRPr lang="fr-FR"/>
+            </a:defPPr>
+            <a:lvl1pPr marL="0" algn="ctr" defTabSz="914400" rtl="0" eaLnBrk="1" latinLnBrk="0" hangingPunct="1">
+              <a:defRPr sz="1200" kern="1200">
+                <a:solidFill>
+                  <a:schemeClr val="tx1">
+                    <a:tint val="75000"/>
+                  </a:schemeClr>
+                </a:solidFill>
+                <a:latin typeface="+mn-lt"/>
+                <a:ea typeface="+mn-ea"/>
+                <a:cs typeface="+mn-cs"/>
+              </a:defRPr>
+            </a:lvl1pPr>
+            <a:lvl2pPr marL="457200" algn="l" defTabSz="914400" rtl="0" eaLnBrk="1" latinLnBrk="0" hangingPunct="1">
+              <a:defRPr sz="1800" kern="1200">
+                <a:solidFill>
+                  <a:schemeClr val="tx1"/>
+                </a:solidFill>
+                <a:latin typeface="+mn-lt"/>
+                <a:ea typeface="+mn-ea"/>
+                <a:cs typeface="+mn-cs"/>
+              </a:defRPr>
+            </a:lvl2pPr>
+            <a:lvl3pPr marL="914400" algn="l" defTabSz="914400" rtl="0" eaLnBrk="1" latinLnBrk="0" hangingPunct="1">
+              <a:defRPr sz="1800" kern="1200">
+                <a:solidFill>
+                  <a:schemeClr val="tx1"/>
+                </a:solidFill>
+                <a:latin typeface="+mn-lt"/>
+                <a:ea typeface="+mn-ea"/>
+                <a:cs typeface="+mn-cs"/>
+              </a:defRPr>
+            </a:lvl3pPr>
+            <a:lvl4pPr marL="1371600" algn="l" defTabSz="914400" rtl="0" eaLnBrk="1" latinLnBrk="0" hangingPunct="1">
+              <a:defRPr sz="1800" kern="1200">
+                <a:solidFill>
+                  <a:schemeClr val="tx1"/>
+                </a:solidFill>
+                <a:latin typeface="+mn-lt"/>
+                <a:ea typeface="+mn-ea"/>
+                <a:cs typeface="+mn-cs"/>
+              </a:defRPr>
+            </a:lvl4pPr>
+            <a:lvl5pPr marL="1828800" algn="l" defTabSz="914400" rtl="0" eaLnBrk="1" latinLnBrk="0" hangingPunct="1">
+              <a:defRPr sz="1800" kern="1200">
+                <a:solidFill>
+                  <a:schemeClr val="tx1"/>
+                </a:solidFill>
+                <a:latin typeface="+mn-lt"/>
+                <a:ea typeface="+mn-ea"/>
+                <a:cs typeface="+mn-cs"/>
+              </a:defRPr>
+            </a:lvl5pPr>
+            <a:lvl6pPr marL="2286000" algn="l" defTabSz="914400" rtl="0" eaLnBrk="1" latinLnBrk="0" hangingPunct="1">
+              <a:defRPr sz="1800" kern="1200">
+                <a:solidFill>
+                  <a:schemeClr val="tx1"/>
+                </a:solidFill>
+                <a:latin typeface="+mn-lt"/>
+                <a:ea typeface="+mn-ea"/>
+                <a:cs typeface="+mn-cs"/>
+              </a:defRPr>
+            </a:lvl6pPr>
+            <a:lvl7pPr marL="2743200" algn="l" defTabSz="914400" rtl="0" eaLnBrk="1" latinLnBrk="0" hangingPunct="1">
+              <a:defRPr sz="1800" kern="1200">
+                <a:solidFill>
+                  <a:schemeClr val="tx1"/>
+                </a:solidFill>
+                <a:latin typeface="+mn-lt"/>
+                <a:ea typeface="+mn-ea"/>
+                <a:cs typeface="+mn-cs"/>
+              </a:defRPr>
+            </a:lvl7pPr>
+            <a:lvl8pPr marL="3200400" algn="l" defTabSz="914400" rtl="0" eaLnBrk="1" latinLnBrk="0" hangingPunct="1">
+              <a:defRPr sz="1800" kern="1200">
+                <a:solidFill>
+                  <a:schemeClr val="tx1"/>
+                </a:solidFill>
+                <a:latin typeface="+mn-lt"/>
+                <a:ea typeface="+mn-ea"/>
+                <a:cs typeface="+mn-cs"/>
+              </a:defRPr>
+            </a:lvl8pPr>
+            <a:lvl9pPr marL="3657600" algn="l" defTabSz="914400" rtl="0" eaLnBrk="1" latinLnBrk="0" hangingPunct="1">
+              <a:defRPr sz="1800" kern="1200">
+                <a:solidFill>
+                  <a:schemeClr val="tx1"/>
+                </a:solidFill>
+                <a:latin typeface="+mn-lt"/>
+                <a:ea typeface="+mn-ea"/>
+                <a:cs typeface="+mn-cs"/>
+              </a:defRPr>
+            </a:lvl9pPr>
+          </a:lstStyle>
+          <a:p>
+            <a:r>
+              <a:rPr lang="fr-FR" i="1" u="sng" dirty="0"/>
+              <a:t>Présentation du Web Designer</a:t>
+            </a:r>
+            <a:endParaRPr lang="fr-FR" sz="1000" dirty="0"/>
+          </a:p>
+        </p:txBody>
+      </p:sp>
+      <p:sp>
+        <p:nvSpPr>
+          <p:cNvPr id="3" name="Espace réservé du pied de page 2">
+            <a:extLst>
+              <a:ext uri="{FF2B5EF4-FFF2-40B4-BE49-F238E27FC236}">
+                <a16:creationId xmlns:a16="http://schemas.microsoft.com/office/drawing/2014/main" id="{61E4F19E-299A-4DBC-BD43-2B3AA1581E7C}"/>
+              </a:ext>
+            </a:extLst>
+          </p:cNvPr>
+          <p:cNvSpPr>
+            <a:spLocks noGrp="1"/>
+          </p:cNvSpPr>
+          <p:nvPr>
+            <p:ph type="ftr" sz="quarter" idx="11"/>
+          </p:nvPr>
+        </p:nvSpPr>
+        <p:spPr/>
+        <p:txBody>
+          <a:bodyPr/>
+          <a:lstStyle/>
+          <a:p>
+            <a:r>
+              <a:rPr lang="fr-FR"/>
+              <a:t>V0.1</a:t>
+            </a:r>
+          </a:p>
+        </p:txBody>
+      </p:sp>
+    </p:spTree>
+    <p:extLst>
+      <p:ext uri="{BB962C8B-B14F-4D97-AF65-F5344CB8AC3E}">
+        <p14:creationId xmlns:p14="http://schemas.microsoft.com/office/powerpoint/2010/main" val="2213938050"/>
+      </p:ext>
+    </p:extLst>
+  </p:cSld>
+  <p:clrMapOvr>
+    <a:masterClrMapping/>
+  </p:clrMapOvr>
+  <mc:AlternateContent xmlns:mc="http://schemas.openxmlformats.org/markup-compatibility/2006" xmlns:p14="http://schemas.microsoft.com/office/powerpoint/2010/main">
+    <mc:Choice Requires="p14">
+      <p:transition spd="med" p14:dur="700">
+        <p:fade/>
+      </p:transition>
+    </mc:Choice>
+    <mc:Fallback xmlns="">
+      <p:transition spd="med">
+        <p:fade/>
+      </p:transition>
+    </mc:Fallback>
+  </mc:AlternateContent>
+</p:sld>
+</file>
+
+<file path=ppt/slides/slide21.xml><?xml version="1.0" encoding="utf-8"?>
+<p:sld xmlns:a="http://schemas.openxmlformats.org/drawingml/2006/main" xmlns:r="http://schemas.openxmlformats.org/officeDocument/2006/relationships" xmlns:p="http://schemas.openxmlformats.org/presentationml/2006/main">
+  <p:cSld>
+    <p:spTree>
+      <p:nvGrpSpPr>
+        <p:cNvPr id="1" name=""/>
+        <p:cNvGrpSpPr/>
+        <p:nvPr/>
+      </p:nvGrpSpPr>
+      <p:grpSpPr>
+        <a:xfrm>
+          <a:off x="0" y="0"/>
+          <a:ext cx="0" cy="0"/>
+          <a:chOff x="0" y="0"/>
+          <a:chExt cx="0" cy="0"/>
+        </a:xfrm>
+      </p:grpSpPr>
+      <p:sp>
+        <p:nvSpPr>
+          <p:cNvPr id="2" name="Titre 1"/>
+          <p:cNvSpPr>
+            <a:spLocks noGrp="1"/>
+          </p:cNvSpPr>
+          <p:nvPr>
+            <p:ph type="title"/>
+          </p:nvPr>
+        </p:nvSpPr>
+        <p:spPr>
+          <a:xfrm>
+            <a:off x="263117" y="781425"/>
+            <a:ext cx="6765755" cy="724942"/>
+          </a:xfrm>
+        </p:spPr>
+        <p:txBody>
+          <a:bodyPr>
+            <a:normAutofit/>
+          </a:bodyPr>
+          <a:lstStyle/>
+          <a:p>
+            <a:r>
+              <a:rPr lang="fr-FR" sz="3200" dirty="0"/>
+              <a:t>Toolbox – Liste des widgets</a:t>
+            </a:r>
+          </a:p>
+        </p:txBody>
+      </p:sp>
+      <p:cxnSp>
+        <p:nvCxnSpPr>
+          <p:cNvPr id="10" name="Connecteur droit 9"/>
+          <p:cNvCxnSpPr>
+            <a:cxnSpLocks/>
+          </p:cNvCxnSpPr>
+          <p:nvPr/>
+        </p:nvCxnSpPr>
+        <p:spPr>
+          <a:xfrm>
+            <a:off x="263118" y="1506367"/>
+            <a:ext cx="10709682" cy="0"/>
+          </a:xfrm>
+          <a:prstGeom prst="line">
+            <a:avLst/>
+          </a:prstGeom>
+          <a:ln w="19050">
+            <a:solidFill>
+              <a:schemeClr val="tx1"/>
+            </a:solidFill>
+          </a:ln>
+        </p:spPr>
+        <p:style>
+          <a:lnRef idx="1">
+            <a:schemeClr val="accent1"/>
+          </a:lnRef>
+          <a:fillRef idx="0">
+            <a:schemeClr val="accent1"/>
+          </a:fillRef>
+          <a:effectRef idx="0">
+            <a:schemeClr val="accent1"/>
+          </a:effectRef>
+          <a:fontRef idx="minor">
+            <a:schemeClr val="tx1"/>
+          </a:fontRef>
+        </p:style>
+      </p:cxnSp>
+      <p:sp>
+        <p:nvSpPr>
+          <p:cNvPr id="30" name="Espace réservé du contenu 2">
+            <a:extLst>
+              <a:ext uri="{FF2B5EF4-FFF2-40B4-BE49-F238E27FC236}">
+                <a16:creationId xmlns:a16="http://schemas.microsoft.com/office/drawing/2014/main" id="{17374925-2B5F-48B8-8155-9BB171EB9DDB}"/>
+              </a:ext>
+            </a:extLst>
+          </p:cNvPr>
+          <p:cNvSpPr>
+            <a:spLocks noGrp="1"/>
+          </p:cNvSpPr>
+          <p:nvPr>
+            <p:ph idx="1"/>
+          </p:nvPr>
+        </p:nvSpPr>
+        <p:spPr>
+          <a:xfrm>
+            <a:off x="263117" y="1725237"/>
+            <a:ext cx="11733713" cy="4631112"/>
+          </a:xfrm>
+        </p:spPr>
+        <p:txBody>
+          <a:bodyPr>
+            <a:normAutofit/>
+          </a:bodyPr>
+          <a:lstStyle/>
+          <a:p>
+            <a:endParaRPr lang="fr-FR" sz="2000" dirty="0"/>
+          </a:p>
+        </p:txBody>
+      </p:sp>
+      <p:sp>
+        <p:nvSpPr>
+          <p:cNvPr id="8" name="Espace réservé du numéro de diapositive 7">
+            <a:extLst>
+              <a:ext uri="{FF2B5EF4-FFF2-40B4-BE49-F238E27FC236}">
+                <a16:creationId xmlns:a16="http://schemas.microsoft.com/office/drawing/2014/main" id="{B8B2E558-E863-4B5B-959A-AB1349969143}"/>
+              </a:ext>
+            </a:extLst>
+          </p:cNvPr>
+          <p:cNvSpPr>
+            <a:spLocks noGrp="1"/>
+          </p:cNvSpPr>
+          <p:nvPr>
+            <p:ph type="sldNum" sz="quarter" idx="12"/>
+          </p:nvPr>
+        </p:nvSpPr>
+        <p:spPr/>
+        <p:txBody>
+          <a:bodyPr/>
+          <a:lstStyle/>
+          <a:p>
+            <a:fld id="{8BBF28A3-E1F2-408E-9BE0-DB29BF40A39D}" type="slidenum">
+              <a:rPr lang="fr-FR" smtClean="0"/>
+              <a:t>21</a:t>
+            </a:fld>
+            <a:endParaRPr lang="fr-FR"/>
+          </a:p>
+        </p:txBody>
+      </p:sp>
+      <p:sp>
+        <p:nvSpPr>
+          <p:cNvPr id="9" name="Espace réservé du pied de page 3">
+            <a:extLst>
+              <a:ext uri="{FF2B5EF4-FFF2-40B4-BE49-F238E27FC236}">
+                <a16:creationId xmlns:a16="http://schemas.microsoft.com/office/drawing/2014/main" id="{2CD2AF13-957F-4245-8516-C9776ADE7978}"/>
+              </a:ext>
+            </a:extLst>
+          </p:cNvPr>
+          <p:cNvSpPr txBox="1">
+            <a:spLocks/>
+          </p:cNvSpPr>
+          <p:nvPr/>
+        </p:nvSpPr>
+        <p:spPr>
+          <a:xfrm>
+            <a:off x="5445839" y="105090"/>
+            <a:ext cx="1443870" cy="676309"/>
+          </a:xfrm>
+          <a:prstGeom prst="rect">
+            <a:avLst/>
+          </a:prstGeom>
+        </p:spPr>
+        <p:txBody>
+          <a:bodyPr vert="horz" lIns="91440" tIns="45720" rIns="91440" bIns="45720" rtlCol="0" anchor="ctr"/>
+          <a:lstStyle>
+            <a:defPPr>
+              <a:defRPr lang="fr-FR"/>
+            </a:defPPr>
+            <a:lvl1pPr marL="0" algn="ctr" defTabSz="914400" rtl="0" eaLnBrk="1" latinLnBrk="0" hangingPunct="1">
+              <a:defRPr sz="1200" kern="1200">
+                <a:solidFill>
+                  <a:schemeClr val="tx1">
+                    <a:tint val="75000"/>
+                  </a:schemeClr>
+                </a:solidFill>
+                <a:latin typeface="+mn-lt"/>
+                <a:ea typeface="+mn-ea"/>
+                <a:cs typeface="+mn-cs"/>
+              </a:defRPr>
+            </a:lvl1pPr>
+            <a:lvl2pPr marL="457200" algn="l" defTabSz="914400" rtl="0" eaLnBrk="1" latinLnBrk="0" hangingPunct="1">
+              <a:defRPr sz="1800" kern="1200">
+                <a:solidFill>
+                  <a:schemeClr val="tx1"/>
+                </a:solidFill>
+                <a:latin typeface="+mn-lt"/>
+                <a:ea typeface="+mn-ea"/>
+                <a:cs typeface="+mn-cs"/>
+              </a:defRPr>
+            </a:lvl2pPr>
+            <a:lvl3pPr marL="914400" algn="l" defTabSz="914400" rtl="0" eaLnBrk="1" latinLnBrk="0" hangingPunct="1">
+              <a:defRPr sz="1800" kern="1200">
+                <a:solidFill>
+                  <a:schemeClr val="tx1"/>
+                </a:solidFill>
+                <a:latin typeface="+mn-lt"/>
+                <a:ea typeface="+mn-ea"/>
+                <a:cs typeface="+mn-cs"/>
+              </a:defRPr>
+            </a:lvl3pPr>
+            <a:lvl4pPr marL="1371600" algn="l" defTabSz="914400" rtl="0" eaLnBrk="1" latinLnBrk="0" hangingPunct="1">
+              <a:defRPr sz="1800" kern="1200">
+                <a:solidFill>
+                  <a:schemeClr val="tx1"/>
+                </a:solidFill>
+                <a:latin typeface="+mn-lt"/>
+                <a:ea typeface="+mn-ea"/>
+                <a:cs typeface="+mn-cs"/>
+              </a:defRPr>
+            </a:lvl4pPr>
+            <a:lvl5pPr marL="1828800" algn="l" defTabSz="914400" rtl="0" eaLnBrk="1" latinLnBrk="0" hangingPunct="1">
+              <a:defRPr sz="1800" kern="1200">
+                <a:solidFill>
+                  <a:schemeClr val="tx1"/>
+                </a:solidFill>
+                <a:latin typeface="+mn-lt"/>
+                <a:ea typeface="+mn-ea"/>
+                <a:cs typeface="+mn-cs"/>
+              </a:defRPr>
+            </a:lvl5pPr>
+            <a:lvl6pPr marL="2286000" algn="l" defTabSz="914400" rtl="0" eaLnBrk="1" latinLnBrk="0" hangingPunct="1">
+              <a:defRPr sz="1800" kern="1200">
+                <a:solidFill>
+                  <a:schemeClr val="tx1"/>
+                </a:solidFill>
+                <a:latin typeface="+mn-lt"/>
+                <a:ea typeface="+mn-ea"/>
+                <a:cs typeface="+mn-cs"/>
+              </a:defRPr>
+            </a:lvl6pPr>
+            <a:lvl7pPr marL="2743200" algn="l" defTabSz="914400" rtl="0" eaLnBrk="1" latinLnBrk="0" hangingPunct="1">
+              <a:defRPr sz="1800" kern="1200">
+                <a:solidFill>
+                  <a:schemeClr val="tx1"/>
+                </a:solidFill>
+                <a:latin typeface="+mn-lt"/>
+                <a:ea typeface="+mn-ea"/>
+                <a:cs typeface="+mn-cs"/>
+              </a:defRPr>
+            </a:lvl7pPr>
+            <a:lvl8pPr marL="3200400" algn="l" defTabSz="914400" rtl="0" eaLnBrk="1" latinLnBrk="0" hangingPunct="1">
+              <a:defRPr sz="1800" kern="1200">
+                <a:solidFill>
+                  <a:schemeClr val="tx1"/>
+                </a:solidFill>
+                <a:latin typeface="+mn-lt"/>
+                <a:ea typeface="+mn-ea"/>
+                <a:cs typeface="+mn-cs"/>
+              </a:defRPr>
+            </a:lvl8pPr>
+            <a:lvl9pPr marL="3657600" algn="l" defTabSz="914400" rtl="0" eaLnBrk="1" latinLnBrk="0" hangingPunct="1">
+              <a:defRPr sz="1800" kern="1200">
+                <a:solidFill>
+                  <a:schemeClr val="tx1"/>
+                </a:solidFill>
+                <a:latin typeface="+mn-lt"/>
+                <a:ea typeface="+mn-ea"/>
+                <a:cs typeface="+mn-cs"/>
+              </a:defRPr>
+            </a:lvl9pPr>
+          </a:lstStyle>
+          <a:p>
+            <a:r>
+              <a:rPr lang="fr-FR" i="1" u="sng" dirty="0"/>
+              <a:t>Présentation du Web Designer</a:t>
+            </a:r>
+            <a:endParaRPr lang="fr-FR" sz="1000" dirty="0"/>
+          </a:p>
+        </p:txBody>
+      </p:sp>
+      <p:sp>
+        <p:nvSpPr>
+          <p:cNvPr id="3" name="Espace réservé du pied de page 2">
+            <a:extLst>
+              <a:ext uri="{FF2B5EF4-FFF2-40B4-BE49-F238E27FC236}">
+                <a16:creationId xmlns:a16="http://schemas.microsoft.com/office/drawing/2014/main" id="{61E4F19E-299A-4DBC-BD43-2B3AA1581E7C}"/>
+              </a:ext>
+            </a:extLst>
+          </p:cNvPr>
+          <p:cNvSpPr>
+            <a:spLocks noGrp="1"/>
+          </p:cNvSpPr>
+          <p:nvPr>
+            <p:ph type="ftr" sz="quarter" idx="11"/>
+          </p:nvPr>
+        </p:nvSpPr>
+        <p:spPr/>
+        <p:txBody>
+          <a:bodyPr/>
+          <a:lstStyle/>
+          <a:p>
+            <a:r>
+              <a:rPr lang="fr-FR"/>
+              <a:t>V0.1</a:t>
+            </a:r>
+          </a:p>
+        </p:txBody>
+      </p:sp>
+    </p:spTree>
+    <p:extLst>
+      <p:ext uri="{BB962C8B-B14F-4D97-AF65-F5344CB8AC3E}">
+        <p14:creationId xmlns:p14="http://schemas.microsoft.com/office/powerpoint/2010/main" val="277190004"/>
+      </p:ext>
+    </p:extLst>
+  </p:cSld>
+  <p:clrMapOvr>
+    <a:masterClrMapping/>
+  </p:clrMapOvr>
+  <mc:AlternateContent xmlns:mc="http://schemas.openxmlformats.org/markup-compatibility/2006" xmlns:p14="http://schemas.microsoft.com/office/powerpoint/2010/main">
+    <mc:Choice Requires="p14">
+      <p:transition spd="med" p14:dur="700">
+        <p:fade/>
+      </p:transition>
+    </mc:Choice>
+    <mc:Fallback xmlns="">
+      <p:transition spd="med">
+        <p:fade/>
+      </p:transition>
+    </mc:Fallback>
+  </mc:AlternateContent>
+</p:sld>
+</file>
+
+<file path=ppt/slides/slide22.xml><?xml version="1.0" encoding="utf-8"?>
+<p:sld xmlns:a="http://schemas.openxmlformats.org/drawingml/2006/main" xmlns:r="http://schemas.openxmlformats.org/officeDocument/2006/relationships" xmlns:p="http://schemas.openxmlformats.org/presentationml/2006/main">
+  <p:cSld>
+    <p:spTree>
+      <p:nvGrpSpPr>
+        <p:cNvPr id="1" name=""/>
+        <p:cNvGrpSpPr/>
+        <p:nvPr/>
+      </p:nvGrpSpPr>
+      <p:grpSpPr>
+        <a:xfrm>
+          <a:off x="0" y="0"/>
+          <a:ext cx="0" cy="0"/>
+          <a:chOff x="0" y="0"/>
+          <a:chExt cx="0" cy="0"/>
+        </a:xfrm>
+      </p:grpSpPr>
+      <p:sp>
+        <p:nvSpPr>
+          <p:cNvPr id="2" name="Titre 1"/>
+          <p:cNvSpPr>
+            <a:spLocks noGrp="1"/>
+          </p:cNvSpPr>
+          <p:nvPr>
+            <p:ph type="title"/>
+          </p:nvPr>
+        </p:nvSpPr>
+        <p:spPr>
+          <a:xfrm>
+            <a:off x="263117" y="781425"/>
+            <a:ext cx="6765755" cy="724942"/>
+          </a:xfrm>
+        </p:spPr>
+        <p:txBody>
+          <a:bodyPr>
+            <a:normAutofit/>
+          </a:bodyPr>
+          <a:lstStyle/>
+          <a:p>
+            <a:r>
+              <a:rPr lang="fr-FR" sz="3200" dirty="0"/>
+              <a:t>Config des widgets</a:t>
+            </a:r>
+          </a:p>
+        </p:txBody>
+      </p:sp>
+      <p:cxnSp>
+        <p:nvCxnSpPr>
+          <p:cNvPr id="10" name="Connecteur droit 9"/>
+          <p:cNvCxnSpPr>
+            <a:cxnSpLocks/>
+          </p:cNvCxnSpPr>
+          <p:nvPr/>
+        </p:nvCxnSpPr>
+        <p:spPr>
+          <a:xfrm>
+            <a:off x="263118" y="1506367"/>
+            <a:ext cx="10709682" cy="0"/>
+          </a:xfrm>
+          <a:prstGeom prst="line">
+            <a:avLst/>
+          </a:prstGeom>
+          <a:ln w="19050">
+            <a:solidFill>
+              <a:schemeClr val="tx1"/>
+            </a:solidFill>
+          </a:ln>
+        </p:spPr>
+        <p:style>
+          <a:lnRef idx="1">
+            <a:schemeClr val="accent1"/>
+          </a:lnRef>
+          <a:fillRef idx="0">
+            <a:schemeClr val="accent1"/>
+          </a:fillRef>
+          <a:effectRef idx="0">
+            <a:schemeClr val="accent1"/>
+          </a:effectRef>
+          <a:fontRef idx="minor">
+            <a:schemeClr val="tx1"/>
+          </a:fontRef>
+        </p:style>
+      </p:cxnSp>
+      <p:sp>
+        <p:nvSpPr>
+          <p:cNvPr id="30" name="Espace réservé du contenu 2">
+            <a:extLst>
+              <a:ext uri="{FF2B5EF4-FFF2-40B4-BE49-F238E27FC236}">
+                <a16:creationId xmlns:a16="http://schemas.microsoft.com/office/drawing/2014/main" id="{17374925-2B5F-48B8-8155-9BB171EB9DDB}"/>
+              </a:ext>
+            </a:extLst>
+          </p:cNvPr>
+          <p:cNvSpPr>
+            <a:spLocks noGrp="1"/>
+          </p:cNvSpPr>
+          <p:nvPr>
+            <p:ph idx="1"/>
+          </p:nvPr>
+        </p:nvSpPr>
+        <p:spPr>
+          <a:xfrm>
+            <a:off x="263117" y="1725237"/>
+            <a:ext cx="11733713" cy="4631112"/>
+          </a:xfrm>
+        </p:spPr>
+        <p:txBody>
+          <a:bodyPr>
+            <a:normAutofit/>
+          </a:bodyPr>
+          <a:lstStyle/>
+          <a:p>
+            <a:endParaRPr lang="fr-FR" sz="2000" dirty="0"/>
+          </a:p>
+        </p:txBody>
+      </p:sp>
+      <p:sp>
+        <p:nvSpPr>
+          <p:cNvPr id="8" name="Espace réservé du numéro de diapositive 7">
+            <a:extLst>
+              <a:ext uri="{FF2B5EF4-FFF2-40B4-BE49-F238E27FC236}">
+                <a16:creationId xmlns:a16="http://schemas.microsoft.com/office/drawing/2014/main" id="{B8B2E558-E863-4B5B-959A-AB1349969143}"/>
+              </a:ext>
+            </a:extLst>
+          </p:cNvPr>
+          <p:cNvSpPr>
+            <a:spLocks noGrp="1"/>
+          </p:cNvSpPr>
+          <p:nvPr>
+            <p:ph type="sldNum" sz="quarter" idx="12"/>
+          </p:nvPr>
+        </p:nvSpPr>
+        <p:spPr/>
+        <p:txBody>
+          <a:bodyPr/>
+          <a:lstStyle/>
+          <a:p>
+            <a:fld id="{8BBF28A3-E1F2-408E-9BE0-DB29BF40A39D}" type="slidenum">
+              <a:rPr lang="fr-FR" smtClean="0"/>
+              <a:t>22</a:t>
+            </a:fld>
+            <a:endParaRPr lang="fr-FR"/>
+          </a:p>
+        </p:txBody>
+      </p:sp>
+      <p:sp>
+        <p:nvSpPr>
+          <p:cNvPr id="9" name="Espace réservé du pied de page 3">
+            <a:extLst>
+              <a:ext uri="{FF2B5EF4-FFF2-40B4-BE49-F238E27FC236}">
+                <a16:creationId xmlns:a16="http://schemas.microsoft.com/office/drawing/2014/main" id="{2CD2AF13-957F-4245-8516-C9776ADE7978}"/>
+              </a:ext>
+            </a:extLst>
+          </p:cNvPr>
+          <p:cNvSpPr txBox="1">
+            <a:spLocks/>
+          </p:cNvSpPr>
+          <p:nvPr/>
+        </p:nvSpPr>
+        <p:spPr>
+          <a:xfrm>
+            <a:off x="5445839" y="105090"/>
+            <a:ext cx="1443870" cy="676309"/>
+          </a:xfrm>
+          <a:prstGeom prst="rect">
+            <a:avLst/>
+          </a:prstGeom>
+        </p:spPr>
+        <p:txBody>
+          <a:bodyPr vert="horz" lIns="91440" tIns="45720" rIns="91440" bIns="45720" rtlCol="0" anchor="ctr"/>
+          <a:lstStyle>
+            <a:defPPr>
+              <a:defRPr lang="fr-FR"/>
+            </a:defPPr>
+            <a:lvl1pPr marL="0" algn="ctr" defTabSz="914400" rtl="0" eaLnBrk="1" latinLnBrk="0" hangingPunct="1">
+              <a:defRPr sz="1200" kern="1200">
+                <a:solidFill>
+                  <a:schemeClr val="tx1">
+                    <a:tint val="75000"/>
+                  </a:schemeClr>
+                </a:solidFill>
+                <a:latin typeface="+mn-lt"/>
+                <a:ea typeface="+mn-ea"/>
+                <a:cs typeface="+mn-cs"/>
+              </a:defRPr>
+            </a:lvl1pPr>
+            <a:lvl2pPr marL="457200" algn="l" defTabSz="914400" rtl="0" eaLnBrk="1" latinLnBrk="0" hangingPunct="1">
+              <a:defRPr sz="1800" kern="1200">
+                <a:solidFill>
+                  <a:schemeClr val="tx1"/>
+                </a:solidFill>
+                <a:latin typeface="+mn-lt"/>
+                <a:ea typeface="+mn-ea"/>
+                <a:cs typeface="+mn-cs"/>
+              </a:defRPr>
+            </a:lvl2pPr>
+            <a:lvl3pPr marL="914400" algn="l" defTabSz="914400" rtl="0" eaLnBrk="1" latinLnBrk="0" hangingPunct="1">
+              <a:defRPr sz="1800" kern="1200">
+                <a:solidFill>
+                  <a:schemeClr val="tx1"/>
+                </a:solidFill>
+                <a:latin typeface="+mn-lt"/>
+                <a:ea typeface="+mn-ea"/>
+                <a:cs typeface="+mn-cs"/>
+              </a:defRPr>
+            </a:lvl3pPr>
+            <a:lvl4pPr marL="1371600" algn="l" defTabSz="914400" rtl="0" eaLnBrk="1" latinLnBrk="0" hangingPunct="1">
+              <a:defRPr sz="1800" kern="1200">
+                <a:solidFill>
+                  <a:schemeClr val="tx1"/>
+                </a:solidFill>
+                <a:latin typeface="+mn-lt"/>
+                <a:ea typeface="+mn-ea"/>
+                <a:cs typeface="+mn-cs"/>
+              </a:defRPr>
+            </a:lvl4pPr>
+            <a:lvl5pPr marL="1828800" algn="l" defTabSz="914400" rtl="0" eaLnBrk="1" latinLnBrk="0" hangingPunct="1">
+              <a:defRPr sz="1800" kern="1200">
+                <a:solidFill>
+                  <a:schemeClr val="tx1"/>
+                </a:solidFill>
+                <a:latin typeface="+mn-lt"/>
+                <a:ea typeface="+mn-ea"/>
+                <a:cs typeface="+mn-cs"/>
+              </a:defRPr>
+            </a:lvl5pPr>
+            <a:lvl6pPr marL="2286000" algn="l" defTabSz="914400" rtl="0" eaLnBrk="1" latinLnBrk="0" hangingPunct="1">
+              <a:defRPr sz="1800" kern="1200">
+                <a:solidFill>
+                  <a:schemeClr val="tx1"/>
+                </a:solidFill>
+                <a:latin typeface="+mn-lt"/>
+                <a:ea typeface="+mn-ea"/>
+                <a:cs typeface="+mn-cs"/>
+              </a:defRPr>
+            </a:lvl6pPr>
+            <a:lvl7pPr marL="2743200" algn="l" defTabSz="914400" rtl="0" eaLnBrk="1" latinLnBrk="0" hangingPunct="1">
+              <a:defRPr sz="1800" kern="1200">
+                <a:solidFill>
+                  <a:schemeClr val="tx1"/>
+                </a:solidFill>
+                <a:latin typeface="+mn-lt"/>
+                <a:ea typeface="+mn-ea"/>
+                <a:cs typeface="+mn-cs"/>
+              </a:defRPr>
+            </a:lvl7pPr>
+            <a:lvl8pPr marL="3200400" algn="l" defTabSz="914400" rtl="0" eaLnBrk="1" latinLnBrk="0" hangingPunct="1">
+              <a:defRPr sz="1800" kern="1200">
+                <a:solidFill>
+                  <a:schemeClr val="tx1"/>
+                </a:solidFill>
+                <a:latin typeface="+mn-lt"/>
+                <a:ea typeface="+mn-ea"/>
+                <a:cs typeface="+mn-cs"/>
+              </a:defRPr>
+            </a:lvl8pPr>
+            <a:lvl9pPr marL="3657600" algn="l" defTabSz="914400" rtl="0" eaLnBrk="1" latinLnBrk="0" hangingPunct="1">
+              <a:defRPr sz="1800" kern="1200">
+                <a:solidFill>
+                  <a:schemeClr val="tx1"/>
+                </a:solidFill>
+                <a:latin typeface="+mn-lt"/>
+                <a:ea typeface="+mn-ea"/>
+                <a:cs typeface="+mn-cs"/>
+              </a:defRPr>
+            </a:lvl9pPr>
+          </a:lstStyle>
+          <a:p>
+            <a:r>
+              <a:rPr lang="fr-FR" i="1" u="sng" dirty="0"/>
+              <a:t>Présentation du Web Designer</a:t>
+            </a:r>
+            <a:endParaRPr lang="fr-FR" sz="1000" dirty="0"/>
+          </a:p>
+        </p:txBody>
+      </p:sp>
+      <p:sp>
+        <p:nvSpPr>
+          <p:cNvPr id="3" name="Espace réservé du pied de page 2">
+            <a:extLst>
+              <a:ext uri="{FF2B5EF4-FFF2-40B4-BE49-F238E27FC236}">
+                <a16:creationId xmlns:a16="http://schemas.microsoft.com/office/drawing/2014/main" id="{61E4F19E-299A-4DBC-BD43-2B3AA1581E7C}"/>
+              </a:ext>
+            </a:extLst>
+          </p:cNvPr>
+          <p:cNvSpPr>
+            <a:spLocks noGrp="1"/>
+          </p:cNvSpPr>
+          <p:nvPr>
+            <p:ph type="ftr" sz="quarter" idx="11"/>
+          </p:nvPr>
+        </p:nvSpPr>
+        <p:spPr/>
+        <p:txBody>
+          <a:bodyPr/>
+          <a:lstStyle/>
+          <a:p>
+            <a:r>
+              <a:rPr lang="fr-FR"/>
+              <a:t>V0.1</a:t>
+            </a:r>
+          </a:p>
+        </p:txBody>
+      </p:sp>
+    </p:spTree>
+    <p:extLst>
+      <p:ext uri="{BB962C8B-B14F-4D97-AF65-F5344CB8AC3E}">
+        <p14:creationId xmlns:p14="http://schemas.microsoft.com/office/powerpoint/2010/main" val="2022861351"/>
+      </p:ext>
+    </p:extLst>
+  </p:cSld>
+  <p:clrMapOvr>
+    <a:masterClrMapping/>
+  </p:clrMapOvr>
+  <mc:AlternateContent xmlns:mc="http://schemas.openxmlformats.org/markup-compatibility/2006" xmlns:p14="http://schemas.microsoft.com/office/powerpoint/2010/main">
+    <mc:Choice Requires="p14">
+      <p:transition spd="med" p14:dur="700">
+        <p:fade/>
+      </p:transition>
+    </mc:Choice>
+    <mc:Fallback xmlns="">
+      <p:transition spd="med">
+        <p:fade/>
+      </p:transition>
+    </mc:Fallback>
+  </mc:AlternateContent>
+</p:sld>
+</file>
+
+<file path=ppt/slides/slide23.xml><?xml version="1.0" encoding="utf-8"?>
+<p:sld xmlns:a="http://schemas.openxmlformats.org/drawingml/2006/main" xmlns:r="http://schemas.openxmlformats.org/officeDocument/2006/relationships" xmlns:p="http://schemas.openxmlformats.org/presentationml/2006/main">
+  <p:cSld>
+    <p:spTree>
+      <p:nvGrpSpPr>
+        <p:cNvPr id="1" name=""/>
+        <p:cNvGrpSpPr/>
+        <p:nvPr/>
+      </p:nvGrpSpPr>
+      <p:grpSpPr>
+        <a:xfrm>
+          <a:off x="0" y="0"/>
+          <a:ext cx="0" cy="0"/>
+          <a:chOff x="0" y="0"/>
+          <a:chExt cx="0" cy="0"/>
+        </a:xfrm>
+      </p:grpSpPr>
+      <p:sp>
+        <p:nvSpPr>
+          <p:cNvPr id="2" name="Titre 1"/>
+          <p:cNvSpPr>
+            <a:spLocks noGrp="1"/>
+          </p:cNvSpPr>
+          <p:nvPr>
+            <p:ph type="title"/>
+          </p:nvPr>
+        </p:nvSpPr>
+        <p:spPr>
+          <a:xfrm>
+            <a:off x="263117" y="781425"/>
+            <a:ext cx="6765755" cy="724942"/>
+          </a:xfrm>
+        </p:spPr>
+        <p:txBody>
+          <a:bodyPr>
+            <a:normAutofit/>
+          </a:bodyPr>
+          <a:lstStyle/>
+          <a:p>
+            <a:r>
+              <a:rPr lang="fr-FR" sz="3200" dirty="0"/>
+              <a:t>Documentation</a:t>
+            </a:r>
+          </a:p>
+        </p:txBody>
+      </p:sp>
+      <p:cxnSp>
+        <p:nvCxnSpPr>
+          <p:cNvPr id="10" name="Connecteur droit 9"/>
+          <p:cNvCxnSpPr>
+            <a:cxnSpLocks/>
+          </p:cNvCxnSpPr>
+          <p:nvPr/>
+        </p:nvCxnSpPr>
+        <p:spPr>
+          <a:xfrm>
+            <a:off x="263118" y="1506367"/>
+            <a:ext cx="10709682" cy="0"/>
+          </a:xfrm>
+          <a:prstGeom prst="line">
+            <a:avLst/>
+          </a:prstGeom>
+          <a:ln w="19050">
+            <a:solidFill>
+              <a:schemeClr val="tx1"/>
+            </a:solidFill>
+          </a:ln>
+        </p:spPr>
+        <p:style>
+          <a:lnRef idx="1">
+            <a:schemeClr val="accent1"/>
+          </a:lnRef>
+          <a:fillRef idx="0">
+            <a:schemeClr val="accent1"/>
+          </a:fillRef>
+          <a:effectRef idx="0">
+            <a:schemeClr val="accent1"/>
+          </a:effectRef>
+          <a:fontRef idx="minor">
+            <a:schemeClr val="tx1"/>
+          </a:fontRef>
+        </p:style>
+      </p:cxnSp>
+      <p:sp>
+        <p:nvSpPr>
+          <p:cNvPr id="30" name="Espace réservé du contenu 2">
+            <a:extLst>
+              <a:ext uri="{FF2B5EF4-FFF2-40B4-BE49-F238E27FC236}">
+                <a16:creationId xmlns:a16="http://schemas.microsoft.com/office/drawing/2014/main" id="{17374925-2B5F-48B8-8155-9BB171EB9DDB}"/>
+              </a:ext>
+            </a:extLst>
+          </p:cNvPr>
+          <p:cNvSpPr>
+            <a:spLocks noGrp="1"/>
+          </p:cNvSpPr>
+          <p:nvPr>
+            <p:ph idx="1"/>
+          </p:nvPr>
+        </p:nvSpPr>
+        <p:spPr>
+          <a:xfrm>
+            <a:off x="263117" y="1725237"/>
+            <a:ext cx="11733713" cy="4631112"/>
+          </a:xfrm>
+        </p:spPr>
+        <p:txBody>
+          <a:bodyPr>
+            <a:normAutofit/>
+          </a:bodyPr>
+          <a:lstStyle/>
+          <a:p>
+            <a:endParaRPr lang="fr-FR" sz="2000" dirty="0"/>
+          </a:p>
+        </p:txBody>
+      </p:sp>
+      <p:sp>
+        <p:nvSpPr>
+          <p:cNvPr id="8" name="Espace réservé du numéro de diapositive 7">
+            <a:extLst>
+              <a:ext uri="{FF2B5EF4-FFF2-40B4-BE49-F238E27FC236}">
+                <a16:creationId xmlns:a16="http://schemas.microsoft.com/office/drawing/2014/main" id="{B8B2E558-E863-4B5B-959A-AB1349969143}"/>
+              </a:ext>
+            </a:extLst>
+          </p:cNvPr>
+          <p:cNvSpPr>
+            <a:spLocks noGrp="1"/>
+          </p:cNvSpPr>
+          <p:nvPr>
+            <p:ph type="sldNum" sz="quarter" idx="12"/>
+          </p:nvPr>
+        </p:nvSpPr>
+        <p:spPr/>
+        <p:txBody>
+          <a:bodyPr/>
+          <a:lstStyle/>
+          <a:p>
+            <a:fld id="{8BBF28A3-E1F2-408E-9BE0-DB29BF40A39D}" type="slidenum">
+              <a:rPr lang="fr-FR" smtClean="0"/>
+              <a:t>23</a:t>
+            </a:fld>
+            <a:endParaRPr lang="fr-FR"/>
+          </a:p>
+        </p:txBody>
+      </p:sp>
+      <p:sp>
+        <p:nvSpPr>
+          <p:cNvPr id="9" name="Espace réservé du pied de page 3">
+            <a:extLst>
+              <a:ext uri="{FF2B5EF4-FFF2-40B4-BE49-F238E27FC236}">
+                <a16:creationId xmlns:a16="http://schemas.microsoft.com/office/drawing/2014/main" id="{2CD2AF13-957F-4245-8516-C9776ADE7978}"/>
+              </a:ext>
+            </a:extLst>
+          </p:cNvPr>
+          <p:cNvSpPr txBox="1">
+            <a:spLocks/>
+          </p:cNvSpPr>
+          <p:nvPr/>
+        </p:nvSpPr>
+        <p:spPr>
+          <a:xfrm>
+            <a:off x="5445839" y="105090"/>
+            <a:ext cx="1443870" cy="676309"/>
+          </a:xfrm>
+          <a:prstGeom prst="rect">
+            <a:avLst/>
+          </a:prstGeom>
+        </p:spPr>
+        <p:txBody>
+          <a:bodyPr vert="horz" lIns="91440" tIns="45720" rIns="91440" bIns="45720" rtlCol="0" anchor="ctr"/>
+          <a:lstStyle>
+            <a:defPPr>
+              <a:defRPr lang="fr-FR"/>
+            </a:defPPr>
+            <a:lvl1pPr marL="0" algn="ctr" defTabSz="914400" rtl="0" eaLnBrk="1" latinLnBrk="0" hangingPunct="1">
+              <a:defRPr sz="1200" kern="1200">
+                <a:solidFill>
+                  <a:schemeClr val="tx1">
+                    <a:tint val="75000"/>
+                  </a:schemeClr>
+                </a:solidFill>
+                <a:latin typeface="+mn-lt"/>
+                <a:ea typeface="+mn-ea"/>
+                <a:cs typeface="+mn-cs"/>
+              </a:defRPr>
+            </a:lvl1pPr>
+            <a:lvl2pPr marL="457200" algn="l" defTabSz="914400" rtl="0" eaLnBrk="1" latinLnBrk="0" hangingPunct="1">
+              <a:defRPr sz="1800" kern="1200">
+                <a:solidFill>
+                  <a:schemeClr val="tx1"/>
+                </a:solidFill>
+                <a:latin typeface="+mn-lt"/>
+                <a:ea typeface="+mn-ea"/>
+                <a:cs typeface="+mn-cs"/>
+              </a:defRPr>
+            </a:lvl2pPr>
+            <a:lvl3pPr marL="914400" algn="l" defTabSz="914400" rtl="0" eaLnBrk="1" latinLnBrk="0" hangingPunct="1">
+              <a:defRPr sz="1800" kern="1200">
+                <a:solidFill>
+                  <a:schemeClr val="tx1"/>
+                </a:solidFill>
+                <a:latin typeface="+mn-lt"/>
+                <a:ea typeface="+mn-ea"/>
+                <a:cs typeface="+mn-cs"/>
+              </a:defRPr>
+            </a:lvl3pPr>
+            <a:lvl4pPr marL="1371600" algn="l" defTabSz="914400" rtl="0" eaLnBrk="1" latinLnBrk="0" hangingPunct="1">
+              <a:defRPr sz="1800" kern="1200">
+                <a:solidFill>
+                  <a:schemeClr val="tx1"/>
+                </a:solidFill>
+                <a:latin typeface="+mn-lt"/>
+                <a:ea typeface="+mn-ea"/>
+                <a:cs typeface="+mn-cs"/>
+              </a:defRPr>
+            </a:lvl4pPr>
+            <a:lvl5pPr marL="1828800" algn="l" defTabSz="914400" rtl="0" eaLnBrk="1" latinLnBrk="0" hangingPunct="1">
+              <a:defRPr sz="1800" kern="1200">
+                <a:solidFill>
+                  <a:schemeClr val="tx1"/>
+                </a:solidFill>
+                <a:latin typeface="+mn-lt"/>
+                <a:ea typeface="+mn-ea"/>
+                <a:cs typeface="+mn-cs"/>
+              </a:defRPr>
+            </a:lvl5pPr>
+            <a:lvl6pPr marL="2286000" algn="l" defTabSz="914400" rtl="0" eaLnBrk="1" latinLnBrk="0" hangingPunct="1">
+              <a:defRPr sz="1800" kern="1200">
+                <a:solidFill>
+                  <a:schemeClr val="tx1"/>
+                </a:solidFill>
+                <a:latin typeface="+mn-lt"/>
+                <a:ea typeface="+mn-ea"/>
+                <a:cs typeface="+mn-cs"/>
+              </a:defRPr>
+            </a:lvl6pPr>
+            <a:lvl7pPr marL="2743200" algn="l" defTabSz="914400" rtl="0" eaLnBrk="1" latinLnBrk="0" hangingPunct="1">
+              <a:defRPr sz="1800" kern="1200">
+                <a:solidFill>
+                  <a:schemeClr val="tx1"/>
+                </a:solidFill>
+                <a:latin typeface="+mn-lt"/>
+                <a:ea typeface="+mn-ea"/>
+                <a:cs typeface="+mn-cs"/>
+              </a:defRPr>
+            </a:lvl7pPr>
+            <a:lvl8pPr marL="3200400" algn="l" defTabSz="914400" rtl="0" eaLnBrk="1" latinLnBrk="0" hangingPunct="1">
+              <a:defRPr sz="1800" kern="1200">
+                <a:solidFill>
+                  <a:schemeClr val="tx1"/>
+                </a:solidFill>
+                <a:latin typeface="+mn-lt"/>
+                <a:ea typeface="+mn-ea"/>
+                <a:cs typeface="+mn-cs"/>
+              </a:defRPr>
+            </a:lvl8pPr>
+            <a:lvl9pPr marL="3657600" algn="l" defTabSz="914400" rtl="0" eaLnBrk="1" latinLnBrk="0" hangingPunct="1">
+              <a:defRPr sz="1800" kern="1200">
+                <a:solidFill>
+                  <a:schemeClr val="tx1"/>
+                </a:solidFill>
+                <a:latin typeface="+mn-lt"/>
+                <a:ea typeface="+mn-ea"/>
+                <a:cs typeface="+mn-cs"/>
+              </a:defRPr>
+            </a:lvl9pPr>
+          </a:lstStyle>
+          <a:p>
+            <a:r>
+              <a:rPr lang="fr-FR" i="1" u="sng" dirty="0"/>
+              <a:t>Présentation du Web Designer</a:t>
+            </a:r>
+            <a:endParaRPr lang="fr-FR" sz="1000" dirty="0"/>
+          </a:p>
+        </p:txBody>
+      </p:sp>
+      <p:sp>
+        <p:nvSpPr>
+          <p:cNvPr id="3" name="Espace réservé du pied de page 2">
+            <a:extLst>
+              <a:ext uri="{FF2B5EF4-FFF2-40B4-BE49-F238E27FC236}">
+                <a16:creationId xmlns:a16="http://schemas.microsoft.com/office/drawing/2014/main" id="{61E4F19E-299A-4DBC-BD43-2B3AA1581E7C}"/>
+              </a:ext>
+            </a:extLst>
+          </p:cNvPr>
+          <p:cNvSpPr>
+            <a:spLocks noGrp="1"/>
+          </p:cNvSpPr>
+          <p:nvPr>
+            <p:ph type="ftr" sz="quarter" idx="11"/>
+          </p:nvPr>
+        </p:nvSpPr>
+        <p:spPr/>
+        <p:txBody>
+          <a:bodyPr/>
+          <a:lstStyle/>
+          <a:p>
+            <a:r>
+              <a:rPr lang="fr-FR"/>
+              <a:t>V0.1</a:t>
+            </a:r>
+          </a:p>
+        </p:txBody>
+      </p:sp>
+    </p:spTree>
+    <p:extLst>
+      <p:ext uri="{BB962C8B-B14F-4D97-AF65-F5344CB8AC3E}">
+        <p14:creationId xmlns:p14="http://schemas.microsoft.com/office/powerpoint/2010/main" val="3231829592"/>
+      </p:ext>
+    </p:extLst>
+  </p:cSld>
+  <p:clrMapOvr>
+    <a:masterClrMapping/>
+  </p:clrMapOvr>
+  <mc:AlternateContent xmlns:mc="http://schemas.openxmlformats.org/markup-compatibility/2006" xmlns:p14="http://schemas.microsoft.com/office/powerpoint/2010/main">
+    <mc:Choice Requires="p14">
+      <p:transition spd="med" p14:dur="700">
+        <p:fade/>
+      </p:transition>
+    </mc:Choice>
+    <mc:Fallback xmlns="">
+      <p:transition spd="med">
+        <p:fade/>
+      </p:transition>
+    </mc:Fallback>
+  </mc:AlternateContent>
+</p:sld>
+</file>
+
+<file path=ppt/slides/slide24.xml><?xml version="1.0" encoding="utf-8"?>
+<p:sld xmlns:a="http://schemas.openxmlformats.org/drawingml/2006/main" xmlns:r="http://schemas.openxmlformats.org/officeDocument/2006/relationships" xmlns:p="http://schemas.openxmlformats.org/presentationml/2006/main">
+  <p:cSld>
+    <p:spTree>
+      <p:nvGrpSpPr>
+        <p:cNvPr id="1" name=""/>
+        <p:cNvGrpSpPr/>
+        <p:nvPr/>
+      </p:nvGrpSpPr>
+      <p:grpSpPr>
+        <a:xfrm>
+          <a:off x="0" y="0"/>
+          <a:ext cx="0" cy="0"/>
+          <a:chOff x="0" y="0"/>
+          <a:chExt cx="0" cy="0"/>
+        </a:xfrm>
+      </p:grpSpPr>
+      <p:sp>
+        <p:nvSpPr>
+          <p:cNvPr id="2" name="Titre 1"/>
+          <p:cNvSpPr>
+            <a:spLocks noGrp="1"/>
+          </p:cNvSpPr>
+          <p:nvPr>
+            <p:ph type="title"/>
+          </p:nvPr>
+        </p:nvSpPr>
+        <p:spPr>
+          <a:xfrm>
+            <a:off x="263118" y="781425"/>
+            <a:ext cx="5904656" cy="724942"/>
+          </a:xfrm>
+        </p:spPr>
+        <p:txBody>
+          <a:bodyPr>
+            <a:normAutofit/>
+          </a:bodyPr>
+          <a:lstStyle/>
+          <a:p>
+            <a:pPr algn="l"/>
+            <a:r>
+              <a:rPr lang="fr-FR" sz="3200" dirty="0"/>
+              <a:t>Styles</a:t>
+            </a:r>
+          </a:p>
+        </p:txBody>
+      </p:sp>
+      <p:cxnSp>
+        <p:nvCxnSpPr>
+          <p:cNvPr id="10" name="Connecteur droit 9"/>
+          <p:cNvCxnSpPr>
+            <a:cxnSpLocks/>
+          </p:cNvCxnSpPr>
+          <p:nvPr/>
+        </p:nvCxnSpPr>
+        <p:spPr>
+          <a:xfrm>
+            <a:off x="263118" y="1506367"/>
+            <a:ext cx="10709682" cy="0"/>
+          </a:xfrm>
+          <a:prstGeom prst="line">
+            <a:avLst/>
+          </a:prstGeom>
+          <a:ln w="19050">
+            <a:solidFill>
+              <a:schemeClr val="tx1"/>
+            </a:solidFill>
+          </a:ln>
+        </p:spPr>
+        <p:style>
+          <a:lnRef idx="1">
+            <a:schemeClr val="accent1"/>
+          </a:lnRef>
+          <a:fillRef idx="0">
+            <a:schemeClr val="accent1"/>
+          </a:fillRef>
+          <a:effectRef idx="0">
+            <a:schemeClr val="accent1"/>
+          </a:effectRef>
+          <a:fontRef idx="minor">
+            <a:schemeClr val="tx1"/>
+          </a:fontRef>
+        </p:style>
+      </p:cxnSp>
+      <p:sp>
+        <p:nvSpPr>
+          <p:cNvPr id="30" name="Espace réservé du contenu 2">
+            <a:extLst>
+              <a:ext uri="{FF2B5EF4-FFF2-40B4-BE49-F238E27FC236}">
+                <a16:creationId xmlns:a16="http://schemas.microsoft.com/office/drawing/2014/main" id="{17374925-2B5F-48B8-8155-9BB171EB9DDB}"/>
+              </a:ext>
+            </a:extLst>
+          </p:cNvPr>
+          <p:cNvSpPr>
+            <a:spLocks noGrp="1"/>
+          </p:cNvSpPr>
+          <p:nvPr>
+            <p:ph idx="1"/>
+          </p:nvPr>
+        </p:nvSpPr>
+        <p:spPr>
+          <a:xfrm>
+            <a:off x="263117" y="1725237"/>
+            <a:ext cx="11733713" cy="4631112"/>
+          </a:xfrm>
+        </p:spPr>
+        <p:txBody>
+          <a:bodyPr>
+            <a:normAutofit lnSpcReduction="10000"/>
+          </a:bodyPr>
+          <a:lstStyle/>
+          <a:p>
+            <a:r>
+              <a:rPr lang="fr-FR" sz="2400" dirty="0"/>
+              <a:t>Revenir à l’essence d’un style :</a:t>
+            </a:r>
+          </a:p>
+          <a:p>
+            <a:pPr marL="0" indent="0" algn="ctr">
+              <a:buNone/>
+            </a:pPr>
+            <a:r>
+              <a:rPr lang="fr-FR" sz="2400" dirty="0">
+                <a:solidFill>
+                  <a:srgbClr val="0070C0"/>
+                </a:solidFill>
+              </a:rPr>
+              <a:t>Regrouper</a:t>
+            </a:r>
+            <a:r>
+              <a:rPr lang="fr-FR" sz="2400" dirty="0"/>
+              <a:t> un </a:t>
+            </a:r>
+            <a:r>
+              <a:rPr lang="fr-FR" sz="2400" dirty="0">
+                <a:solidFill>
+                  <a:srgbClr val="0070C0"/>
+                </a:solidFill>
+              </a:rPr>
+              <a:t>ensemble cohérent </a:t>
+            </a:r>
+            <a:r>
+              <a:rPr lang="fr-FR" sz="2400" dirty="0"/>
+              <a:t>sous une </a:t>
+            </a:r>
+            <a:r>
+              <a:rPr lang="fr-FR" sz="2400" dirty="0">
+                <a:solidFill>
+                  <a:srgbClr val="0070C0"/>
+                </a:solidFill>
+              </a:rPr>
+              <a:t>même direction artistique</a:t>
+            </a:r>
+          </a:p>
+          <a:p>
+            <a:pPr marL="0" indent="0" algn="ctr">
+              <a:buNone/>
+            </a:pPr>
+            <a:r>
+              <a:rPr lang="fr-FR" sz="2400" dirty="0">
+                <a:solidFill>
+                  <a:srgbClr val="FF0000"/>
+                </a:solidFill>
+              </a:rPr>
+              <a:t>≠ mettre un style différent pour chaque élément !</a:t>
+            </a:r>
+            <a:endParaRPr lang="fr-FR" sz="2000" dirty="0"/>
+          </a:p>
+          <a:p>
+            <a:r>
+              <a:rPr lang="fr-FR" sz="2400" dirty="0"/>
+              <a:t>Revenir à la définition artistique ? </a:t>
+            </a:r>
+            <a:endParaRPr lang="fr-FR" sz="2000" dirty="0"/>
+          </a:p>
+          <a:p>
+            <a:endParaRPr lang="fr-FR" sz="2400" dirty="0"/>
+          </a:p>
+          <a:p>
+            <a:endParaRPr lang="fr-FR" sz="2400" dirty="0"/>
+          </a:p>
+          <a:p>
+            <a:r>
+              <a:rPr lang="fr-FR" sz="2400" dirty="0"/>
+              <a:t>Pistes :</a:t>
+            </a:r>
+          </a:p>
+          <a:p>
+            <a:pPr lvl="1"/>
+            <a:r>
+              <a:rPr lang="fr-FR" sz="2000" dirty="0"/>
+              <a:t>Mix entre CSS dans le HTML (personnalisé/</a:t>
+            </a:r>
+            <a:r>
+              <a:rPr lang="fr-FR" sz="2000" dirty="0" err="1"/>
+              <a:t>styleless</a:t>
+            </a:r>
+            <a:r>
+              <a:rPr lang="fr-FR" sz="2000" dirty="0"/>
+              <a:t>) et Style</a:t>
+            </a:r>
+          </a:p>
+          <a:p>
+            <a:pPr lvl="1"/>
+            <a:r>
+              <a:rPr lang="fr-FR" sz="2000" dirty="0"/>
+              <a:t>Créer des </a:t>
+            </a:r>
+            <a:r>
+              <a:rPr lang="fr-FR" sz="2000" dirty="0" err="1"/>
+              <a:t>superstyles</a:t>
+            </a:r>
+            <a:r>
+              <a:rPr lang="fr-FR" sz="2000" dirty="0"/>
+              <a:t> (des ensembles qui regroupent plusieurs styles CSS)</a:t>
+            </a:r>
+          </a:p>
+          <a:p>
+            <a:pPr lvl="2"/>
+            <a:r>
+              <a:rPr lang="fr-FR" sz="1600" dirty="0"/>
+              <a:t>Pour faire des palettes </a:t>
+            </a:r>
+          </a:p>
+          <a:p>
+            <a:pPr lvl="2"/>
+            <a:r>
+              <a:rPr lang="fr-FR" sz="1600" dirty="0"/>
+              <a:t>Pour faire des organisations riches (positionnements)</a:t>
+            </a:r>
+          </a:p>
+          <a:p>
+            <a:pPr lvl="2"/>
+            <a:r>
+              <a:rPr lang="fr-FR" sz="1600" dirty="0"/>
+              <a:t>Pour donner plus de sémantique/plus de modularité au projet</a:t>
+            </a:r>
+            <a:endParaRPr lang="fr-FR" sz="1200" dirty="0"/>
+          </a:p>
+          <a:p>
+            <a:endParaRPr lang="fr-FR" sz="2400" dirty="0"/>
+          </a:p>
+        </p:txBody>
+      </p:sp>
+      <p:sp>
+        <p:nvSpPr>
+          <p:cNvPr id="8" name="Espace réservé du numéro de diapositive 7">
+            <a:extLst>
+              <a:ext uri="{FF2B5EF4-FFF2-40B4-BE49-F238E27FC236}">
+                <a16:creationId xmlns:a16="http://schemas.microsoft.com/office/drawing/2014/main" id="{B8B2E558-E863-4B5B-959A-AB1349969143}"/>
+              </a:ext>
+            </a:extLst>
+          </p:cNvPr>
+          <p:cNvSpPr>
+            <a:spLocks noGrp="1"/>
+          </p:cNvSpPr>
+          <p:nvPr>
+            <p:ph type="sldNum" sz="quarter" idx="12"/>
+          </p:nvPr>
+        </p:nvSpPr>
+        <p:spPr/>
+        <p:txBody>
+          <a:bodyPr/>
+          <a:lstStyle/>
+          <a:p>
+            <a:fld id="{8BBF28A3-E1F2-408E-9BE0-DB29BF40A39D}" type="slidenum">
+              <a:rPr lang="fr-FR" smtClean="0"/>
+              <a:t>24</a:t>
+            </a:fld>
+            <a:endParaRPr lang="fr-FR"/>
+          </a:p>
+        </p:txBody>
+      </p:sp>
+      <p:sp>
+        <p:nvSpPr>
+          <p:cNvPr id="9" name="Espace réservé du pied de page 3">
+            <a:extLst>
+              <a:ext uri="{FF2B5EF4-FFF2-40B4-BE49-F238E27FC236}">
+                <a16:creationId xmlns:a16="http://schemas.microsoft.com/office/drawing/2014/main" id="{2CD2AF13-957F-4245-8516-C9776ADE7978}"/>
+              </a:ext>
+            </a:extLst>
+          </p:cNvPr>
+          <p:cNvSpPr txBox="1">
+            <a:spLocks/>
+          </p:cNvSpPr>
+          <p:nvPr/>
+        </p:nvSpPr>
+        <p:spPr>
+          <a:xfrm>
+            <a:off x="5445839" y="105090"/>
+            <a:ext cx="1443870" cy="676309"/>
+          </a:xfrm>
+          <a:prstGeom prst="rect">
+            <a:avLst/>
+          </a:prstGeom>
+        </p:spPr>
+        <p:txBody>
+          <a:bodyPr vert="horz" lIns="91440" tIns="45720" rIns="91440" bIns="45720" rtlCol="0" anchor="ctr"/>
+          <a:lstStyle>
+            <a:defPPr>
+              <a:defRPr lang="fr-FR"/>
+            </a:defPPr>
+            <a:lvl1pPr marL="0" algn="ctr" defTabSz="914400" rtl="0" eaLnBrk="1" latinLnBrk="0" hangingPunct="1">
+              <a:defRPr sz="1200" kern="1200">
+                <a:solidFill>
+                  <a:schemeClr val="tx1">
+                    <a:tint val="75000"/>
+                  </a:schemeClr>
+                </a:solidFill>
+                <a:latin typeface="+mn-lt"/>
+                <a:ea typeface="+mn-ea"/>
+                <a:cs typeface="+mn-cs"/>
+              </a:defRPr>
+            </a:lvl1pPr>
+            <a:lvl2pPr marL="457200" algn="l" defTabSz="914400" rtl="0" eaLnBrk="1" latinLnBrk="0" hangingPunct="1">
+              <a:defRPr sz="1800" kern="1200">
+                <a:solidFill>
+                  <a:schemeClr val="tx1"/>
+                </a:solidFill>
+                <a:latin typeface="+mn-lt"/>
+                <a:ea typeface="+mn-ea"/>
+                <a:cs typeface="+mn-cs"/>
+              </a:defRPr>
+            </a:lvl2pPr>
+            <a:lvl3pPr marL="914400" algn="l" defTabSz="914400" rtl="0" eaLnBrk="1" latinLnBrk="0" hangingPunct="1">
+              <a:defRPr sz="1800" kern="1200">
+                <a:solidFill>
+                  <a:schemeClr val="tx1"/>
+                </a:solidFill>
+                <a:latin typeface="+mn-lt"/>
+                <a:ea typeface="+mn-ea"/>
+                <a:cs typeface="+mn-cs"/>
+              </a:defRPr>
+            </a:lvl3pPr>
+            <a:lvl4pPr marL="1371600" algn="l" defTabSz="914400" rtl="0" eaLnBrk="1" latinLnBrk="0" hangingPunct="1">
+              <a:defRPr sz="1800" kern="1200">
+                <a:solidFill>
+                  <a:schemeClr val="tx1"/>
+                </a:solidFill>
+                <a:latin typeface="+mn-lt"/>
+                <a:ea typeface="+mn-ea"/>
+                <a:cs typeface="+mn-cs"/>
+              </a:defRPr>
+            </a:lvl4pPr>
+            <a:lvl5pPr marL="1828800" algn="l" defTabSz="914400" rtl="0" eaLnBrk="1" latinLnBrk="0" hangingPunct="1">
+              <a:defRPr sz="1800" kern="1200">
+                <a:solidFill>
+                  <a:schemeClr val="tx1"/>
+                </a:solidFill>
+                <a:latin typeface="+mn-lt"/>
+                <a:ea typeface="+mn-ea"/>
+                <a:cs typeface="+mn-cs"/>
+              </a:defRPr>
+            </a:lvl5pPr>
+            <a:lvl6pPr marL="2286000" algn="l" defTabSz="914400" rtl="0" eaLnBrk="1" latinLnBrk="0" hangingPunct="1">
+              <a:defRPr sz="1800" kern="1200">
+                <a:solidFill>
+                  <a:schemeClr val="tx1"/>
+                </a:solidFill>
+                <a:latin typeface="+mn-lt"/>
+                <a:ea typeface="+mn-ea"/>
+                <a:cs typeface="+mn-cs"/>
+              </a:defRPr>
+            </a:lvl6pPr>
+            <a:lvl7pPr marL="2743200" algn="l" defTabSz="914400" rtl="0" eaLnBrk="1" latinLnBrk="0" hangingPunct="1">
+              <a:defRPr sz="1800" kern="1200">
+                <a:solidFill>
+                  <a:schemeClr val="tx1"/>
+                </a:solidFill>
+                <a:latin typeface="+mn-lt"/>
+                <a:ea typeface="+mn-ea"/>
+                <a:cs typeface="+mn-cs"/>
+              </a:defRPr>
+            </a:lvl7pPr>
+            <a:lvl8pPr marL="3200400" algn="l" defTabSz="914400" rtl="0" eaLnBrk="1" latinLnBrk="0" hangingPunct="1">
+              <a:defRPr sz="1800" kern="1200">
+                <a:solidFill>
+                  <a:schemeClr val="tx1"/>
+                </a:solidFill>
+                <a:latin typeface="+mn-lt"/>
+                <a:ea typeface="+mn-ea"/>
+                <a:cs typeface="+mn-cs"/>
+              </a:defRPr>
+            </a:lvl8pPr>
+            <a:lvl9pPr marL="3657600" algn="l" defTabSz="914400" rtl="0" eaLnBrk="1" latinLnBrk="0" hangingPunct="1">
+              <a:defRPr sz="1800" kern="1200">
+                <a:solidFill>
+                  <a:schemeClr val="tx1"/>
+                </a:solidFill>
+                <a:latin typeface="+mn-lt"/>
+                <a:ea typeface="+mn-ea"/>
+                <a:cs typeface="+mn-cs"/>
+              </a:defRPr>
+            </a:lvl9pPr>
+          </a:lstStyle>
+          <a:p>
+            <a:r>
+              <a:rPr lang="fr-FR" i="1" u="sng" dirty="0"/>
+              <a:t>Présentation du Web Designer</a:t>
+            </a:r>
+            <a:endParaRPr lang="fr-FR" sz="1000" dirty="0"/>
+          </a:p>
+        </p:txBody>
+      </p:sp>
+      <p:sp>
+        <p:nvSpPr>
+          <p:cNvPr id="3" name="Espace réservé du pied de page 2">
+            <a:extLst>
+              <a:ext uri="{FF2B5EF4-FFF2-40B4-BE49-F238E27FC236}">
+                <a16:creationId xmlns:a16="http://schemas.microsoft.com/office/drawing/2014/main" id="{E3F8CFDB-5067-4D8D-A24C-068EAC0EA5D5}"/>
+              </a:ext>
+            </a:extLst>
+          </p:cNvPr>
+          <p:cNvSpPr>
+            <a:spLocks noGrp="1"/>
+          </p:cNvSpPr>
+          <p:nvPr>
+            <p:ph type="ftr" sz="quarter" idx="11"/>
+          </p:nvPr>
+        </p:nvSpPr>
+        <p:spPr/>
+        <p:txBody>
+          <a:bodyPr/>
+          <a:lstStyle/>
+          <a:p>
+            <a:r>
+              <a:rPr lang="fr-FR"/>
+              <a:t>V0.1</a:t>
+            </a:r>
+          </a:p>
+        </p:txBody>
+      </p:sp>
+      <p:pic>
+        <p:nvPicPr>
+          <p:cNvPr id="5" name="Image 4">
+            <a:extLst>
+              <a:ext uri="{FF2B5EF4-FFF2-40B4-BE49-F238E27FC236}">
+                <a16:creationId xmlns:a16="http://schemas.microsoft.com/office/drawing/2014/main" id="{90AB5946-3D24-444A-8AB4-275C260A4E1F}"/>
+              </a:ext>
+            </a:extLst>
+          </p:cNvPr>
+          <p:cNvPicPr>
+            <a:picLocks noChangeAspect="1"/>
+          </p:cNvPicPr>
+          <p:nvPr/>
+        </p:nvPicPr>
+        <p:blipFill rotWithShape="1">
+          <a:blip r:embed="rId3"/>
+          <a:srcRect r="1600"/>
+          <a:stretch/>
+        </p:blipFill>
+        <p:spPr>
+          <a:xfrm>
+            <a:off x="1205949" y="3305229"/>
+            <a:ext cx="9111069" cy="875971"/>
+          </a:xfrm>
+          <a:prstGeom prst="rect">
+            <a:avLst/>
+          </a:prstGeom>
+        </p:spPr>
+      </p:pic>
+    </p:spTree>
+    <p:extLst>
+      <p:ext uri="{BB962C8B-B14F-4D97-AF65-F5344CB8AC3E}">
+        <p14:creationId xmlns:p14="http://schemas.microsoft.com/office/powerpoint/2010/main" val="1235605715"/>
+      </p:ext>
+    </p:extLst>
+  </p:cSld>
+  <p:clrMapOvr>
+    <a:masterClrMapping/>
+  </p:clrMapOvr>
+  <mc:AlternateContent xmlns:mc="http://schemas.openxmlformats.org/markup-compatibility/2006" xmlns:p14="http://schemas.microsoft.com/office/powerpoint/2010/main">
+    <mc:Choice Requires="p14">
+      <p:transition spd="med" p14:dur="700">
+        <p:fade/>
+      </p:transition>
+    </mc:Choice>
+    <mc:Fallback xmlns="">
+      <p:transition spd="med">
+        <p:fade/>
+      </p:transition>
+    </mc:Fallback>
+  </mc:AlternateContent>
+</p:sld>
+</file>
+
+<file path=ppt/slides/slide25.xml><?xml version="1.0" encoding="utf-8"?>
+<p:sld xmlns:a="http://schemas.openxmlformats.org/drawingml/2006/main" xmlns:r="http://schemas.openxmlformats.org/officeDocument/2006/relationships" xmlns:p="http://schemas.openxmlformats.org/presentationml/2006/main">
+  <p:cSld>
+    <p:spTree>
+      <p:nvGrpSpPr>
+        <p:cNvPr id="1" name=""/>
+        <p:cNvGrpSpPr/>
+        <p:nvPr/>
+      </p:nvGrpSpPr>
+      <p:grpSpPr>
+        <a:xfrm>
+          <a:off x="0" y="0"/>
+          <a:ext cx="0" cy="0"/>
+          <a:chOff x="0" y="0"/>
+          <a:chExt cx="0" cy="0"/>
+        </a:xfrm>
+      </p:grpSpPr>
+      <p:sp>
+        <p:nvSpPr>
+          <p:cNvPr id="2" name="Titre 1"/>
+          <p:cNvSpPr>
+            <a:spLocks noGrp="1"/>
+          </p:cNvSpPr>
+          <p:nvPr>
+            <p:ph type="title"/>
+          </p:nvPr>
+        </p:nvSpPr>
+        <p:spPr>
+          <a:xfrm>
+            <a:off x="263118" y="781425"/>
+            <a:ext cx="5904656" cy="724942"/>
+          </a:xfrm>
+        </p:spPr>
+        <p:txBody>
+          <a:bodyPr>
+            <a:normAutofit/>
+          </a:bodyPr>
+          <a:lstStyle/>
+          <a:p>
+            <a:pPr algn="l"/>
+            <a:r>
+              <a:rPr lang="fr-FR" sz="3200" dirty="0" err="1"/>
+              <a:t>Superstyles</a:t>
+            </a:r>
+            <a:endParaRPr lang="fr-FR" sz="3200" dirty="0"/>
+          </a:p>
+        </p:txBody>
+      </p:sp>
+      <p:cxnSp>
+        <p:nvCxnSpPr>
+          <p:cNvPr id="10" name="Connecteur droit 9"/>
+          <p:cNvCxnSpPr>
+            <a:cxnSpLocks/>
+          </p:cNvCxnSpPr>
+          <p:nvPr/>
+        </p:nvCxnSpPr>
+        <p:spPr>
+          <a:xfrm>
+            <a:off x="263118" y="1506367"/>
+            <a:ext cx="10709682" cy="0"/>
+          </a:xfrm>
+          <a:prstGeom prst="line">
+            <a:avLst/>
+          </a:prstGeom>
+          <a:ln w="19050">
+            <a:solidFill>
+              <a:schemeClr val="tx1"/>
+            </a:solidFill>
+          </a:ln>
+        </p:spPr>
+        <p:style>
+          <a:lnRef idx="1">
+            <a:schemeClr val="accent1"/>
+          </a:lnRef>
+          <a:fillRef idx="0">
+            <a:schemeClr val="accent1"/>
+          </a:fillRef>
+          <a:effectRef idx="0">
+            <a:schemeClr val="accent1"/>
+          </a:effectRef>
+          <a:fontRef idx="minor">
+            <a:schemeClr val="tx1"/>
+          </a:fontRef>
+        </p:style>
+      </p:cxnSp>
+      <p:sp>
+        <p:nvSpPr>
+          <p:cNvPr id="30" name="Espace réservé du contenu 2">
+            <a:extLst>
+              <a:ext uri="{FF2B5EF4-FFF2-40B4-BE49-F238E27FC236}">
+                <a16:creationId xmlns:a16="http://schemas.microsoft.com/office/drawing/2014/main" id="{17374925-2B5F-48B8-8155-9BB171EB9DDB}"/>
+              </a:ext>
+            </a:extLst>
+          </p:cNvPr>
+          <p:cNvSpPr>
+            <a:spLocks noGrp="1"/>
+          </p:cNvSpPr>
+          <p:nvPr>
+            <p:ph idx="1"/>
+          </p:nvPr>
+        </p:nvSpPr>
+        <p:spPr>
+          <a:xfrm>
+            <a:off x="263117" y="1725237"/>
+            <a:ext cx="11733713" cy="4631112"/>
+          </a:xfrm>
+        </p:spPr>
+        <p:txBody>
+          <a:bodyPr>
+            <a:normAutofit/>
+          </a:bodyPr>
+          <a:lstStyle/>
+          <a:p>
+            <a:r>
+              <a:rPr lang="fr-FR" sz="2400" dirty="0"/>
+              <a:t>Souvent dans le design les styles ne sont pas isolés mais ont un lien fort entre eux :</a:t>
+            </a:r>
+          </a:p>
+          <a:p>
+            <a:pPr marL="0" indent="0" algn="ctr">
+              <a:buNone/>
+            </a:pPr>
+            <a:r>
+              <a:rPr lang="fr-FR" sz="2400" dirty="0"/>
+              <a:t>Un « </a:t>
+            </a:r>
+            <a:r>
+              <a:rPr lang="fr-FR" sz="2400" dirty="0" err="1">
+                <a:solidFill>
+                  <a:srgbClr val="0070C0"/>
+                </a:solidFill>
+              </a:rPr>
+              <a:t>Superstyle</a:t>
+            </a:r>
+            <a:r>
+              <a:rPr lang="fr-FR" sz="2400" dirty="0"/>
+              <a:t> » est un ensemble/une </a:t>
+            </a:r>
+            <a:r>
+              <a:rPr lang="fr-FR" sz="2400" dirty="0">
+                <a:solidFill>
+                  <a:srgbClr val="0070C0"/>
+                </a:solidFill>
+              </a:rPr>
+              <a:t>composante cohérent(e) d’un design</a:t>
+            </a:r>
+          </a:p>
+          <a:p>
+            <a:pPr marL="0" indent="0">
+              <a:buNone/>
+            </a:pPr>
+            <a:endParaRPr lang="fr-FR" sz="2400" dirty="0"/>
+          </a:p>
+          <a:p>
+            <a:pPr lvl="1"/>
+            <a:endParaRPr lang="fr-FR" sz="2000" dirty="0"/>
+          </a:p>
+          <a:p>
+            <a:pPr lvl="1"/>
+            <a:r>
+              <a:rPr lang="fr-FR" sz="2000" dirty="0"/>
+              <a:t>Palette de couleurs pour un designer</a:t>
+            </a:r>
+          </a:p>
+          <a:p>
+            <a:pPr lvl="1"/>
+            <a:endParaRPr lang="fr-FR" sz="2000" dirty="0"/>
+          </a:p>
+          <a:p>
+            <a:pPr lvl="1"/>
+            <a:endParaRPr lang="fr-FR" sz="2000" dirty="0"/>
+          </a:p>
+          <a:p>
+            <a:pPr lvl="1"/>
+            <a:endParaRPr lang="fr-FR" sz="2000" dirty="0"/>
+          </a:p>
+          <a:p>
+            <a:pPr lvl="1"/>
+            <a:r>
+              <a:rPr lang="fr-FR" sz="2000" dirty="0"/>
+              <a:t>Organisation générale des informations</a:t>
+            </a:r>
+          </a:p>
+          <a:p>
+            <a:pPr lvl="2"/>
+            <a:r>
+              <a:rPr lang="fr-FR" sz="1600" dirty="0"/>
+              <a:t>Avoir un style épuré</a:t>
+            </a:r>
+          </a:p>
+          <a:p>
+            <a:pPr lvl="2"/>
+            <a:r>
+              <a:rPr lang="fr-FR" sz="1600" dirty="0"/>
+              <a:t>Avoir un style informatif</a:t>
+            </a:r>
+          </a:p>
+          <a:p>
+            <a:pPr lvl="2"/>
+            <a:r>
+              <a:rPr lang="fr-FR" sz="1600" dirty="0"/>
+              <a:t>Etc. </a:t>
+            </a:r>
+          </a:p>
+          <a:p>
+            <a:pPr lvl="1"/>
+            <a:endParaRPr lang="fr-FR" sz="2000" dirty="0"/>
+          </a:p>
+        </p:txBody>
+      </p:sp>
+      <p:sp>
+        <p:nvSpPr>
+          <p:cNvPr id="8" name="Espace réservé du numéro de diapositive 7">
+            <a:extLst>
+              <a:ext uri="{FF2B5EF4-FFF2-40B4-BE49-F238E27FC236}">
+                <a16:creationId xmlns:a16="http://schemas.microsoft.com/office/drawing/2014/main" id="{B8B2E558-E863-4B5B-959A-AB1349969143}"/>
+              </a:ext>
+            </a:extLst>
+          </p:cNvPr>
+          <p:cNvSpPr>
+            <a:spLocks noGrp="1"/>
+          </p:cNvSpPr>
+          <p:nvPr>
+            <p:ph type="sldNum" sz="quarter" idx="12"/>
+          </p:nvPr>
+        </p:nvSpPr>
+        <p:spPr/>
+        <p:txBody>
+          <a:bodyPr/>
+          <a:lstStyle/>
+          <a:p>
+            <a:fld id="{8BBF28A3-E1F2-408E-9BE0-DB29BF40A39D}" type="slidenum">
+              <a:rPr lang="fr-FR" smtClean="0"/>
+              <a:t>25</a:t>
+            </a:fld>
+            <a:endParaRPr lang="fr-FR"/>
+          </a:p>
+        </p:txBody>
+      </p:sp>
+      <p:sp>
+        <p:nvSpPr>
+          <p:cNvPr id="9" name="Espace réservé du pied de page 3">
+            <a:extLst>
+              <a:ext uri="{FF2B5EF4-FFF2-40B4-BE49-F238E27FC236}">
+                <a16:creationId xmlns:a16="http://schemas.microsoft.com/office/drawing/2014/main" id="{2CD2AF13-957F-4245-8516-C9776ADE7978}"/>
+              </a:ext>
+            </a:extLst>
+          </p:cNvPr>
+          <p:cNvSpPr txBox="1">
+            <a:spLocks/>
+          </p:cNvSpPr>
+          <p:nvPr/>
+        </p:nvSpPr>
+        <p:spPr>
+          <a:xfrm>
+            <a:off x="5445839" y="105090"/>
+            <a:ext cx="1443870" cy="676309"/>
+          </a:xfrm>
+          <a:prstGeom prst="rect">
+            <a:avLst/>
+          </a:prstGeom>
+        </p:spPr>
+        <p:txBody>
+          <a:bodyPr vert="horz" lIns="91440" tIns="45720" rIns="91440" bIns="45720" rtlCol="0" anchor="ctr"/>
+          <a:lstStyle>
+            <a:defPPr>
+              <a:defRPr lang="fr-FR"/>
+            </a:defPPr>
+            <a:lvl1pPr marL="0" algn="ctr" defTabSz="914400" rtl="0" eaLnBrk="1" latinLnBrk="0" hangingPunct="1">
+              <a:defRPr sz="1200" kern="1200">
+                <a:solidFill>
+                  <a:schemeClr val="tx1">
+                    <a:tint val="75000"/>
+                  </a:schemeClr>
+                </a:solidFill>
+                <a:latin typeface="+mn-lt"/>
+                <a:ea typeface="+mn-ea"/>
+                <a:cs typeface="+mn-cs"/>
+              </a:defRPr>
+            </a:lvl1pPr>
+            <a:lvl2pPr marL="457200" algn="l" defTabSz="914400" rtl="0" eaLnBrk="1" latinLnBrk="0" hangingPunct="1">
+              <a:defRPr sz="1800" kern="1200">
+                <a:solidFill>
+                  <a:schemeClr val="tx1"/>
+                </a:solidFill>
+                <a:latin typeface="+mn-lt"/>
+                <a:ea typeface="+mn-ea"/>
+                <a:cs typeface="+mn-cs"/>
+              </a:defRPr>
+            </a:lvl2pPr>
+            <a:lvl3pPr marL="914400" algn="l" defTabSz="914400" rtl="0" eaLnBrk="1" latinLnBrk="0" hangingPunct="1">
+              <a:defRPr sz="1800" kern="1200">
+                <a:solidFill>
+                  <a:schemeClr val="tx1"/>
+                </a:solidFill>
+                <a:latin typeface="+mn-lt"/>
+                <a:ea typeface="+mn-ea"/>
+                <a:cs typeface="+mn-cs"/>
+              </a:defRPr>
+            </a:lvl3pPr>
+            <a:lvl4pPr marL="1371600" algn="l" defTabSz="914400" rtl="0" eaLnBrk="1" latinLnBrk="0" hangingPunct="1">
+              <a:defRPr sz="1800" kern="1200">
+                <a:solidFill>
+                  <a:schemeClr val="tx1"/>
+                </a:solidFill>
+                <a:latin typeface="+mn-lt"/>
+                <a:ea typeface="+mn-ea"/>
+                <a:cs typeface="+mn-cs"/>
+              </a:defRPr>
+            </a:lvl4pPr>
+            <a:lvl5pPr marL="1828800" algn="l" defTabSz="914400" rtl="0" eaLnBrk="1" latinLnBrk="0" hangingPunct="1">
+              <a:defRPr sz="1800" kern="1200">
+                <a:solidFill>
+                  <a:schemeClr val="tx1"/>
+                </a:solidFill>
+                <a:latin typeface="+mn-lt"/>
+                <a:ea typeface="+mn-ea"/>
+                <a:cs typeface="+mn-cs"/>
+              </a:defRPr>
+            </a:lvl5pPr>
+            <a:lvl6pPr marL="2286000" algn="l" defTabSz="914400" rtl="0" eaLnBrk="1" latinLnBrk="0" hangingPunct="1">
+              <a:defRPr sz="1800" kern="1200">
+                <a:solidFill>
+                  <a:schemeClr val="tx1"/>
+                </a:solidFill>
+                <a:latin typeface="+mn-lt"/>
+                <a:ea typeface="+mn-ea"/>
+                <a:cs typeface="+mn-cs"/>
+              </a:defRPr>
+            </a:lvl6pPr>
+            <a:lvl7pPr marL="2743200" algn="l" defTabSz="914400" rtl="0" eaLnBrk="1" latinLnBrk="0" hangingPunct="1">
+              <a:defRPr sz="1800" kern="1200">
+                <a:solidFill>
+                  <a:schemeClr val="tx1"/>
+                </a:solidFill>
+                <a:latin typeface="+mn-lt"/>
+                <a:ea typeface="+mn-ea"/>
+                <a:cs typeface="+mn-cs"/>
+              </a:defRPr>
+            </a:lvl7pPr>
+            <a:lvl8pPr marL="3200400" algn="l" defTabSz="914400" rtl="0" eaLnBrk="1" latinLnBrk="0" hangingPunct="1">
+              <a:defRPr sz="1800" kern="1200">
+                <a:solidFill>
+                  <a:schemeClr val="tx1"/>
+                </a:solidFill>
+                <a:latin typeface="+mn-lt"/>
+                <a:ea typeface="+mn-ea"/>
+                <a:cs typeface="+mn-cs"/>
+              </a:defRPr>
+            </a:lvl8pPr>
+            <a:lvl9pPr marL="3657600" algn="l" defTabSz="914400" rtl="0" eaLnBrk="1" latinLnBrk="0" hangingPunct="1">
+              <a:defRPr sz="1800" kern="1200">
+                <a:solidFill>
+                  <a:schemeClr val="tx1"/>
+                </a:solidFill>
+                <a:latin typeface="+mn-lt"/>
+                <a:ea typeface="+mn-ea"/>
+                <a:cs typeface="+mn-cs"/>
+              </a:defRPr>
+            </a:lvl9pPr>
+          </a:lstStyle>
+          <a:p>
+            <a:r>
+              <a:rPr lang="fr-FR" i="1" u="sng" dirty="0"/>
+              <a:t>Présentation du Web Designer</a:t>
+            </a:r>
+            <a:endParaRPr lang="fr-FR" sz="1000" dirty="0"/>
+          </a:p>
+        </p:txBody>
+      </p:sp>
+      <p:sp>
+        <p:nvSpPr>
+          <p:cNvPr id="3" name="Espace réservé du pied de page 2">
+            <a:extLst>
+              <a:ext uri="{FF2B5EF4-FFF2-40B4-BE49-F238E27FC236}">
+                <a16:creationId xmlns:a16="http://schemas.microsoft.com/office/drawing/2014/main" id="{E3F8CFDB-5067-4D8D-A24C-068EAC0EA5D5}"/>
+              </a:ext>
+            </a:extLst>
+          </p:cNvPr>
+          <p:cNvSpPr>
+            <a:spLocks noGrp="1"/>
+          </p:cNvSpPr>
+          <p:nvPr>
+            <p:ph type="ftr" sz="quarter" idx="11"/>
+          </p:nvPr>
+        </p:nvSpPr>
+        <p:spPr/>
+        <p:txBody>
+          <a:bodyPr/>
+          <a:lstStyle/>
+          <a:p>
+            <a:r>
+              <a:rPr lang="fr-FR"/>
+              <a:t>V0.1</a:t>
+            </a:r>
+          </a:p>
+        </p:txBody>
+      </p:sp>
+      <p:pic>
+        <p:nvPicPr>
+          <p:cNvPr id="5" name="Image 4">
+            <a:extLst>
+              <a:ext uri="{FF2B5EF4-FFF2-40B4-BE49-F238E27FC236}">
+                <a16:creationId xmlns:a16="http://schemas.microsoft.com/office/drawing/2014/main" id="{9F69DD28-09E0-405B-8721-157FE934524F}"/>
+              </a:ext>
+            </a:extLst>
+          </p:cNvPr>
+          <p:cNvPicPr>
+            <a:picLocks noChangeAspect="1"/>
+          </p:cNvPicPr>
+          <p:nvPr/>
+        </p:nvPicPr>
+        <p:blipFill>
+          <a:blip r:embed="rId3"/>
+          <a:stretch>
+            <a:fillRect/>
+          </a:stretch>
+        </p:blipFill>
+        <p:spPr>
+          <a:xfrm>
+            <a:off x="5850123" y="2983229"/>
+            <a:ext cx="2635600" cy="1634836"/>
+          </a:xfrm>
+          <a:prstGeom prst="rect">
+            <a:avLst/>
+          </a:prstGeom>
+        </p:spPr>
+      </p:pic>
+    </p:spTree>
+    <p:extLst>
+      <p:ext uri="{BB962C8B-B14F-4D97-AF65-F5344CB8AC3E}">
+        <p14:creationId xmlns:p14="http://schemas.microsoft.com/office/powerpoint/2010/main" val="4248321424"/>
+      </p:ext>
+    </p:extLst>
+  </p:cSld>
+  <p:clrMapOvr>
+    <a:masterClrMapping/>
+  </p:clrMapOvr>
+  <mc:AlternateContent xmlns:mc="http://schemas.openxmlformats.org/markup-compatibility/2006" xmlns:p14="http://schemas.microsoft.com/office/powerpoint/2010/main">
+    <mc:Choice Requires="p14">
+      <p:transition spd="med" p14:dur="700">
+        <p:fade/>
+      </p:transition>
+    </mc:Choice>
+    <mc:Fallback xmlns="">
+      <p:transition spd="med">
+        <p:fade/>
+      </p:transition>
+    </mc:Fallback>
+  </mc:AlternateContent>
+</p:sld>
+</file>
+
+<file path=ppt/slides/slide26.xml><?xml version="1.0" encoding="utf-8"?>
+<p:sld xmlns:a="http://schemas.openxmlformats.org/drawingml/2006/main" xmlns:r="http://schemas.openxmlformats.org/officeDocument/2006/relationships" xmlns:p="http://schemas.openxmlformats.org/presentationml/2006/main">
+  <p:cSld>
+    <p:spTree>
+      <p:nvGrpSpPr>
+        <p:cNvPr id="1" name=""/>
+        <p:cNvGrpSpPr/>
+        <p:nvPr/>
+      </p:nvGrpSpPr>
+      <p:grpSpPr>
+        <a:xfrm>
+          <a:off x="0" y="0"/>
+          <a:ext cx="0" cy="0"/>
+          <a:chOff x="0" y="0"/>
+          <a:chExt cx="0" cy="0"/>
+        </a:xfrm>
+      </p:grpSpPr>
+      <p:sp>
+        <p:nvSpPr>
+          <p:cNvPr id="2" name="Titre 1"/>
+          <p:cNvSpPr>
+            <a:spLocks noGrp="1"/>
+          </p:cNvSpPr>
+          <p:nvPr>
+            <p:ph type="title"/>
+          </p:nvPr>
+        </p:nvSpPr>
+        <p:spPr>
+          <a:xfrm>
+            <a:off x="263118" y="781425"/>
+            <a:ext cx="5904656" cy="724942"/>
+          </a:xfrm>
+        </p:spPr>
+        <p:txBody>
+          <a:bodyPr>
+            <a:normAutofit/>
+          </a:bodyPr>
+          <a:lstStyle/>
+          <a:p>
+            <a:pPr algn="l"/>
+            <a:r>
+              <a:rPr lang="fr-FR" sz="3200" dirty="0"/>
+              <a:t>Enregistrement d’un « Design »</a:t>
+            </a:r>
+          </a:p>
+        </p:txBody>
+      </p:sp>
+      <p:cxnSp>
+        <p:nvCxnSpPr>
+          <p:cNvPr id="10" name="Connecteur droit 9"/>
+          <p:cNvCxnSpPr>
+            <a:cxnSpLocks/>
+          </p:cNvCxnSpPr>
+          <p:nvPr/>
+        </p:nvCxnSpPr>
+        <p:spPr>
+          <a:xfrm>
+            <a:off x="263118" y="1506367"/>
+            <a:ext cx="10709682" cy="0"/>
+          </a:xfrm>
+          <a:prstGeom prst="line">
+            <a:avLst/>
+          </a:prstGeom>
+          <a:ln w="19050">
+            <a:solidFill>
+              <a:schemeClr val="tx1"/>
+            </a:solidFill>
+          </a:ln>
+        </p:spPr>
+        <p:style>
+          <a:lnRef idx="1">
+            <a:schemeClr val="accent1"/>
+          </a:lnRef>
+          <a:fillRef idx="0">
+            <a:schemeClr val="accent1"/>
+          </a:fillRef>
+          <a:effectRef idx="0">
+            <a:schemeClr val="accent1"/>
+          </a:effectRef>
+          <a:fontRef idx="minor">
+            <a:schemeClr val="tx1"/>
+          </a:fontRef>
+        </p:style>
+      </p:cxnSp>
+      <p:sp>
+        <p:nvSpPr>
+          <p:cNvPr id="30" name="Espace réservé du contenu 2">
+            <a:extLst>
+              <a:ext uri="{FF2B5EF4-FFF2-40B4-BE49-F238E27FC236}">
+                <a16:creationId xmlns:a16="http://schemas.microsoft.com/office/drawing/2014/main" id="{17374925-2B5F-48B8-8155-9BB171EB9DDB}"/>
+              </a:ext>
+            </a:extLst>
+          </p:cNvPr>
+          <p:cNvSpPr>
+            <a:spLocks noGrp="1"/>
+          </p:cNvSpPr>
+          <p:nvPr>
+            <p:ph idx="1"/>
+          </p:nvPr>
+        </p:nvSpPr>
+        <p:spPr>
+          <a:xfrm>
+            <a:off x="263117" y="1725237"/>
+            <a:ext cx="11733713" cy="4631112"/>
+          </a:xfrm>
+        </p:spPr>
+        <p:txBody>
+          <a:bodyPr>
+            <a:normAutofit/>
+          </a:bodyPr>
+          <a:lstStyle/>
+          <a:p>
+            <a:r>
+              <a:rPr lang="fr-FR" sz="2400" dirty="0"/>
+              <a:t>Un « </a:t>
+            </a:r>
+            <a:r>
+              <a:rPr lang="fr-FR" sz="2400" dirty="0">
+                <a:solidFill>
+                  <a:srgbClr val="0070C0"/>
+                </a:solidFill>
+              </a:rPr>
+              <a:t>Design</a:t>
+            </a:r>
+            <a:r>
+              <a:rPr lang="fr-FR" sz="2400" dirty="0"/>
+              <a:t> » = </a:t>
+            </a:r>
+            <a:r>
+              <a:rPr lang="fr-FR" sz="2400" dirty="0">
+                <a:solidFill>
+                  <a:srgbClr val="0070C0"/>
+                </a:solidFill>
+              </a:rPr>
+              <a:t>ensemble des composantes artistiques</a:t>
+            </a:r>
+            <a:r>
+              <a:rPr lang="fr-FR" sz="2400" dirty="0"/>
+              <a:t> du site </a:t>
+            </a:r>
+          </a:p>
+          <a:p>
+            <a:pPr lvl="1"/>
+            <a:r>
+              <a:rPr lang="fr-FR" sz="2000" dirty="0"/>
+              <a:t>Couleur, placement, etc.</a:t>
+            </a:r>
+          </a:p>
+          <a:p>
+            <a:pPr lvl="1"/>
+            <a:r>
+              <a:rPr lang="fr-FR" sz="2000" dirty="0"/>
+              <a:t>Travail indépendant du contenu</a:t>
+            </a:r>
+          </a:p>
+          <a:p>
+            <a:pPr lvl="1"/>
+            <a:endParaRPr lang="fr-FR" sz="2000" dirty="0"/>
+          </a:p>
+          <a:p>
+            <a:r>
+              <a:rPr lang="fr-FR" sz="2400" dirty="0"/>
+              <a:t>Faire des </a:t>
+            </a:r>
+            <a:r>
+              <a:rPr lang="fr-FR" sz="2400" dirty="0" err="1"/>
+              <a:t>preset</a:t>
+            </a:r>
+            <a:r>
+              <a:rPr lang="fr-FR" sz="2400" dirty="0"/>
+              <a:t> de </a:t>
+            </a:r>
+            <a:r>
+              <a:rPr lang="fr-FR" sz="2400" dirty="0" err="1"/>
+              <a:t>superstyles</a:t>
+            </a:r>
+            <a:r>
+              <a:rPr lang="fr-FR" sz="2400" dirty="0"/>
+              <a:t> ?</a:t>
+            </a:r>
+          </a:p>
+          <a:p>
+            <a:pPr lvl="1"/>
+            <a:r>
+              <a:rPr lang="fr-FR" sz="2000" dirty="0">
+                <a:solidFill>
+                  <a:srgbClr val="0070C0"/>
+                </a:solidFill>
+              </a:rPr>
+              <a:t>Combiner</a:t>
+            </a:r>
+            <a:r>
+              <a:rPr lang="fr-FR" sz="2000" dirty="0"/>
+              <a:t> l’ensemble des </a:t>
+            </a:r>
+            <a:r>
+              <a:rPr lang="fr-FR" sz="2000" dirty="0">
+                <a:solidFill>
+                  <a:srgbClr val="0070C0"/>
+                </a:solidFill>
+              </a:rPr>
+              <a:t>composantes stylistiques </a:t>
+            </a:r>
+            <a:r>
+              <a:rPr lang="fr-FR" sz="2000" dirty="0"/>
+              <a:t>sous un seul </a:t>
+            </a:r>
+            <a:r>
+              <a:rPr lang="fr-FR" sz="2000" dirty="0" err="1"/>
+              <a:t>preset</a:t>
+            </a:r>
+            <a:r>
+              <a:rPr lang="fr-FR" sz="2000" dirty="0"/>
+              <a:t> (enregistrable)</a:t>
+            </a:r>
+          </a:p>
+          <a:p>
+            <a:pPr lvl="1"/>
+            <a:r>
+              <a:rPr lang="fr-FR" sz="2000" dirty="0">
+                <a:solidFill>
+                  <a:srgbClr val="0070C0"/>
+                </a:solidFill>
+              </a:rPr>
+              <a:t>Rendre réutilisable </a:t>
+            </a:r>
+            <a:r>
+              <a:rPr lang="fr-FR" sz="2000" dirty="0"/>
+              <a:t>le </a:t>
+            </a:r>
+            <a:r>
+              <a:rPr lang="fr-FR" sz="2000" dirty="0">
+                <a:solidFill>
+                  <a:srgbClr val="0070C0"/>
+                </a:solidFill>
+              </a:rPr>
+              <a:t>travail de l’artiste</a:t>
+            </a:r>
+            <a:r>
+              <a:rPr lang="fr-FR" sz="2000" dirty="0"/>
+              <a:t>/UI/UX designer</a:t>
+            </a:r>
+          </a:p>
+        </p:txBody>
+      </p:sp>
+      <p:sp>
+        <p:nvSpPr>
+          <p:cNvPr id="8" name="Espace réservé du numéro de diapositive 7">
+            <a:extLst>
+              <a:ext uri="{FF2B5EF4-FFF2-40B4-BE49-F238E27FC236}">
+                <a16:creationId xmlns:a16="http://schemas.microsoft.com/office/drawing/2014/main" id="{B8B2E558-E863-4B5B-959A-AB1349969143}"/>
+              </a:ext>
+            </a:extLst>
+          </p:cNvPr>
+          <p:cNvSpPr>
+            <a:spLocks noGrp="1"/>
+          </p:cNvSpPr>
+          <p:nvPr>
+            <p:ph type="sldNum" sz="quarter" idx="12"/>
+          </p:nvPr>
+        </p:nvSpPr>
+        <p:spPr/>
+        <p:txBody>
+          <a:bodyPr/>
+          <a:lstStyle/>
+          <a:p>
+            <a:fld id="{8BBF28A3-E1F2-408E-9BE0-DB29BF40A39D}" type="slidenum">
+              <a:rPr lang="fr-FR" smtClean="0"/>
+              <a:t>26</a:t>
+            </a:fld>
+            <a:endParaRPr lang="fr-FR"/>
+          </a:p>
+        </p:txBody>
+      </p:sp>
+      <p:sp>
+        <p:nvSpPr>
+          <p:cNvPr id="9" name="Espace réservé du pied de page 3">
+            <a:extLst>
+              <a:ext uri="{FF2B5EF4-FFF2-40B4-BE49-F238E27FC236}">
+                <a16:creationId xmlns:a16="http://schemas.microsoft.com/office/drawing/2014/main" id="{2CD2AF13-957F-4245-8516-C9776ADE7978}"/>
+              </a:ext>
+            </a:extLst>
+          </p:cNvPr>
+          <p:cNvSpPr txBox="1">
+            <a:spLocks/>
+          </p:cNvSpPr>
+          <p:nvPr/>
+        </p:nvSpPr>
+        <p:spPr>
+          <a:xfrm>
+            <a:off x="5445839" y="105090"/>
+            <a:ext cx="1443870" cy="676309"/>
+          </a:xfrm>
+          <a:prstGeom prst="rect">
+            <a:avLst/>
+          </a:prstGeom>
+        </p:spPr>
+        <p:txBody>
+          <a:bodyPr vert="horz" lIns="91440" tIns="45720" rIns="91440" bIns="45720" rtlCol="0" anchor="ctr"/>
+          <a:lstStyle>
+            <a:defPPr>
+              <a:defRPr lang="fr-FR"/>
+            </a:defPPr>
+            <a:lvl1pPr marL="0" algn="ctr" defTabSz="914400" rtl="0" eaLnBrk="1" latinLnBrk="0" hangingPunct="1">
+              <a:defRPr sz="1200" kern="1200">
+                <a:solidFill>
+                  <a:schemeClr val="tx1">
+                    <a:tint val="75000"/>
+                  </a:schemeClr>
+                </a:solidFill>
+                <a:latin typeface="+mn-lt"/>
+                <a:ea typeface="+mn-ea"/>
+                <a:cs typeface="+mn-cs"/>
+              </a:defRPr>
+            </a:lvl1pPr>
+            <a:lvl2pPr marL="457200" algn="l" defTabSz="914400" rtl="0" eaLnBrk="1" latinLnBrk="0" hangingPunct="1">
+              <a:defRPr sz="1800" kern="1200">
+                <a:solidFill>
+                  <a:schemeClr val="tx1"/>
+                </a:solidFill>
+                <a:latin typeface="+mn-lt"/>
+                <a:ea typeface="+mn-ea"/>
+                <a:cs typeface="+mn-cs"/>
+              </a:defRPr>
+            </a:lvl2pPr>
+            <a:lvl3pPr marL="914400" algn="l" defTabSz="914400" rtl="0" eaLnBrk="1" latinLnBrk="0" hangingPunct="1">
+              <a:defRPr sz="1800" kern="1200">
+                <a:solidFill>
+                  <a:schemeClr val="tx1"/>
+                </a:solidFill>
+                <a:latin typeface="+mn-lt"/>
+                <a:ea typeface="+mn-ea"/>
+                <a:cs typeface="+mn-cs"/>
+              </a:defRPr>
+            </a:lvl3pPr>
+            <a:lvl4pPr marL="1371600" algn="l" defTabSz="914400" rtl="0" eaLnBrk="1" latinLnBrk="0" hangingPunct="1">
+              <a:defRPr sz="1800" kern="1200">
+                <a:solidFill>
+                  <a:schemeClr val="tx1"/>
+                </a:solidFill>
+                <a:latin typeface="+mn-lt"/>
+                <a:ea typeface="+mn-ea"/>
+                <a:cs typeface="+mn-cs"/>
+              </a:defRPr>
+            </a:lvl4pPr>
+            <a:lvl5pPr marL="1828800" algn="l" defTabSz="914400" rtl="0" eaLnBrk="1" latinLnBrk="0" hangingPunct="1">
+              <a:defRPr sz="1800" kern="1200">
+                <a:solidFill>
+                  <a:schemeClr val="tx1"/>
+                </a:solidFill>
+                <a:latin typeface="+mn-lt"/>
+                <a:ea typeface="+mn-ea"/>
+                <a:cs typeface="+mn-cs"/>
+              </a:defRPr>
+            </a:lvl5pPr>
+            <a:lvl6pPr marL="2286000" algn="l" defTabSz="914400" rtl="0" eaLnBrk="1" latinLnBrk="0" hangingPunct="1">
+              <a:defRPr sz="1800" kern="1200">
+                <a:solidFill>
+                  <a:schemeClr val="tx1"/>
+                </a:solidFill>
+                <a:latin typeface="+mn-lt"/>
+                <a:ea typeface="+mn-ea"/>
+                <a:cs typeface="+mn-cs"/>
+              </a:defRPr>
+            </a:lvl6pPr>
+            <a:lvl7pPr marL="2743200" algn="l" defTabSz="914400" rtl="0" eaLnBrk="1" latinLnBrk="0" hangingPunct="1">
+              <a:defRPr sz="1800" kern="1200">
+                <a:solidFill>
+                  <a:schemeClr val="tx1"/>
+                </a:solidFill>
+                <a:latin typeface="+mn-lt"/>
+                <a:ea typeface="+mn-ea"/>
+                <a:cs typeface="+mn-cs"/>
+              </a:defRPr>
+            </a:lvl7pPr>
+            <a:lvl8pPr marL="3200400" algn="l" defTabSz="914400" rtl="0" eaLnBrk="1" latinLnBrk="0" hangingPunct="1">
+              <a:defRPr sz="1800" kern="1200">
+                <a:solidFill>
+                  <a:schemeClr val="tx1"/>
+                </a:solidFill>
+                <a:latin typeface="+mn-lt"/>
+                <a:ea typeface="+mn-ea"/>
+                <a:cs typeface="+mn-cs"/>
+              </a:defRPr>
+            </a:lvl8pPr>
+            <a:lvl9pPr marL="3657600" algn="l" defTabSz="914400" rtl="0" eaLnBrk="1" latinLnBrk="0" hangingPunct="1">
+              <a:defRPr sz="1800" kern="1200">
+                <a:solidFill>
+                  <a:schemeClr val="tx1"/>
+                </a:solidFill>
+                <a:latin typeface="+mn-lt"/>
+                <a:ea typeface="+mn-ea"/>
+                <a:cs typeface="+mn-cs"/>
+              </a:defRPr>
+            </a:lvl9pPr>
+          </a:lstStyle>
+          <a:p>
+            <a:r>
+              <a:rPr lang="fr-FR" i="1" u="sng" dirty="0"/>
+              <a:t>Présentation du Web Designer</a:t>
+            </a:r>
+            <a:endParaRPr lang="fr-FR" sz="1000" dirty="0"/>
+          </a:p>
+        </p:txBody>
+      </p:sp>
+      <p:sp>
+        <p:nvSpPr>
+          <p:cNvPr id="3" name="Espace réservé du pied de page 2">
+            <a:extLst>
+              <a:ext uri="{FF2B5EF4-FFF2-40B4-BE49-F238E27FC236}">
+                <a16:creationId xmlns:a16="http://schemas.microsoft.com/office/drawing/2014/main" id="{E3F8CFDB-5067-4D8D-A24C-068EAC0EA5D5}"/>
+              </a:ext>
+            </a:extLst>
+          </p:cNvPr>
+          <p:cNvSpPr>
+            <a:spLocks noGrp="1"/>
+          </p:cNvSpPr>
+          <p:nvPr>
+            <p:ph type="ftr" sz="quarter" idx="11"/>
+          </p:nvPr>
+        </p:nvSpPr>
+        <p:spPr/>
+        <p:txBody>
+          <a:bodyPr/>
+          <a:lstStyle/>
+          <a:p>
+            <a:r>
+              <a:rPr lang="fr-FR"/>
+              <a:t>V0.1</a:t>
+            </a:r>
+          </a:p>
+        </p:txBody>
+      </p:sp>
+    </p:spTree>
+    <p:extLst>
+      <p:ext uri="{BB962C8B-B14F-4D97-AF65-F5344CB8AC3E}">
+        <p14:creationId xmlns:p14="http://schemas.microsoft.com/office/powerpoint/2010/main" val="488704100"/>
+      </p:ext>
+    </p:extLst>
+  </p:cSld>
+  <p:clrMapOvr>
+    <a:masterClrMapping/>
+  </p:clrMapOvr>
+  <mc:AlternateContent xmlns:mc="http://schemas.openxmlformats.org/markup-compatibility/2006" xmlns:p14="http://schemas.microsoft.com/office/powerpoint/2010/main">
+    <mc:Choice Requires="p14">
+      <p:transition spd="med" p14:dur="700">
+        <p:fade/>
+      </p:transition>
+    </mc:Choice>
+    <mc:Fallback xmlns="">
+      <p:transition spd="med">
+        <p:fade/>
+      </p:transition>
+    </mc:Fallback>
+  </mc:AlternateContent>
+</p:sld>
+</file>
+
+<file path=ppt/slides/slide27.xml><?xml version="1.0" encoding="utf-8"?>
+<p:sld xmlns:a="http://schemas.openxmlformats.org/drawingml/2006/main" xmlns:r="http://schemas.openxmlformats.org/officeDocument/2006/relationships" xmlns:p="http://schemas.openxmlformats.org/presentationml/2006/main">
+  <p:cSld>
+    <p:spTree>
+      <p:nvGrpSpPr>
+        <p:cNvPr id="1" name=""/>
+        <p:cNvGrpSpPr/>
+        <p:nvPr/>
+      </p:nvGrpSpPr>
+      <p:grpSpPr>
+        <a:xfrm>
+          <a:off x="0" y="0"/>
+          <a:ext cx="0" cy="0"/>
+          <a:chOff x="0" y="0"/>
+          <a:chExt cx="0" cy="0"/>
+        </a:xfrm>
+      </p:grpSpPr>
+      <p:sp>
+        <p:nvSpPr>
+          <p:cNvPr id="2" name="Titre 1"/>
+          <p:cNvSpPr>
+            <a:spLocks noGrp="1"/>
+          </p:cNvSpPr>
+          <p:nvPr>
+            <p:ph type="title"/>
+          </p:nvPr>
+        </p:nvSpPr>
+        <p:spPr>
+          <a:xfrm>
+            <a:off x="263118" y="781425"/>
+            <a:ext cx="5904656" cy="724942"/>
+          </a:xfrm>
+        </p:spPr>
+        <p:txBody>
+          <a:bodyPr>
+            <a:normAutofit/>
+          </a:bodyPr>
+          <a:lstStyle/>
+          <a:p>
+            <a:pPr algn="l"/>
+            <a:r>
+              <a:rPr lang="fr-FR" sz="3200" dirty="0"/>
+              <a:t>Système de layer</a:t>
+            </a:r>
+          </a:p>
+        </p:txBody>
+      </p:sp>
+      <p:cxnSp>
+        <p:nvCxnSpPr>
+          <p:cNvPr id="10" name="Connecteur droit 9"/>
+          <p:cNvCxnSpPr>
+            <a:cxnSpLocks/>
+          </p:cNvCxnSpPr>
+          <p:nvPr/>
+        </p:nvCxnSpPr>
+        <p:spPr>
+          <a:xfrm>
+            <a:off x="263118" y="1506367"/>
+            <a:ext cx="10709682" cy="0"/>
+          </a:xfrm>
+          <a:prstGeom prst="line">
+            <a:avLst/>
+          </a:prstGeom>
+          <a:ln w="19050">
+            <a:solidFill>
+              <a:schemeClr val="tx1"/>
+            </a:solidFill>
+          </a:ln>
+        </p:spPr>
+        <p:style>
+          <a:lnRef idx="1">
+            <a:schemeClr val="accent1"/>
+          </a:lnRef>
+          <a:fillRef idx="0">
+            <a:schemeClr val="accent1"/>
+          </a:fillRef>
+          <a:effectRef idx="0">
+            <a:schemeClr val="accent1"/>
+          </a:effectRef>
+          <a:fontRef idx="minor">
+            <a:schemeClr val="tx1"/>
+          </a:fontRef>
+        </p:style>
+      </p:cxnSp>
+      <p:sp>
+        <p:nvSpPr>
+          <p:cNvPr id="30" name="Espace réservé du contenu 2">
+            <a:extLst>
+              <a:ext uri="{FF2B5EF4-FFF2-40B4-BE49-F238E27FC236}">
+                <a16:creationId xmlns:a16="http://schemas.microsoft.com/office/drawing/2014/main" id="{17374925-2B5F-48B8-8155-9BB171EB9DDB}"/>
+              </a:ext>
+            </a:extLst>
+          </p:cNvPr>
+          <p:cNvSpPr>
+            <a:spLocks noGrp="1"/>
+          </p:cNvSpPr>
+          <p:nvPr>
+            <p:ph idx="1"/>
+          </p:nvPr>
+        </p:nvSpPr>
+        <p:spPr>
+          <a:xfrm>
+            <a:off x="263117" y="1725237"/>
+            <a:ext cx="11733713" cy="4631112"/>
+          </a:xfrm>
+        </p:spPr>
+        <p:txBody>
+          <a:bodyPr>
+            <a:normAutofit/>
+          </a:bodyPr>
+          <a:lstStyle/>
+          <a:p>
+            <a:r>
+              <a:rPr lang="fr-FR" sz="2400" dirty="0"/>
+              <a:t>Faciliter la superposition d’éléments</a:t>
+            </a:r>
+            <a:endParaRPr lang="fr-FR" sz="1200" dirty="0"/>
+          </a:p>
+          <a:p>
+            <a:endParaRPr lang="fr-FR" sz="2400" dirty="0"/>
+          </a:p>
+        </p:txBody>
+      </p:sp>
+      <p:sp>
+        <p:nvSpPr>
+          <p:cNvPr id="8" name="Espace réservé du numéro de diapositive 7">
+            <a:extLst>
+              <a:ext uri="{FF2B5EF4-FFF2-40B4-BE49-F238E27FC236}">
+                <a16:creationId xmlns:a16="http://schemas.microsoft.com/office/drawing/2014/main" id="{B8B2E558-E863-4B5B-959A-AB1349969143}"/>
+              </a:ext>
+            </a:extLst>
+          </p:cNvPr>
+          <p:cNvSpPr>
+            <a:spLocks noGrp="1"/>
+          </p:cNvSpPr>
+          <p:nvPr>
+            <p:ph type="sldNum" sz="quarter" idx="12"/>
+          </p:nvPr>
+        </p:nvSpPr>
+        <p:spPr/>
+        <p:txBody>
+          <a:bodyPr/>
+          <a:lstStyle/>
+          <a:p>
+            <a:fld id="{8BBF28A3-E1F2-408E-9BE0-DB29BF40A39D}" type="slidenum">
+              <a:rPr lang="fr-FR" smtClean="0"/>
+              <a:t>27</a:t>
+            </a:fld>
+            <a:endParaRPr lang="fr-FR"/>
+          </a:p>
+        </p:txBody>
+      </p:sp>
+      <p:sp>
+        <p:nvSpPr>
+          <p:cNvPr id="9" name="Espace réservé du pied de page 3">
+            <a:extLst>
+              <a:ext uri="{FF2B5EF4-FFF2-40B4-BE49-F238E27FC236}">
+                <a16:creationId xmlns:a16="http://schemas.microsoft.com/office/drawing/2014/main" id="{2CD2AF13-957F-4245-8516-C9776ADE7978}"/>
+              </a:ext>
+            </a:extLst>
+          </p:cNvPr>
+          <p:cNvSpPr txBox="1">
+            <a:spLocks/>
+          </p:cNvSpPr>
+          <p:nvPr/>
+        </p:nvSpPr>
+        <p:spPr>
+          <a:xfrm>
+            <a:off x="5445839" y="105090"/>
+            <a:ext cx="1443870" cy="676309"/>
+          </a:xfrm>
+          <a:prstGeom prst="rect">
+            <a:avLst/>
+          </a:prstGeom>
+        </p:spPr>
+        <p:txBody>
+          <a:bodyPr vert="horz" lIns="91440" tIns="45720" rIns="91440" bIns="45720" rtlCol="0" anchor="ctr"/>
+          <a:lstStyle>
+            <a:defPPr>
+              <a:defRPr lang="fr-FR"/>
+            </a:defPPr>
+            <a:lvl1pPr marL="0" algn="ctr" defTabSz="914400" rtl="0" eaLnBrk="1" latinLnBrk="0" hangingPunct="1">
+              <a:defRPr sz="1200" kern="1200">
+                <a:solidFill>
+                  <a:schemeClr val="tx1">
+                    <a:tint val="75000"/>
+                  </a:schemeClr>
+                </a:solidFill>
+                <a:latin typeface="+mn-lt"/>
+                <a:ea typeface="+mn-ea"/>
+                <a:cs typeface="+mn-cs"/>
+              </a:defRPr>
+            </a:lvl1pPr>
+            <a:lvl2pPr marL="457200" algn="l" defTabSz="914400" rtl="0" eaLnBrk="1" latinLnBrk="0" hangingPunct="1">
+              <a:defRPr sz="1800" kern="1200">
+                <a:solidFill>
+                  <a:schemeClr val="tx1"/>
+                </a:solidFill>
+                <a:latin typeface="+mn-lt"/>
+                <a:ea typeface="+mn-ea"/>
+                <a:cs typeface="+mn-cs"/>
+              </a:defRPr>
+            </a:lvl2pPr>
+            <a:lvl3pPr marL="914400" algn="l" defTabSz="914400" rtl="0" eaLnBrk="1" latinLnBrk="0" hangingPunct="1">
+              <a:defRPr sz="1800" kern="1200">
+                <a:solidFill>
+                  <a:schemeClr val="tx1"/>
+                </a:solidFill>
+                <a:latin typeface="+mn-lt"/>
+                <a:ea typeface="+mn-ea"/>
+                <a:cs typeface="+mn-cs"/>
+              </a:defRPr>
+            </a:lvl3pPr>
+            <a:lvl4pPr marL="1371600" algn="l" defTabSz="914400" rtl="0" eaLnBrk="1" latinLnBrk="0" hangingPunct="1">
+              <a:defRPr sz="1800" kern="1200">
+                <a:solidFill>
+                  <a:schemeClr val="tx1"/>
+                </a:solidFill>
+                <a:latin typeface="+mn-lt"/>
+                <a:ea typeface="+mn-ea"/>
+                <a:cs typeface="+mn-cs"/>
+              </a:defRPr>
+            </a:lvl4pPr>
+            <a:lvl5pPr marL="1828800" algn="l" defTabSz="914400" rtl="0" eaLnBrk="1" latinLnBrk="0" hangingPunct="1">
+              <a:defRPr sz="1800" kern="1200">
+                <a:solidFill>
+                  <a:schemeClr val="tx1"/>
+                </a:solidFill>
+                <a:latin typeface="+mn-lt"/>
+                <a:ea typeface="+mn-ea"/>
+                <a:cs typeface="+mn-cs"/>
+              </a:defRPr>
+            </a:lvl5pPr>
+            <a:lvl6pPr marL="2286000" algn="l" defTabSz="914400" rtl="0" eaLnBrk="1" latinLnBrk="0" hangingPunct="1">
+              <a:defRPr sz="1800" kern="1200">
+                <a:solidFill>
+                  <a:schemeClr val="tx1"/>
+                </a:solidFill>
+                <a:latin typeface="+mn-lt"/>
+                <a:ea typeface="+mn-ea"/>
+                <a:cs typeface="+mn-cs"/>
+              </a:defRPr>
+            </a:lvl6pPr>
+            <a:lvl7pPr marL="2743200" algn="l" defTabSz="914400" rtl="0" eaLnBrk="1" latinLnBrk="0" hangingPunct="1">
+              <a:defRPr sz="1800" kern="1200">
+                <a:solidFill>
+                  <a:schemeClr val="tx1"/>
+                </a:solidFill>
+                <a:latin typeface="+mn-lt"/>
+                <a:ea typeface="+mn-ea"/>
+                <a:cs typeface="+mn-cs"/>
+              </a:defRPr>
+            </a:lvl7pPr>
+            <a:lvl8pPr marL="3200400" algn="l" defTabSz="914400" rtl="0" eaLnBrk="1" latinLnBrk="0" hangingPunct="1">
+              <a:defRPr sz="1800" kern="1200">
+                <a:solidFill>
+                  <a:schemeClr val="tx1"/>
+                </a:solidFill>
+                <a:latin typeface="+mn-lt"/>
+                <a:ea typeface="+mn-ea"/>
+                <a:cs typeface="+mn-cs"/>
+              </a:defRPr>
+            </a:lvl8pPr>
+            <a:lvl9pPr marL="3657600" algn="l" defTabSz="914400" rtl="0" eaLnBrk="1" latinLnBrk="0" hangingPunct="1">
+              <a:defRPr sz="1800" kern="1200">
+                <a:solidFill>
+                  <a:schemeClr val="tx1"/>
+                </a:solidFill>
+                <a:latin typeface="+mn-lt"/>
+                <a:ea typeface="+mn-ea"/>
+                <a:cs typeface="+mn-cs"/>
+              </a:defRPr>
+            </a:lvl9pPr>
+          </a:lstStyle>
+          <a:p>
+            <a:r>
+              <a:rPr lang="fr-FR" i="1" u="sng" dirty="0"/>
+              <a:t>Présentation du Web Designer</a:t>
+            </a:r>
+            <a:endParaRPr lang="fr-FR" sz="1000" dirty="0"/>
+          </a:p>
+        </p:txBody>
+      </p:sp>
+      <p:sp>
+        <p:nvSpPr>
+          <p:cNvPr id="3" name="Espace réservé du pied de page 2">
+            <a:extLst>
+              <a:ext uri="{FF2B5EF4-FFF2-40B4-BE49-F238E27FC236}">
+                <a16:creationId xmlns:a16="http://schemas.microsoft.com/office/drawing/2014/main" id="{E3F8CFDB-5067-4D8D-A24C-068EAC0EA5D5}"/>
+              </a:ext>
+            </a:extLst>
+          </p:cNvPr>
+          <p:cNvSpPr>
+            <a:spLocks noGrp="1"/>
+          </p:cNvSpPr>
+          <p:nvPr>
+            <p:ph type="ftr" sz="quarter" idx="11"/>
+          </p:nvPr>
+        </p:nvSpPr>
+        <p:spPr/>
+        <p:txBody>
+          <a:bodyPr/>
+          <a:lstStyle/>
+          <a:p>
+            <a:r>
+              <a:rPr lang="fr-FR"/>
+              <a:t>V0.1</a:t>
+            </a:r>
+          </a:p>
+        </p:txBody>
+      </p:sp>
+    </p:spTree>
+    <p:extLst>
+      <p:ext uri="{BB962C8B-B14F-4D97-AF65-F5344CB8AC3E}">
+        <p14:creationId xmlns:p14="http://schemas.microsoft.com/office/powerpoint/2010/main" val="2650847568"/>
       </p:ext>
     </p:extLst>
   </p:cSld>

</xml_diff>

<commit_message>
Add meetings report + continue specs
</commit_message>
<xml_diff>
--- a/doc/pitch/Presentation-Conception.pptx
+++ b/doc/pitch/Presentation-Conception.pptx
@@ -5,7 +5,7 @@
     <p:sldMasterId id="2147483648" r:id="rId1"/>
   </p:sldMasterIdLst>
   <p:notesMasterIdLst>
-    <p:notesMasterId r:id="rId29"/>
+    <p:notesMasterId r:id="rId33"/>
   </p:notesMasterIdLst>
   <p:sldIdLst>
     <p:sldId id="256" r:id="rId2"/>
@@ -20,9 +20,9 @@
     <p:sldId id="267" r:id="rId11"/>
     <p:sldId id="278" r:id="rId12"/>
     <p:sldId id="277" r:id="rId13"/>
-    <p:sldId id="279" r:id="rId14"/>
-    <p:sldId id="281" r:id="rId15"/>
-    <p:sldId id="280" r:id="rId16"/>
+    <p:sldId id="280" r:id="rId14"/>
+    <p:sldId id="279" r:id="rId15"/>
+    <p:sldId id="281" r:id="rId16"/>
     <p:sldId id="269" r:id="rId17"/>
     <p:sldId id="282" r:id="rId18"/>
     <p:sldId id="283" r:id="rId19"/>
@@ -31,10 +31,14 @@
     <p:sldId id="287" r:id="rId22"/>
     <p:sldId id="289" r:id="rId23"/>
     <p:sldId id="288" r:id="rId24"/>
-    <p:sldId id="285" r:id="rId25"/>
-    <p:sldId id="290" r:id="rId26"/>
-    <p:sldId id="291" r:id="rId27"/>
-    <p:sldId id="292" r:id="rId28"/>
+    <p:sldId id="293" r:id="rId25"/>
+    <p:sldId id="294" r:id="rId26"/>
+    <p:sldId id="296" r:id="rId27"/>
+    <p:sldId id="295" r:id="rId28"/>
+    <p:sldId id="285" r:id="rId29"/>
+    <p:sldId id="290" r:id="rId30"/>
+    <p:sldId id="291" r:id="rId31"/>
+    <p:sldId id="292" r:id="rId32"/>
   </p:sldIdLst>
   <p:sldSz cx="12192000" cy="6858000"/>
   <p:notesSz cx="6858000" cy="9144000"/>
@@ -223,7 +227,7 @@
           <a:p>
             <a:fld id="{F6BEB917-1F9D-42E2-AB2F-DA9E66BE3035}" type="datetimeFigureOut">
               <a:rPr lang="fr-FR" smtClean="0"/>
-              <a:t>01/02/2021</a:t>
+              <a:t>21/02/2021</a:t>
             </a:fld>
             <a:endParaRPr lang="fr-FR"/>
           </a:p>
@@ -848,7 +852,7 @@
     </p:spTree>
     <p:extLst>
       <p:ext uri="{BB962C8B-B14F-4D97-AF65-F5344CB8AC3E}">
-        <p14:creationId xmlns:p14="http://schemas.microsoft.com/office/powerpoint/2010/main" val="2475377792"/>
+        <p14:creationId xmlns:p14="http://schemas.microsoft.com/office/powerpoint/2010/main" val="1420673821"/>
       </p:ext>
     </p:extLst>
   </p:cSld>
@@ -940,7 +944,7 @@
     </p:spTree>
     <p:extLst>
       <p:ext uri="{BB962C8B-B14F-4D97-AF65-F5344CB8AC3E}">
-        <p14:creationId xmlns:p14="http://schemas.microsoft.com/office/powerpoint/2010/main" val="297016126"/>
+        <p14:creationId xmlns:p14="http://schemas.microsoft.com/office/powerpoint/2010/main" val="2475377792"/>
       </p:ext>
     </p:extLst>
   </p:cSld>
@@ -1032,7 +1036,7 @@
     </p:spTree>
     <p:extLst>
       <p:ext uri="{BB962C8B-B14F-4D97-AF65-F5344CB8AC3E}">
-        <p14:creationId xmlns:p14="http://schemas.microsoft.com/office/powerpoint/2010/main" val="1420673821"/>
+        <p14:creationId xmlns:p14="http://schemas.microsoft.com/office/powerpoint/2010/main" val="297016126"/>
       </p:ext>
     </p:extLst>
   </p:cSld>
@@ -1952,7 +1956,7 @@
     </p:spTree>
     <p:extLst>
       <p:ext uri="{BB962C8B-B14F-4D97-AF65-F5344CB8AC3E}">
-        <p14:creationId xmlns:p14="http://schemas.microsoft.com/office/powerpoint/2010/main" val="724953128"/>
+        <p14:creationId xmlns:p14="http://schemas.microsoft.com/office/powerpoint/2010/main" val="676478136"/>
       </p:ext>
     </p:extLst>
   </p:cSld>
@@ -2044,7 +2048,7 @@
     </p:spTree>
     <p:extLst>
       <p:ext uri="{BB962C8B-B14F-4D97-AF65-F5344CB8AC3E}">
-        <p14:creationId xmlns:p14="http://schemas.microsoft.com/office/powerpoint/2010/main" val="2809198432"/>
+        <p14:creationId xmlns:p14="http://schemas.microsoft.com/office/powerpoint/2010/main" val="2925034382"/>
       </p:ext>
     </p:extLst>
   </p:cSld>
@@ -2136,7 +2140,7 @@
     </p:spTree>
     <p:extLst>
       <p:ext uri="{BB962C8B-B14F-4D97-AF65-F5344CB8AC3E}">
-        <p14:creationId xmlns:p14="http://schemas.microsoft.com/office/powerpoint/2010/main" val="1117360745"/>
+        <p14:creationId xmlns:p14="http://schemas.microsoft.com/office/powerpoint/2010/main" val="1388850090"/>
       </p:ext>
     </p:extLst>
   </p:cSld>
@@ -2228,7 +2232,283 @@
     </p:spTree>
     <p:extLst>
       <p:ext uri="{BB962C8B-B14F-4D97-AF65-F5344CB8AC3E}">
-        <p14:creationId xmlns:p14="http://schemas.microsoft.com/office/powerpoint/2010/main" val="3143041290"/>
+        <p14:creationId xmlns:p14="http://schemas.microsoft.com/office/powerpoint/2010/main" val="4279441538"/>
+      </p:ext>
+    </p:extLst>
+  </p:cSld>
+  <p:clrMapOvr>
+    <a:masterClrMapping/>
+  </p:clrMapOvr>
+</p:notes>
+</file>
+
+<file path=ppt/notesSlides/notesSlide27.xml><?xml version="1.0" encoding="utf-8"?>
+<p:notes xmlns:a="http://schemas.openxmlformats.org/drawingml/2006/main" xmlns:r="http://schemas.openxmlformats.org/officeDocument/2006/relationships" xmlns:p="http://schemas.openxmlformats.org/presentationml/2006/main">
+  <p:cSld>
+    <p:spTree>
+      <p:nvGrpSpPr>
+        <p:cNvPr id="1" name=""/>
+        <p:cNvGrpSpPr/>
+        <p:nvPr/>
+      </p:nvGrpSpPr>
+      <p:grpSpPr>
+        <a:xfrm>
+          <a:off x="0" y="0"/>
+          <a:ext cx="0" cy="0"/>
+          <a:chOff x="0" y="0"/>
+          <a:chExt cx="0" cy="0"/>
+        </a:xfrm>
+      </p:grpSpPr>
+      <p:sp>
+        <p:nvSpPr>
+          <p:cNvPr id="2" name="Espace réservé de l'image des diapositives 1"/>
+          <p:cNvSpPr>
+            <a:spLocks noGrp="1" noRot="1" noChangeAspect="1"/>
+          </p:cNvSpPr>
+          <p:nvPr>
+            <p:ph type="sldImg"/>
+          </p:nvPr>
+        </p:nvSpPr>
+        <p:spPr>
+          <a:xfrm>
+            <a:off x="381000" y="685800"/>
+            <a:ext cx="6096000" cy="3429000"/>
+          </a:xfrm>
+        </p:spPr>
+      </p:sp>
+      <p:sp>
+        <p:nvSpPr>
+          <p:cNvPr id="3" name="Espace réservé des commentaires 2"/>
+          <p:cNvSpPr>
+            <a:spLocks noGrp="1"/>
+          </p:cNvSpPr>
+          <p:nvPr>
+            <p:ph type="body" idx="1"/>
+          </p:nvPr>
+        </p:nvSpPr>
+        <p:spPr/>
+        <p:txBody>
+          <a:bodyPr/>
+          <a:lstStyle/>
+          <a:p>
+            <a:r>
+              <a:rPr lang="fr-FR" baseline="0" dirty="0"/>
+              <a:t>Thomas</a:t>
+            </a:r>
+          </a:p>
+        </p:txBody>
+      </p:sp>
+      <p:sp>
+        <p:nvSpPr>
+          <p:cNvPr id="4" name="Espace réservé du numéro de diapositive 3"/>
+          <p:cNvSpPr>
+            <a:spLocks noGrp="1"/>
+          </p:cNvSpPr>
+          <p:nvPr>
+            <p:ph type="sldNum" sz="quarter" idx="10"/>
+          </p:nvPr>
+        </p:nvSpPr>
+        <p:spPr/>
+        <p:txBody>
+          <a:bodyPr/>
+          <a:lstStyle/>
+          <a:p>
+            <a:fld id="{A8A338DB-4614-4EB6-8F24-D592A5BC5FE8}" type="slidenum">
+              <a:rPr lang="fr-FR" smtClean="0"/>
+              <a:t>28</a:t>
+            </a:fld>
+            <a:endParaRPr lang="fr-FR"/>
+          </a:p>
+        </p:txBody>
+      </p:sp>
+    </p:spTree>
+    <p:extLst>
+      <p:ext uri="{BB962C8B-B14F-4D97-AF65-F5344CB8AC3E}">
+        <p14:creationId xmlns:p14="http://schemas.microsoft.com/office/powerpoint/2010/main" val="724953128"/>
+      </p:ext>
+    </p:extLst>
+  </p:cSld>
+  <p:clrMapOvr>
+    <a:masterClrMapping/>
+  </p:clrMapOvr>
+</p:notes>
+</file>
+
+<file path=ppt/notesSlides/notesSlide28.xml><?xml version="1.0" encoding="utf-8"?>
+<p:notes xmlns:a="http://schemas.openxmlformats.org/drawingml/2006/main" xmlns:r="http://schemas.openxmlformats.org/officeDocument/2006/relationships" xmlns:p="http://schemas.openxmlformats.org/presentationml/2006/main">
+  <p:cSld>
+    <p:spTree>
+      <p:nvGrpSpPr>
+        <p:cNvPr id="1" name=""/>
+        <p:cNvGrpSpPr/>
+        <p:nvPr/>
+      </p:nvGrpSpPr>
+      <p:grpSpPr>
+        <a:xfrm>
+          <a:off x="0" y="0"/>
+          <a:ext cx="0" cy="0"/>
+          <a:chOff x="0" y="0"/>
+          <a:chExt cx="0" cy="0"/>
+        </a:xfrm>
+      </p:grpSpPr>
+      <p:sp>
+        <p:nvSpPr>
+          <p:cNvPr id="2" name="Espace réservé de l'image des diapositives 1"/>
+          <p:cNvSpPr>
+            <a:spLocks noGrp="1" noRot="1" noChangeAspect="1"/>
+          </p:cNvSpPr>
+          <p:nvPr>
+            <p:ph type="sldImg"/>
+          </p:nvPr>
+        </p:nvSpPr>
+        <p:spPr>
+          <a:xfrm>
+            <a:off x="381000" y="685800"/>
+            <a:ext cx="6096000" cy="3429000"/>
+          </a:xfrm>
+        </p:spPr>
+      </p:sp>
+      <p:sp>
+        <p:nvSpPr>
+          <p:cNvPr id="3" name="Espace réservé des commentaires 2"/>
+          <p:cNvSpPr>
+            <a:spLocks noGrp="1"/>
+          </p:cNvSpPr>
+          <p:nvPr>
+            <p:ph type="body" idx="1"/>
+          </p:nvPr>
+        </p:nvSpPr>
+        <p:spPr/>
+        <p:txBody>
+          <a:bodyPr/>
+          <a:lstStyle/>
+          <a:p>
+            <a:r>
+              <a:rPr lang="fr-FR" baseline="0" dirty="0"/>
+              <a:t>Thomas</a:t>
+            </a:r>
+          </a:p>
+        </p:txBody>
+      </p:sp>
+      <p:sp>
+        <p:nvSpPr>
+          <p:cNvPr id="4" name="Espace réservé du numéro de diapositive 3"/>
+          <p:cNvSpPr>
+            <a:spLocks noGrp="1"/>
+          </p:cNvSpPr>
+          <p:nvPr>
+            <p:ph type="sldNum" sz="quarter" idx="10"/>
+          </p:nvPr>
+        </p:nvSpPr>
+        <p:spPr/>
+        <p:txBody>
+          <a:bodyPr/>
+          <a:lstStyle/>
+          <a:p>
+            <a:fld id="{A8A338DB-4614-4EB6-8F24-D592A5BC5FE8}" type="slidenum">
+              <a:rPr lang="fr-FR" smtClean="0"/>
+              <a:t>29</a:t>
+            </a:fld>
+            <a:endParaRPr lang="fr-FR"/>
+          </a:p>
+        </p:txBody>
+      </p:sp>
+    </p:spTree>
+    <p:extLst>
+      <p:ext uri="{BB962C8B-B14F-4D97-AF65-F5344CB8AC3E}">
+        <p14:creationId xmlns:p14="http://schemas.microsoft.com/office/powerpoint/2010/main" val="2809198432"/>
+      </p:ext>
+    </p:extLst>
+  </p:cSld>
+  <p:clrMapOvr>
+    <a:masterClrMapping/>
+  </p:clrMapOvr>
+</p:notes>
+</file>
+
+<file path=ppt/notesSlides/notesSlide29.xml><?xml version="1.0" encoding="utf-8"?>
+<p:notes xmlns:a="http://schemas.openxmlformats.org/drawingml/2006/main" xmlns:r="http://schemas.openxmlformats.org/officeDocument/2006/relationships" xmlns:p="http://schemas.openxmlformats.org/presentationml/2006/main">
+  <p:cSld>
+    <p:spTree>
+      <p:nvGrpSpPr>
+        <p:cNvPr id="1" name=""/>
+        <p:cNvGrpSpPr/>
+        <p:nvPr/>
+      </p:nvGrpSpPr>
+      <p:grpSpPr>
+        <a:xfrm>
+          <a:off x="0" y="0"/>
+          <a:ext cx="0" cy="0"/>
+          <a:chOff x="0" y="0"/>
+          <a:chExt cx="0" cy="0"/>
+        </a:xfrm>
+      </p:grpSpPr>
+      <p:sp>
+        <p:nvSpPr>
+          <p:cNvPr id="2" name="Espace réservé de l'image des diapositives 1"/>
+          <p:cNvSpPr>
+            <a:spLocks noGrp="1" noRot="1" noChangeAspect="1"/>
+          </p:cNvSpPr>
+          <p:nvPr>
+            <p:ph type="sldImg"/>
+          </p:nvPr>
+        </p:nvSpPr>
+        <p:spPr>
+          <a:xfrm>
+            <a:off x="381000" y="685800"/>
+            <a:ext cx="6096000" cy="3429000"/>
+          </a:xfrm>
+        </p:spPr>
+      </p:sp>
+      <p:sp>
+        <p:nvSpPr>
+          <p:cNvPr id="3" name="Espace réservé des commentaires 2"/>
+          <p:cNvSpPr>
+            <a:spLocks noGrp="1"/>
+          </p:cNvSpPr>
+          <p:nvPr>
+            <p:ph type="body" idx="1"/>
+          </p:nvPr>
+        </p:nvSpPr>
+        <p:spPr/>
+        <p:txBody>
+          <a:bodyPr/>
+          <a:lstStyle/>
+          <a:p>
+            <a:r>
+              <a:rPr lang="fr-FR" baseline="0" dirty="0"/>
+              <a:t>Thomas</a:t>
+            </a:r>
+          </a:p>
+        </p:txBody>
+      </p:sp>
+      <p:sp>
+        <p:nvSpPr>
+          <p:cNvPr id="4" name="Espace réservé du numéro de diapositive 3"/>
+          <p:cNvSpPr>
+            <a:spLocks noGrp="1"/>
+          </p:cNvSpPr>
+          <p:nvPr>
+            <p:ph type="sldNum" sz="quarter" idx="10"/>
+          </p:nvPr>
+        </p:nvSpPr>
+        <p:spPr/>
+        <p:txBody>
+          <a:bodyPr/>
+          <a:lstStyle/>
+          <a:p>
+            <a:fld id="{A8A338DB-4614-4EB6-8F24-D592A5BC5FE8}" type="slidenum">
+              <a:rPr lang="fr-FR" smtClean="0"/>
+              <a:t>30</a:t>
+            </a:fld>
+            <a:endParaRPr lang="fr-FR"/>
+          </a:p>
+        </p:txBody>
+      </p:sp>
+    </p:spTree>
+    <p:extLst>
+      <p:ext uri="{BB962C8B-B14F-4D97-AF65-F5344CB8AC3E}">
+        <p14:creationId xmlns:p14="http://schemas.microsoft.com/office/powerpoint/2010/main" val="1117360745"/>
       </p:ext>
     </p:extLst>
   </p:cSld>
@@ -2321,6 +2601,98 @@
     <p:extLst>
       <p:ext uri="{BB962C8B-B14F-4D97-AF65-F5344CB8AC3E}">
         <p14:creationId xmlns:p14="http://schemas.microsoft.com/office/powerpoint/2010/main" val="2259489753"/>
+      </p:ext>
+    </p:extLst>
+  </p:cSld>
+  <p:clrMapOvr>
+    <a:masterClrMapping/>
+  </p:clrMapOvr>
+</p:notes>
+</file>
+
+<file path=ppt/notesSlides/notesSlide30.xml><?xml version="1.0" encoding="utf-8"?>
+<p:notes xmlns:a="http://schemas.openxmlformats.org/drawingml/2006/main" xmlns:r="http://schemas.openxmlformats.org/officeDocument/2006/relationships" xmlns:p="http://schemas.openxmlformats.org/presentationml/2006/main">
+  <p:cSld>
+    <p:spTree>
+      <p:nvGrpSpPr>
+        <p:cNvPr id="1" name=""/>
+        <p:cNvGrpSpPr/>
+        <p:nvPr/>
+      </p:nvGrpSpPr>
+      <p:grpSpPr>
+        <a:xfrm>
+          <a:off x="0" y="0"/>
+          <a:ext cx="0" cy="0"/>
+          <a:chOff x="0" y="0"/>
+          <a:chExt cx="0" cy="0"/>
+        </a:xfrm>
+      </p:grpSpPr>
+      <p:sp>
+        <p:nvSpPr>
+          <p:cNvPr id="2" name="Espace réservé de l'image des diapositives 1"/>
+          <p:cNvSpPr>
+            <a:spLocks noGrp="1" noRot="1" noChangeAspect="1"/>
+          </p:cNvSpPr>
+          <p:nvPr>
+            <p:ph type="sldImg"/>
+          </p:nvPr>
+        </p:nvSpPr>
+        <p:spPr>
+          <a:xfrm>
+            <a:off x="381000" y="685800"/>
+            <a:ext cx="6096000" cy="3429000"/>
+          </a:xfrm>
+        </p:spPr>
+      </p:sp>
+      <p:sp>
+        <p:nvSpPr>
+          <p:cNvPr id="3" name="Espace réservé des commentaires 2"/>
+          <p:cNvSpPr>
+            <a:spLocks noGrp="1"/>
+          </p:cNvSpPr>
+          <p:nvPr>
+            <p:ph type="body" idx="1"/>
+          </p:nvPr>
+        </p:nvSpPr>
+        <p:spPr/>
+        <p:txBody>
+          <a:bodyPr/>
+          <a:lstStyle/>
+          <a:p>
+            <a:r>
+              <a:rPr lang="fr-FR" baseline="0" dirty="0"/>
+              <a:t>Thomas</a:t>
+            </a:r>
+          </a:p>
+        </p:txBody>
+      </p:sp>
+      <p:sp>
+        <p:nvSpPr>
+          <p:cNvPr id="4" name="Espace réservé du numéro de diapositive 3"/>
+          <p:cNvSpPr>
+            <a:spLocks noGrp="1"/>
+          </p:cNvSpPr>
+          <p:nvPr>
+            <p:ph type="sldNum" sz="quarter" idx="10"/>
+          </p:nvPr>
+        </p:nvSpPr>
+        <p:spPr/>
+        <p:txBody>
+          <a:bodyPr/>
+          <a:lstStyle/>
+          <a:p>
+            <a:fld id="{A8A338DB-4614-4EB6-8F24-D592A5BC5FE8}" type="slidenum">
+              <a:rPr lang="fr-FR" smtClean="0"/>
+              <a:t>31</a:t>
+            </a:fld>
+            <a:endParaRPr lang="fr-FR"/>
+          </a:p>
+        </p:txBody>
+      </p:sp>
+    </p:spTree>
+    <p:extLst>
+      <p:ext uri="{BB962C8B-B14F-4D97-AF65-F5344CB8AC3E}">
+        <p14:creationId xmlns:p14="http://schemas.microsoft.com/office/powerpoint/2010/main" val="3143041290"/>
       </p:ext>
     </p:extLst>
   </p:cSld>
@@ -3029,7 +3401,7 @@
           <a:p>
             <a:fld id="{8E456E47-09BE-4F0B-A607-76863A385685}" type="datetime1">
               <a:rPr lang="fr-FR" smtClean="0"/>
-              <a:t>01/02/2021</a:t>
+              <a:t>21/02/2021</a:t>
             </a:fld>
             <a:endParaRPr lang="fr-FR"/>
           </a:p>
@@ -3230,7 +3602,7 @@
           <a:p>
             <a:fld id="{656C7797-979F-426F-8113-4B36935FE22D}" type="datetime1">
               <a:rPr lang="fr-FR" smtClean="0"/>
-              <a:t>01/02/2021</a:t>
+              <a:t>21/02/2021</a:t>
             </a:fld>
             <a:endParaRPr lang="fr-FR"/>
           </a:p>
@@ -3441,7 +3813,7 @@
           <a:p>
             <a:fld id="{97524F34-8B98-494A-8857-F499183F830E}" type="datetime1">
               <a:rPr lang="fr-FR" smtClean="0"/>
-              <a:t>01/02/2021</a:t>
+              <a:t>21/02/2021</a:t>
             </a:fld>
             <a:endParaRPr lang="fr-FR"/>
           </a:p>
@@ -3642,7 +4014,7 @@
           <a:p>
             <a:fld id="{AC5DC7DD-1E67-44E3-9781-44D1A37D3BFE}" type="datetime1">
               <a:rPr lang="fr-FR" smtClean="0"/>
-              <a:t>01/02/2021</a:t>
+              <a:t>21/02/2021</a:t>
             </a:fld>
             <a:endParaRPr lang="fr-FR"/>
           </a:p>
@@ -3920,7 +4292,7 @@
           <a:p>
             <a:fld id="{022C904C-DB92-46D5-B9D3-C3CFC8D3C3AD}" type="datetime1">
               <a:rPr lang="fr-FR" smtClean="0"/>
-              <a:t>01/02/2021</a:t>
+              <a:t>21/02/2021</a:t>
             </a:fld>
             <a:endParaRPr lang="fr-FR"/>
           </a:p>
@@ -4188,7 +4560,7 @@
           <a:p>
             <a:fld id="{33D02AF7-01EC-422B-8B8F-583C341765CD}" type="datetime1">
               <a:rPr lang="fr-FR" smtClean="0"/>
-              <a:t>01/02/2021</a:t>
+              <a:t>21/02/2021</a:t>
             </a:fld>
             <a:endParaRPr lang="fr-FR"/>
           </a:p>
@@ -4603,7 +4975,7 @@
           <a:p>
             <a:fld id="{02C7BDD6-B409-452D-A54D-CE517282C24E}" type="datetime1">
               <a:rPr lang="fr-FR" smtClean="0"/>
-              <a:t>01/02/2021</a:t>
+              <a:t>21/02/2021</a:t>
             </a:fld>
             <a:endParaRPr lang="fr-FR"/>
           </a:p>
@@ -4747,7 +5119,7 @@
           <a:p>
             <a:fld id="{4DF29CC9-A9DE-462E-A362-CF7B2B446041}" type="datetime1">
               <a:rPr lang="fr-FR" smtClean="0"/>
-              <a:t>01/02/2021</a:t>
+              <a:t>21/02/2021</a:t>
             </a:fld>
             <a:endParaRPr lang="fr-FR"/>
           </a:p>
@@ -4863,7 +5235,7 @@
           <a:p>
             <a:fld id="{2578ECAF-7B2C-442E-8E5C-FAC0949CB9CC}" type="datetime1">
               <a:rPr lang="fr-FR" smtClean="0"/>
-              <a:t>01/02/2021</a:t>
+              <a:t>21/02/2021</a:t>
             </a:fld>
             <a:endParaRPr lang="fr-FR"/>
           </a:p>
@@ -5177,7 +5549,7 @@
           <a:p>
             <a:fld id="{8D2B5F36-1A52-4FD1-9F6E-A2D43B96372C}" type="datetime1">
               <a:rPr lang="fr-FR" smtClean="0"/>
-              <a:t>01/02/2021</a:t>
+              <a:t>21/02/2021</a:t>
             </a:fld>
             <a:endParaRPr lang="fr-FR"/>
           </a:p>
@@ -5468,7 +5840,7 @@
           <a:p>
             <a:fld id="{0B89A1FA-1301-4071-96C9-C7DC9578DBB1}" type="datetime1">
               <a:rPr lang="fr-FR" smtClean="0"/>
-              <a:t>01/02/2021</a:t>
+              <a:t>21/02/2021</a:t>
             </a:fld>
             <a:endParaRPr lang="fr-FR"/>
           </a:p>
@@ -5712,7 +6084,7 @@
           <a:p>
             <a:fld id="{4AFCBC2A-6B84-4A42-9DBC-ED1FFAD42688}" type="datetime1">
               <a:rPr lang="fr-FR" smtClean="0"/>
-              <a:t>01/02/2021</a:t>
+              <a:t>21/02/2021</a:t>
             </a:fld>
             <a:endParaRPr lang="fr-FR"/>
           </a:p>
@@ -8130,7 +8502,23 @@
             <a:pPr algn="l"/>
             <a:r>
               <a:rPr lang="fr-FR" sz="3200" dirty="0"/>
-              <a:t>Interface – Développeur</a:t>
+              <a:t>Interface – « </a:t>
+            </a:r>
+            <a:r>
+              <a:rPr lang="fr-FR" sz="3200" dirty="0" err="1"/>
+              <a:t>Technical</a:t>
+            </a:r>
+            <a:r>
+              <a:rPr lang="fr-FR" sz="3200" dirty="0"/>
+              <a:t> </a:t>
+            </a:r>
+            <a:r>
+              <a:rPr lang="fr-FR" sz="3200" dirty="0" err="1"/>
+              <a:t>Artist</a:t>
+            </a:r>
+            <a:r>
+              <a:rPr lang="fr-FR" sz="3200" dirty="0"/>
+              <a:t> 2 »</a:t>
             </a:r>
           </a:p>
         </p:txBody>
@@ -8398,8 +8786,8 @@
         </p:nvSpPr>
         <p:spPr>
           <a:xfrm>
-            <a:off x="4470400" y="1926312"/>
-            <a:ext cx="5479856" cy="3564878"/>
+            <a:off x="6609842" y="1926312"/>
+            <a:ext cx="3340413" cy="3564878"/>
           </a:xfrm>
           <a:prstGeom prst="rect">
             <a:avLst/>
@@ -8497,7 +8885,7 @@
         <p:spPr>
           <a:xfrm>
             <a:off x="2385292" y="1926304"/>
-            <a:ext cx="2085108" cy="3564878"/>
+            <a:ext cx="1479701" cy="1002507"/>
           </a:xfrm>
           <a:prstGeom prst="rect">
             <a:avLst/>
@@ -8545,8 +8933,8 @@
         </p:nvSpPr>
         <p:spPr>
           <a:xfrm>
-            <a:off x="2385292" y="5491182"/>
-            <a:ext cx="7564964" cy="1230293"/>
+            <a:off x="2385292" y="2928812"/>
+            <a:ext cx="1479701" cy="2562378"/>
           </a:xfrm>
           <a:prstGeom prst="rect">
             <a:avLst/>
@@ -8592,7 +8980,7 @@
         </p:nvSpPr>
         <p:spPr>
           <a:xfrm>
-            <a:off x="6609843" y="3422407"/>
+            <a:off x="7679563" y="3370110"/>
             <a:ext cx="1200970" cy="646331"/>
           </a:xfrm>
           <a:prstGeom prst="rect">
@@ -8630,7 +9018,7 @@
         </p:nvSpPr>
         <p:spPr>
           <a:xfrm>
-            <a:off x="2609966" y="3016244"/>
+            <a:off x="2268719" y="2107478"/>
             <a:ext cx="1596274" cy="646331"/>
           </a:xfrm>
           <a:prstGeom prst="rect">
@@ -8666,8 +9054,8 @@
         </p:nvSpPr>
         <p:spPr>
           <a:xfrm>
-            <a:off x="4545386" y="5987018"/>
-            <a:ext cx="3101234" cy="369332"/>
+            <a:off x="2385292" y="3884072"/>
+            <a:ext cx="1418529" cy="369332"/>
           </a:xfrm>
           <a:prstGeom prst="rect">
             <a:avLst/>
@@ -8683,7 +9071,7 @@
             <a:pPr algn="ctr"/>
             <a:r>
               <a:rPr lang="fr-FR" dirty="0"/>
-              <a:t>Console Web / Monitoring Perf</a:t>
+              <a:t>Console Web</a:t>
             </a:r>
           </a:p>
         </p:txBody>
@@ -8726,10 +9114,178 @@
       </p:sp>
       <p:sp>
         <p:nvSpPr>
-          <p:cNvPr id="15" name="Espace réservé du pied de page 14">
-            <a:extLst>
-              <a:ext uri="{FF2B5EF4-FFF2-40B4-BE49-F238E27FC236}">
-                <a16:creationId xmlns:a16="http://schemas.microsoft.com/office/drawing/2014/main" id="{7C882A17-4BB5-43DD-B69B-E0F91B3747B9}"/>
+          <p:cNvPr id="15" name="Rectangle 14">
+            <a:extLst>
+              <a:ext uri="{FF2B5EF4-FFF2-40B4-BE49-F238E27FC236}">
+                <a16:creationId xmlns:a16="http://schemas.microsoft.com/office/drawing/2014/main" id="{BDFC873A-8D2E-4DAB-84D5-1242EBD94738}"/>
+              </a:ext>
+            </a:extLst>
+          </p:cNvPr>
+          <p:cNvSpPr/>
+          <p:nvPr/>
+        </p:nvSpPr>
+        <p:spPr>
+          <a:xfrm>
+            <a:off x="3803821" y="1926304"/>
+            <a:ext cx="2806020" cy="3564878"/>
+          </a:xfrm>
+          <a:prstGeom prst="rect">
+            <a:avLst/>
+          </a:prstGeom>
+          <a:ln>
+            <a:noFill/>
+          </a:ln>
+        </p:spPr>
+        <p:style>
+          <a:lnRef idx="3">
+            <a:schemeClr val="lt1"/>
+          </a:lnRef>
+          <a:fillRef idx="1">
+            <a:schemeClr val="accent3"/>
+          </a:fillRef>
+          <a:effectRef idx="1">
+            <a:schemeClr val="accent3"/>
+          </a:effectRef>
+          <a:fontRef idx="minor">
+            <a:schemeClr val="lt1"/>
+          </a:fontRef>
+        </p:style>
+        <p:txBody>
+          <a:bodyPr rtlCol="0" anchor="ctr"/>
+          <a:lstStyle/>
+          <a:p>
+            <a:pPr algn="ctr"/>
+            <a:endParaRPr lang="fr-FR"/>
+          </a:p>
+        </p:txBody>
+      </p:sp>
+      <p:sp>
+        <p:nvSpPr>
+          <p:cNvPr id="16" name="ZoneTexte 15">
+            <a:extLst>
+              <a:ext uri="{FF2B5EF4-FFF2-40B4-BE49-F238E27FC236}">
+                <a16:creationId xmlns:a16="http://schemas.microsoft.com/office/drawing/2014/main" id="{66F16552-9655-4C1F-8528-F50B925EEE21}"/>
+              </a:ext>
+            </a:extLst>
+          </p:cNvPr>
+          <p:cNvSpPr txBox="1"/>
+          <p:nvPr/>
+        </p:nvSpPr>
+        <p:spPr>
+          <a:xfrm>
+            <a:off x="3895009" y="3367442"/>
+            <a:ext cx="2622577" cy="369332"/>
+          </a:xfrm>
+          <a:prstGeom prst="rect">
+            <a:avLst/>
+          </a:prstGeom>
+          <a:noFill/>
+        </p:spPr>
+        <p:txBody>
+          <a:bodyPr wrap="none" rtlCol="0">
+            <a:spAutoFit/>
+          </a:bodyPr>
+          <a:lstStyle/>
+          <a:p>
+            <a:r>
+              <a:rPr lang="fr-FR" dirty="0"/>
+              <a:t>Runtime Web – Page Web</a:t>
+            </a:r>
+          </a:p>
+        </p:txBody>
+      </p:sp>
+      <p:sp>
+        <p:nvSpPr>
+          <p:cNvPr id="17" name="Rectangle 16">
+            <a:extLst>
+              <a:ext uri="{FF2B5EF4-FFF2-40B4-BE49-F238E27FC236}">
+                <a16:creationId xmlns:a16="http://schemas.microsoft.com/office/drawing/2014/main" id="{CFFBCAC9-38E3-4558-BA09-B0B68C794456}"/>
+              </a:ext>
+            </a:extLst>
+          </p:cNvPr>
+          <p:cNvSpPr/>
+          <p:nvPr/>
+        </p:nvSpPr>
+        <p:spPr>
+          <a:xfrm>
+            <a:off x="2390140" y="5460238"/>
+            <a:ext cx="7560115" cy="1355543"/>
+          </a:xfrm>
+          <a:prstGeom prst="rect">
+            <a:avLst/>
+          </a:prstGeom>
+          <a:solidFill>
+            <a:srgbClr val="FF5050"/>
+          </a:solidFill>
+          <a:ln>
+            <a:noFill/>
+          </a:ln>
+        </p:spPr>
+        <p:style>
+          <a:lnRef idx="3">
+            <a:schemeClr val="lt1"/>
+          </a:lnRef>
+          <a:fillRef idx="1">
+            <a:schemeClr val="accent4"/>
+          </a:fillRef>
+          <a:effectRef idx="1">
+            <a:schemeClr val="accent4"/>
+          </a:effectRef>
+          <a:fontRef idx="minor">
+            <a:schemeClr val="lt1"/>
+          </a:fontRef>
+        </p:style>
+        <p:txBody>
+          <a:bodyPr rtlCol="0" anchor="ctr"/>
+          <a:lstStyle/>
+          <a:p>
+            <a:pPr algn="ctr"/>
+            <a:endParaRPr lang="fr-FR"/>
+          </a:p>
+        </p:txBody>
+      </p:sp>
+      <p:sp>
+        <p:nvSpPr>
+          <p:cNvPr id="18" name="ZoneTexte 17">
+            <a:extLst>
+              <a:ext uri="{FF2B5EF4-FFF2-40B4-BE49-F238E27FC236}">
+                <a16:creationId xmlns:a16="http://schemas.microsoft.com/office/drawing/2014/main" id="{45096A8E-8A04-421E-A4F7-0E76CCC732EA}"/>
+              </a:ext>
+            </a:extLst>
+          </p:cNvPr>
+          <p:cNvSpPr txBox="1"/>
+          <p:nvPr/>
+        </p:nvSpPr>
+        <p:spPr>
+          <a:xfrm>
+            <a:off x="4474930" y="5987018"/>
+            <a:ext cx="3242138" cy="369332"/>
+          </a:xfrm>
+          <a:prstGeom prst="rect">
+            <a:avLst/>
+          </a:prstGeom>
+          <a:noFill/>
+        </p:spPr>
+        <p:txBody>
+          <a:bodyPr wrap="square" rtlCol="0">
+            <a:spAutoFit/>
+          </a:bodyPr>
+          <a:lstStyle/>
+          <a:p>
+            <a:pPr algn="ctr"/>
+            <a:r>
+              <a:rPr lang="fr-FR" dirty="0"/>
+              <a:t>Toolbox – Liste des Widgets</a:t>
+            </a:r>
+          </a:p>
+        </p:txBody>
+      </p:sp>
+      <p:sp>
+        <p:nvSpPr>
+          <p:cNvPr id="19" name="Espace réservé du pied de page 18">
+            <a:extLst>
+              <a:ext uri="{FF2B5EF4-FFF2-40B4-BE49-F238E27FC236}">
+                <a16:creationId xmlns:a16="http://schemas.microsoft.com/office/drawing/2014/main" id="{9BC81E01-786B-4624-94AC-6B9BCD2C103F}"/>
               </a:ext>
             </a:extLst>
           </p:cNvPr>
@@ -8755,7 +9311,7 @@
     </p:spTree>
     <p:extLst>
       <p:ext uri="{BB962C8B-B14F-4D97-AF65-F5344CB8AC3E}">
-        <p14:creationId xmlns:p14="http://schemas.microsoft.com/office/powerpoint/2010/main" val="153116254"/>
+        <p14:creationId xmlns:p14="http://schemas.microsoft.com/office/powerpoint/2010/main" val="3175879823"/>
       </p:ext>
     </p:extLst>
   </p:cSld>
@@ -8819,7 +9375,7 @@
             <a:pPr algn="l"/>
             <a:r>
               <a:rPr lang="fr-FR" sz="3200" dirty="0"/>
-              <a:t>Interface – Développeur Bis</a:t>
+              <a:t>Interface – Développeur</a:t>
             </a:r>
           </a:p>
         </p:txBody>
@@ -9320,7 +9876,7 @@
         <p:spPr>
           <a:xfrm>
             <a:off x="2609966" y="3016244"/>
-            <a:ext cx="1596274" cy="800219"/>
+            <a:ext cx="1596274" cy="646331"/>
           </a:xfrm>
           <a:prstGeom prst="rect">
             <a:avLst/>
@@ -9336,14 +9892,7 @@
             <a:pPr algn="ctr"/>
             <a:r>
               <a:rPr lang="fr-FR" dirty="0"/>
-              <a:t>MSDN </a:t>
-            </a:r>
-          </a:p>
-          <a:p>
-            <a:pPr algn="ctr"/>
-            <a:r>
-              <a:rPr lang="fr-FR" sz="1400" dirty="0"/>
-              <a:t>(page de documentation)</a:t>
+              <a:t>Liste des fichiers</a:t>
             </a:r>
           </a:p>
         </p:txBody>
@@ -9425,7 +9974,7 @@
           <p:cNvPr id="15" name="Espace réservé du pied de page 14">
             <a:extLst>
               <a:ext uri="{FF2B5EF4-FFF2-40B4-BE49-F238E27FC236}">
-                <a16:creationId xmlns:a16="http://schemas.microsoft.com/office/drawing/2014/main" id="{B8595EE1-0355-41B0-AED4-D646EC0CE610}"/>
+                <a16:creationId xmlns:a16="http://schemas.microsoft.com/office/drawing/2014/main" id="{7C882A17-4BB5-43DD-B69B-E0F91B3747B9}"/>
               </a:ext>
             </a:extLst>
           </p:cNvPr>
@@ -9451,7 +10000,7 @@
     </p:spTree>
     <p:extLst>
       <p:ext uri="{BB962C8B-B14F-4D97-AF65-F5344CB8AC3E}">
-        <p14:creationId xmlns:p14="http://schemas.microsoft.com/office/powerpoint/2010/main" val="2926707754"/>
+        <p14:creationId xmlns:p14="http://schemas.microsoft.com/office/powerpoint/2010/main" val="153116254"/>
       </p:ext>
     </p:extLst>
   </p:cSld>
@@ -9515,7 +10064,7 @@
             <a:pPr algn="l"/>
             <a:r>
               <a:rPr lang="fr-FR" sz="3200" dirty="0"/>
-              <a:t>Interface – Développeur 2</a:t>
+              <a:t>Interface – Développeur Bis</a:t>
             </a:r>
           </a:p>
         </p:txBody>
@@ -9783,8 +10332,8 @@
         </p:nvSpPr>
         <p:spPr>
           <a:xfrm>
-            <a:off x="6609842" y="1926312"/>
-            <a:ext cx="3340413" cy="3564878"/>
+            <a:off x="4470400" y="1926312"/>
+            <a:ext cx="5479856" cy="3564878"/>
           </a:xfrm>
           <a:prstGeom prst="rect">
             <a:avLst/>
@@ -9882,7 +10431,7 @@
         <p:spPr>
           <a:xfrm>
             <a:off x="2385292" y="1926304"/>
-            <a:ext cx="1479701" cy="1002507"/>
+            <a:ext cx="2085108" cy="3564878"/>
           </a:xfrm>
           <a:prstGeom prst="rect">
             <a:avLst/>
@@ -9930,8 +10479,8 @@
         </p:nvSpPr>
         <p:spPr>
           <a:xfrm>
-            <a:off x="2385292" y="2928812"/>
-            <a:ext cx="1479701" cy="2562378"/>
+            <a:off x="2385292" y="5491182"/>
+            <a:ext cx="7564964" cy="1230293"/>
           </a:xfrm>
           <a:prstGeom prst="rect">
             <a:avLst/>
@@ -9977,7 +10526,7 @@
         </p:nvSpPr>
         <p:spPr>
           <a:xfrm>
-            <a:off x="7679563" y="3370110"/>
+            <a:off x="6609843" y="3422407"/>
             <a:ext cx="1200970" cy="646331"/>
           </a:xfrm>
           <a:prstGeom prst="rect">
@@ -10015,8 +10564,8 @@
         </p:nvSpPr>
         <p:spPr>
           <a:xfrm>
-            <a:off x="2268719" y="2107478"/>
-            <a:ext cx="1596274" cy="646331"/>
+            <a:off x="2609966" y="3016244"/>
+            <a:ext cx="1596274" cy="800219"/>
           </a:xfrm>
           <a:prstGeom prst="rect">
             <a:avLst/>
@@ -10032,7 +10581,14 @@
             <a:pPr algn="ctr"/>
             <a:r>
               <a:rPr lang="fr-FR" dirty="0"/>
-              <a:t>Liste des fichiers</a:t>
+              <a:t>MSDN </a:t>
+            </a:r>
+          </a:p>
+          <a:p>
+            <a:pPr algn="ctr"/>
+            <a:r>
+              <a:rPr lang="fr-FR" sz="1400" dirty="0"/>
+              <a:t>(page de documentation)</a:t>
             </a:r>
           </a:p>
         </p:txBody>
@@ -10051,8 +10607,8 @@
         </p:nvSpPr>
         <p:spPr>
           <a:xfrm>
-            <a:off x="2385292" y="3884072"/>
-            <a:ext cx="1418529" cy="369332"/>
+            <a:off x="4545386" y="5987018"/>
+            <a:ext cx="3101234" cy="369332"/>
           </a:xfrm>
           <a:prstGeom prst="rect">
             <a:avLst/>
@@ -10068,7 +10624,7 @@
             <a:pPr algn="ctr"/>
             <a:r>
               <a:rPr lang="fr-FR" dirty="0"/>
-              <a:t>Console Web</a:t>
+              <a:t>Console Web / Monitoring Perf</a:t>
             </a:r>
           </a:p>
         </p:txBody>
@@ -10111,178 +10667,10 @@
       </p:sp>
       <p:sp>
         <p:nvSpPr>
-          <p:cNvPr id="15" name="Rectangle 14">
-            <a:extLst>
-              <a:ext uri="{FF2B5EF4-FFF2-40B4-BE49-F238E27FC236}">
-                <a16:creationId xmlns:a16="http://schemas.microsoft.com/office/drawing/2014/main" id="{BDFC873A-8D2E-4DAB-84D5-1242EBD94738}"/>
-              </a:ext>
-            </a:extLst>
-          </p:cNvPr>
-          <p:cNvSpPr/>
-          <p:nvPr/>
-        </p:nvSpPr>
-        <p:spPr>
-          <a:xfrm>
-            <a:off x="3803821" y="1926304"/>
-            <a:ext cx="2806020" cy="3564878"/>
-          </a:xfrm>
-          <a:prstGeom prst="rect">
-            <a:avLst/>
-          </a:prstGeom>
-          <a:ln>
-            <a:noFill/>
-          </a:ln>
-        </p:spPr>
-        <p:style>
-          <a:lnRef idx="3">
-            <a:schemeClr val="lt1"/>
-          </a:lnRef>
-          <a:fillRef idx="1">
-            <a:schemeClr val="accent3"/>
-          </a:fillRef>
-          <a:effectRef idx="1">
-            <a:schemeClr val="accent3"/>
-          </a:effectRef>
-          <a:fontRef idx="minor">
-            <a:schemeClr val="lt1"/>
-          </a:fontRef>
-        </p:style>
-        <p:txBody>
-          <a:bodyPr rtlCol="0" anchor="ctr"/>
-          <a:lstStyle/>
-          <a:p>
-            <a:pPr algn="ctr"/>
-            <a:endParaRPr lang="fr-FR"/>
-          </a:p>
-        </p:txBody>
-      </p:sp>
-      <p:sp>
-        <p:nvSpPr>
-          <p:cNvPr id="16" name="ZoneTexte 15">
-            <a:extLst>
-              <a:ext uri="{FF2B5EF4-FFF2-40B4-BE49-F238E27FC236}">
-                <a16:creationId xmlns:a16="http://schemas.microsoft.com/office/drawing/2014/main" id="{66F16552-9655-4C1F-8528-F50B925EEE21}"/>
-              </a:ext>
-            </a:extLst>
-          </p:cNvPr>
-          <p:cNvSpPr txBox="1"/>
-          <p:nvPr/>
-        </p:nvSpPr>
-        <p:spPr>
-          <a:xfrm>
-            <a:off x="3895009" y="3367442"/>
-            <a:ext cx="2622577" cy="369332"/>
-          </a:xfrm>
-          <a:prstGeom prst="rect">
-            <a:avLst/>
-          </a:prstGeom>
-          <a:noFill/>
-        </p:spPr>
-        <p:txBody>
-          <a:bodyPr wrap="none" rtlCol="0">
-            <a:spAutoFit/>
-          </a:bodyPr>
-          <a:lstStyle/>
-          <a:p>
-            <a:r>
-              <a:rPr lang="fr-FR" dirty="0"/>
-              <a:t>Runtime Web – Page Web</a:t>
-            </a:r>
-          </a:p>
-        </p:txBody>
-      </p:sp>
-      <p:sp>
-        <p:nvSpPr>
-          <p:cNvPr id="17" name="Rectangle 16">
-            <a:extLst>
-              <a:ext uri="{FF2B5EF4-FFF2-40B4-BE49-F238E27FC236}">
-                <a16:creationId xmlns:a16="http://schemas.microsoft.com/office/drawing/2014/main" id="{CFFBCAC9-38E3-4558-BA09-B0B68C794456}"/>
-              </a:ext>
-            </a:extLst>
-          </p:cNvPr>
-          <p:cNvSpPr/>
-          <p:nvPr/>
-        </p:nvSpPr>
-        <p:spPr>
-          <a:xfrm>
-            <a:off x="2390140" y="5460238"/>
-            <a:ext cx="7560115" cy="1355543"/>
-          </a:xfrm>
-          <a:prstGeom prst="rect">
-            <a:avLst/>
-          </a:prstGeom>
-          <a:solidFill>
-            <a:srgbClr val="FF5050"/>
-          </a:solidFill>
-          <a:ln>
-            <a:noFill/>
-          </a:ln>
-        </p:spPr>
-        <p:style>
-          <a:lnRef idx="3">
-            <a:schemeClr val="lt1"/>
-          </a:lnRef>
-          <a:fillRef idx="1">
-            <a:schemeClr val="accent4"/>
-          </a:fillRef>
-          <a:effectRef idx="1">
-            <a:schemeClr val="accent4"/>
-          </a:effectRef>
-          <a:fontRef idx="minor">
-            <a:schemeClr val="lt1"/>
-          </a:fontRef>
-        </p:style>
-        <p:txBody>
-          <a:bodyPr rtlCol="0" anchor="ctr"/>
-          <a:lstStyle/>
-          <a:p>
-            <a:pPr algn="ctr"/>
-            <a:endParaRPr lang="fr-FR"/>
-          </a:p>
-        </p:txBody>
-      </p:sp>
-      <p:sp>
-        <p:nvSpPr>
-          <p:cNvPr id="18" name="ZoneTexte 17">
-            <a:extLst>
-              <a:ext uri="{FF2B5EF4-FFF2-40B4-BE49-F238E27FC236}">
-                <a16:creationId xmlns:a16="http://schemas.microsoft.com/office/drawing/2014/main" id="{45096A8E-8A04-421E-A4F7-0E76CCC732EA}"/>
-              </a:ext>
-            </a:extLst>
-          </p:cNvPr>
-          <p:cNvSpPr txBox="1"/>
-          <p:nvPr/>
-        </p:nvSpPr>
-        <p:spPr>
-          <a:xfrm>
-            <a:off x="4474930" y="5987018"/>
-            <a:ext cx="3242138" cy="369332"/>
-          </a:xfrm>
-          <a:prstGeom prst="rect">
-            <a:avLst/>
-          </a:prstGeom>
-          <a:noFill/>
-        </p:spPr>
-        <p:txBody>
-          <a:bodyPr wrap="square" rtlCol="0">
-            <a:spAutoFit/>
-          </a:bodyPr>
-          <a:lstStyle/>
-          <a:p>
-            <a:pPr algn="ctr"/>
-            <a:r>
-              <a:rPr lang="fr-FR" dirty="0"/>
-              <a:t>Toolbox – Liste des Widgets</a:t>
-            </a:r>
-          </a:p>
-        </p:txBody>
-      </p:sp>
-      <p:sp>
-        <p:nvSpPr>
-          <p:cNvPr id="19" name="Espace réservé du pied de page 18">
-            <a:extLst>
-              <a:ext uri="{FF2B5EF4-FFF2-40B4-BE49-F238E27FC236}">
-                <a16:creationId xmlns:a16="http://schemas.microsoft.com/office/drawing/2014/main" id="{9BC81E01-786B-4624-94AC-6B9BCD2C103F}"/>
+          <p:cNvPr id="15" name="Espace réservé du pied de page 14">
+            <a:extLst>
+              <a:ext uri="{FF2B5EF4-FFF2-40B4-BE49-F238E27FC236}">
+                <a16:creationId xmlns:a16="http://schemas.microsoft.com/office/drawing/2014/main" id="{B8595EE1-0355-41B0-AED4-D646EC0CE610}"/>
               </a:ext>
             </a:extLst>
           </p:cNvPr>
@@ -10308,7 +10696,7 @@
     </p:spTree>
     <p:extLst>
       <p:ext uri="{BB962C8B-B14F-4D97-AF65-F5344CB8AC3E}">
-        <p14:creationId xmlns:p14="http://schemas.microsoft.com/office/powerpoint/2010/main" val="3175879823"/>
+        <p14:creationId xmlns:p14="http://schemas.microsoft.com/office/powerpoint/2010/main" val="2926707754"/>
       </p:ext>
     </p:extLst>
   </p:cSld>
@@ -13598,8 +13986,8 @@
         </p:nvSpPr>
         <p:spPr>
           <a:xfrm>
-            <a:off x="263118" y="781425"/>
-            <a:ext cx="5904656" cy="724942"/>
+            <a:off x="263117" y="781425"/>
+            <a:ext cx="6765755" cy="724942"/>
           </a:xfrm>
         </p:spPr>
         <p:txBody>
@@ -13608,10 +13996,9 @@
           </a:bodyPr>
           <a:lstStyle/>
           <a:p>
-            <a:pPr algn="l"/>
             <a:r>
               <a:rPr lang="fr-FR" sz="3200" dirty="0"/>
-              <a:t>Styles</a:t>
+              <a:t>CI/CD dans le web designer</a:t>
             </a:r>
           </a:p>
         </p:txBody>
@@ -13677,139 +14064,157 @@
         </p:spPr>
         <p:txBody>
           <a:bodyPr>
-            <a:normAutofit lnSpcReduction="10000"/>
+            <a:normAutofit/>
           </a:bodyPr>
           <a:lstStyle/>
           <a:p>
             <a:r>
-              <a:rPr lang="fr-FR" sz="2400" dirty="0"/>
-              <a:t>Revenir à l’essence d’un style :</a:t>
-            </a:r>
-          </a:p>
-          <a:p>
-            <a:pPr marL="0" indent="0" algn="ctr">
-              <a:buNone/>
-            </a:pPr>
-            <a:r>
-              <a:rPr lang="fr-FR" sz="2400" dirty="0">
+              <a:rPr lang="fr-FR" sz="2000" dirty="0">
                 <a:solidFill>
                   <a:srgbClr val="0070C0"/>
                 </a:solidFill>
               </a:rPr>
-              <a:t>Regrouper</a:t>
-            </a:r>
-            <a:r>
-              <a:rPr lang="fr-FR" sz="2400" dirty="0"/>
-              <a:t> un </a:t>
-            </a:r>
-            <a:r>
-              <a:rPr lang="fr-FR" sz="2400" dirty="0">
+              <a:t>Intégrer un outil </a:t>
+            </a:r>
+            <a:r>
+              <a:rPr lang="fr-FR" sz="2000" dirty="0"/>
+              <a:t>pour </a:t>
+            </a:r>
+            <a:r>
+              <a:rPr lang="fr-FR" sz="2000" dirty="0">
                 <a:solidFill>
                   <a:srgbClr val="0070C0"/>
                 </a:solidFill>
               </a:rPr>
-              <a:t>ensemble cohérent </a:t>
-            </a:r>
-            <a:r>
-              <a:rPr lang="fr-FR" sz="2400" dirty="0"/>
-              <a:t>sous une </a:t>
-            </a:r>
-            <a:r>
-              <a:rPr lang="fr-FR" sz="2400" dirty="0">
+              <a:t>gérer les versions </a:t>
+            </a:r>
+            <a:r>
+              <a:rPr lang="fr-FR" sz="2000" dirty="0"/>
+              <a:t>depuis le web designer </a:t>
+            </a:r>
+          </a:p>
+          <a:p>
+            <a:pPr lvl="1"/>
+            <a:r>
+              <a:rPr lang="fr-FR" sz="1600" dirty="0"/>
+              <a:t>Basique : API Git</a:t>
+            </a:r>
+          </a:p>
+          <a:p>
+            <a:pPr lvl="1"/>
+            <a:r>
+              <a:rPr lang="fr-FR" sz="1600" dirty="0"/>
+              <a:t>Outil plus poussé ?</a:t>
+            </a:r>
+          </a:p>
+          <a:p>
+            <a:pPr lvl="1"/>
+            <a:endParaRPr lang="fr-FR" sz="1600" dirty="0"/>
+          </a:p>
+          <a:p>
+            <a:r>
+              <a:rPr lang="fr-FR" sz="2000" dirty="0">
                 <a:solidFill>
                   <a:srgbClr val="0070C0"/>
                 </a:solidFill>
               </a:rPr>
-              <a:t>même direction artistique</a:t>
-            </a:r>
-          </a:p>
-          <a:p>
-            <a:pPr marL="0" indent="0" algn="ctr">
-              <a:buNone/>
-            </a:pPr>
-            <a:r>
-              <a:rPr lang="fr-FR" sz="2400" dirty="0">
-                <a:solidFill>
-                  <a:srgbClr val="FF0000"/>
+              <a:t>Automatiser le CI/CD </a:t>
+            </a:r>
+            <a:r>
+              <a:rPr lang="fr-FR" sz="2000" dirty="0"/>
+              <a:t>?</a:t>
+            </a:r>
+          </a:p>
+          <a:p>
+            <a:pPr lvl="1"/>
+            <a:r>
+              <a:rPr lang="fr-FR" sz="1600" dirty="0"/>
+              <a:t>= </a:t>
+            </a:r>
+            <a:r>
+              <a:rPr lang="fr-FR" sz="1600" dirty="0">
+                <a:solidFill>
+                  <a:srgbClr val="0070C0"/>
                 </a:solidFill>
               </a:rPr>
-              <a:t>≠ mettre un style différent pour chaque élément !</a:t>
-            </a:r>
+              <a:t>Automatiser l’automatisation</a:t>
+            </a:r>
+          </a:p>
+          <a:p>
+            <a:pPr lvl="1"/>
+            <a:r>
+              <a:rPr lang="fr-FR" sz="1600" dirty="0"/>
+              <a:t>Complètement </a:t>
+            </a:r>
+            <a:r>
+              <a:rPr lang="fr-FR" sz="1600" dirty="0">
+                <a:solidFill>
+                  <a:srgbClr val="0070C0"/>
+                </a:solidFill>
+              </a:rPr>
+              <a:t>nouveau</a:t>
+            </a:r>
+            <a:r>
+              <a:rPr lang="fr-FR" sz="1600" dirty="0"/>
+              <a:t> aujourd’hui (pas de concurrence)</a:t>
+            </a:r>
+          </a:p>
+          <a:p>
+            <a:pPr lvl="1"/>
+            <a:r>
+              <a:rPr lang="fr-FR" sz="1600" dirty="0">
+                <a:solidFill>
+                  <a:srgbClr val="0070C0"/>
+                </a:solidFill>
+              </a:rPr>
+              <a:t>Porte ouverte </a:t>
+            </a:r>
+            <a:r>
+              <a:rPr lang="fr-FR" sz="1600" dirty="0"/>
+              <a:t>vers gestion lien </a:t>
+            </a:r>
+            <a:r>
+              <a:rPr lang="fr-FR" sz="1600" dirty="0" err="1"/>
+              <a:t>back-end</a:t>
+            </a:r>
+            <a:r>
+              <a:rPr lang="fr-FR" sz="1600" dirty="0"/>
+              <a:t> (rendre le logiciel plus complet)</a:t>
+            </a:r>
+          </a:p>
+          <a:p>
+            <a:pPr lvl="1"/>
+            <a:r>
+              <a:rPr lang="fr-FR" sz="1600" dirty="0"/>
+              <a:t>Beaucoup de </a:t>
+            </a:r>
+            <a:r>
+              <a:rPr lang="fr-FR" sz="1600" dirty="0">
+                <a:solidFill>
+                  <a:srgbClr val="0070C0"/>
+                </a:solidFill>
+              </a:rPr>
+              <a:t>pistes possibles</a:t>
+            </a:r>
+          </a:p>
+          <a:p>
+            <a:pPr lvl="1"/>
+            <a:endParaRPr lang="fr-FR" sz="1600" dirty="0"/>
+          </a:p>
+          <a:p>
             <a:endParaRPr lang="fr-FR" sz="2000" dirty="0"/>
           </a:p>
           <a:p>
-            <a:r>
-              <a:rPr lang="fr-FR" sz="2400" dirty="0"/>
-              <a:t>Revenir à la définition artistique ? </a:t>
-            </a:r>
             <a:endParaRPr lang="fr-FR" sz="2000" dirty="0"/>
           </a:p>
           <a:p>
-            <a:endParaRPr lang="fr-FR" sz="2400" dirty="0"/>
-          </a:p>
-          <a:p>
-            <a:endParaRPr lang="fr-FR" sz="2400" dirty="0"/>
-          </a:p>
-          <a:p>
-            <a:r>
-              <a:rPr lang="fr-FR" sz="2400" dirty="0"/>
-              <a:t>Pistes :</a:t>
-            </a:r>
-          </a:p>
-          <a:p>
-            <a:pPr lvl="1"/>
             <a:r>
               <a:rPr lang="fr-FR" sz="2000" dirty="0"/>
-              <a:t>Mix entre CSS dans le HTML (personnalisé/</a:t>
-            </a:r>
-            <a:r>
-              <a:rPr lang="fr-FR" sz="2000" dirty="0" err="1"/>
-              <a:t>styleless</a:t>
-            </a:r>
-            <a:r>
-              <a:rPr lang="fr-FR" sz="2000" dirty="0"/>
-              <a:t>) et Style</a:t>
-            </a:r>
-          </a:p>
-          <a:p>
-            <a:pPr lvl="1"/>
-            <a:r>
-              <a:rPr lang="fr-FR" sz="2000" dirty="0"/>
-              <a:t>Créer des </a:t>
-            </a:r>
-            <a:r>
-              <a:rPr lang="fr-FR" sz="2000" dirty="0" err="1"/>
-              <a:t>superstyles</a:t>
-            </a:r>
-            <a:r>
-              <a:rPr lang="fr-FR" sz="2000" dirty="0"/>
-              <a:t> (des ensembles qui regroupent plusieurs styles CSS)</a:t>
-            </a:r>
-          </a:p>
-          <a:p>
-            <a:pPr lvl="2"/>
-            <a:r>
-              <a:rPr lang="fr-FR" sz="1600" dirty="0"/>
-              <a:t>Pour faire des palettes </a:t>
-            </a:r>
-          </a:p>
-          <a:p>
-            <a:pPr lvl="2"/>
-            <a:r>
-              <a:rPr lang="fr-FR" sz="1600" dirty="0"/>
-              <a:t>Pour faire des organisations riches (positionnements)</a:t>
-            </a:r>
-          </a:p>
-          <a:p>
-            <a:pPr lvl="2"/>
-            <a:r>
-              <a:rPr lang="fr-FR" sz="1600" dirty="0"/>
-              <a:t>Pour donner plus de sémantique/plus de modularité au projet</a:t>
-            </a:r>
-            <a:endParaRPr lang="fr-FR" sz="1200" dirty="0"/>
-          </a:p>
-          <a:p>
-            <a:endParaRPr lang="fr-FR" sz="2400" dirty="0"/>
+              <a:t>Quelques idées….</a:t>
+            </a:r>
+          </a:p>
+          <a:p>
+            <a:endParaRPr lang="fr-FR" sz="2000" dirty="0"/>
           </a:p>
         </p:txBody>
       </p:sp>
@@ -13978,7 +14383,7 @@
           <p:cNvPr id="3" name="Espace réservé du pied de page 2">
             <a:extLst>
               <a:ext uri="{FF2B5EF4-FFF2-40B4-BE49-F238E27FC236}">
-                <a16:creationId xmlns:a16="http://schemas.microsoft.com/office/drawing/2014/main" id="{E3F8CFDB-5067-4D8D-A24C-068EAC0EA5D5}"/>
+                <a16:creationId xmlns:a16="http://schemas.microsoft.com/office/drawing/2014/main" id="{61E4F19E-299A-4DBC-BD43-2B3AA1581E7C}"/>
               </a:ext>
             </a:extLst>
           </p:cNvPr>
@@ -14001,39 +14406,10 @@
           </a:p>
         </p:txBody>
       </p:sp>
-      <p:pic>
-        <p:nvPicPr>
-          <p:cNvPr id="5" name="Image 4">
-            <a:extLst>
-              <a:ext uri="{FF2B5EF4-FFF2-40B4-BE49-F238E27FC236}">
-                <a16:creationId xmlns:a16="http://schemas.microsoft.com/office/drawing/2014/main" id="{90AB5946-3D24-444A-8AB4-275C260A4E1F}"/>
-              </a:ext>
-            </a:extLst>
-          </p:cNvPr>
-          <p:cNvPicPr>
-            <a:picLocks noChangeAspect="1"/>
-          </p:cNvPicPr>
-          <p:nvPr/>
-        </p:nvPicPr>
-        <p:blipFill rotWithShape="1">
-          <a:blip r:embed="rId3"/>
-          <a:srcRect r="1600"/>
-          <a:stretch/>
-        </p:blipFill>
-        <p:spPr>
-          <a:xfrm>
-            <a:off x="1205949" y="3305229"/>
-            <a:ext cx="9111069" cy="875971"/>
-          </a:xfrm>
-          <a:prstGeom prst="rect">
-            <a:avLst/>
-          </a:prstGeom>
-        </p:spPr>
-      </p:pic>
     </p:spTree>
     <p:extLst>
       <p:ext uri="{BB962C8B-B14F-4D97-AF65-F5344CB8AC3E}">
-        <p14:creationId xmlns:p14="http://schemas.microsoft.com/office/powerpoint/2010/main" val="1235605715"/>
+        <p14:creationId xmlns:p14="http://schemas.microsoft.com/office/powerpoint/2010/main" val="3977852931"/>
       </p:ext>
     </p:extLst>
   </p:cSld>
@@ -14084,8 +14460,8 @@
         </p:nvSpPr>
         <p:spPr>
           <a:xfrm>
-            <a:off x="263118" y="781425"/>
-            <a:ext cx="5904656" cy="724942"/>
+            <a:off x="263117" y="781425"/>
+            <a:ext cx="8502192" cy="724942"/>
           </a:xfrm>
         </p:spPr>
         <p:txBody>
@@ -14094,12 +14470,10 @@
           </a:bodyPr>
           <a:lstStyle/>
           <a:p>
-            <a:pPr algn="l"/>
-            <a:r>
-              <a:rPr lang="fr-FR" sz="3200" dirty="0" err="1"/>
-              <a:t>Superstyles</a:t>
-            </a:r>
-            <a:endParaRPr lang="fr-FR" sz="3200" dirty="0"/>
+            <a:r>
+              <a:rPr lang="fr-FR" sz="3200" dirty="0"/>
+              <a:t>Piste 1 : générateur de pipeline de déploiement </a:t>
+            </a:r>
           </a:p>
         </p:txBody>
       </p:sp>
@@ -14169,99 +14543,227 @@
           <a:lstStyle/>
           <a:p>
             <a:r>
-              <a:rPr lang="fr-FR" sz="2400" dirty="0"/>
-              <a:t>Souvent dans le design les styles ne sont pas isolés mais ont un lien fort entre eux :</a:t>
-            </a:r>
-          </a:p>
-          <a:p>
-            <a:pPr marL="0" indent="0" algn="ctr">
-              <a:buNone/>
-            </a:pPr>
-            <a:r>
-              <a:rPr lang="fr-FR" sz="2400" dirty="0"/>
-              <a:t>Un « </a:t>
-            </a:r>
-            <a:r>
-              <a:rPr lang="fr-FR" sz="2400" dirty="0" err="1">
+              <a:rPr lang="fr-FR" sz="2000" dirty="0">
                 <a:solidFill>
                   <a:srgbClr val="0070C0"/>
                 </a:solidFill>
               </a:rPr>
-              <a:t>Superstyle</a:t>
-            </a:r>
-            <a:r>
-              <a:rPr lang="fr-FR" sz="2400" dirty="0"/>
-              <a:t> » est un ensemble/une </a:t>
-            </a:r>
-            <a:r>
-              <a:rPr lang="fr-FR" sz="2400" dirty="0">
+              <a:t>Générer</a:t>
+            </a:r>
+            <a:r>
+              <a:rPr lang="fr-FR" sz="2000" dirty="0"/>
+              <a:t> - selon des critères précis - un </a:t>
+            </a:r>
+            <a:r>
+              <a:rPr lang="fr-FR" sz="2000" dirty="0">
                 <a:solidFill>
                   <a:srgbClr val="0070C0"/>
                 </a:solidFill>
               </a:rPr>
-              <a:t>composante cohérent(e) d’un design</a:t>
-            </a:r>
-          </a:p>
-          <a:p>
-            <a:pPr marL="0" indent="0">
-              <a:buNone/>
-            </a:pPr>
-            <a:endParaRPr lang="fr-FR" sz="2400" dirty="0"/>
+              <a:t>système</a:t>
+            </a:r>
+            <a:r>
+              <a:rPr lang="fr-FR" sz="2000" dirty="0"/>
+              <a:t> complet de </a:t>
+            </a:r>
+            <a:r>
+              <a:rPr lang="fr-FR" sz="2000" dirty="0">
+                <a:solidFill>
+                  <a:srgbClr val="0070C0"/>
+                </a:solidFill>
+              </a:rPr>
+              <a:t>déploiement</a:t>
+            </a:r>
+            <a:r>
+              <a:rPr lang="fr-FR" sz="2000" dirty="0"/>
+              <a:t> adapté</a:t>
+            </a:r>
           </a:p>
           <a:p>
             <a:pPr lvl="1"/>
+            <a:r>
+              <a:rPr lang="fr-FR" sz="1600" dirty="0"/>
+              <a:t>On peut penser des « kits/</a:t>
+            </a:r>
+            <a:r>
+              <a:rPr lang="fr-FR" sz="1600" dirty="0" err="1"/>
+              <a:t>preset</a:t>
+            </a:r>
+            <a:r>
+              <a:rPr lang="fr-FR" sz="1600" dirty="0"/>
+              <a:t> » de déploiement (pour simplifier)</a:t>
+            </a:r>
+          </a:p>
+          <a:p>
+            <a:pPr lvl="1"/>
+            <a:r>
+              <a:rPr lang="fr-FR" sz="1600" dirty="0"/>
+              <a:t>S’adapter selon les besoins</a:t>
+            </a:r>
+          </a:p>
+          <a:p>
+            <a:pPr lvl="1"/>
+            <a:r>
+              <a:rPr lang="fr-FR" sz="1600" dirty="0"/>
+              <a:t>Enfin faire du propre dans la gestion du déploiement</a:t>
+            </a:r>
+          </a:p>
+          <a:p>
             <a:endParaRPr lang="fr-FR" sz="2000" dirty="0"/>
           </a:p>
           <a:p>
+            <a:r>
+              <a:rPr lang="fr-FR" sz="2000" dirty="0"/>
+              <a:t>Concrètement :</a:t>
+            </a:r>
+          </a:p>
+          <a:p>
             <a:pPr lvl="1"/>
             <a:r>
-              <a:rPr lang="fr-FR" sz="2000" dirty="0"/>
-              <a:t>Palette de couleurs pour un designer</a:t>
+              <a:rPr lang="fr-FR" sz="1600" dirty="0">
+                <a:solidFill>
+                  <a:srgbClr val="0070C0"/>
+                </a:solidFill>
+              </a:rPr>
+              <a:t>Génération</a:t>
+            </a:r>
+            <a:r>
+              <a:rPr lang="fr-FR" sz="1600" dirty="0"/>
+              <a:t> des </a:t>
+            </a:r>
+            <a:r>
+              <a:rPr lang="fr-FR" sz="1600" dirty="0">
+                <a:solidFill>
+                  <a:srgbClr val="0070C0"/>
+                </a:solidFill>
+              </a:rPr>
+              <a:t>scripts de </a:t>
+            </a:r>
+            <a:r>
+              <a:rPr lang="fr-FR" sz="1600" dirty="0" err="1">
+                <a:solidFill>
+                  <a:srgbClr val="0070C0"/>
+                </a:solidFill>
+              </a:rPr>
+              <a:t>build</a:t>
+            </a:r>
+            <a:r>
+              <a:rPr lang="fr-FR" sz="1600" dirty="0">
+                <a:solidFill>
+                  <a:srgbClr val="0070C0"/>
+                </a:solidFill>
+              </a:rPr>
+              <a:t> </a:t>
+            </a:r>
+            <a:r>
+              <a:rPr lang="fr-FR" sz="1600" dirty="0"/>
+              <a:t>(à un niveau basique) =&gt; (pom.xml, etc.)</a:t>
             </a:r>
           </a:p>
           <a:p>
             <a:pPr lvl="1"/>
-            <a:endParaRPr lang="fr-FR" sz="2000" dirty="0"/>
+            <a:r>
+              <a:rPr lang="fr-FR" sz="1600" dirty="0">
+                <a:solidFill>
+                  <a:srgbClr val="0070C0"/>
+                </a:solidFill>
+              </a:rPr>
+              <a:t>Automatisation</a:t>
+            </a:r>
+            <a:r>
+              <a:rPr lang="fr-FR" sz="1600" dirty="0"/>
+              <a:t> de </a:t>
+            </a:r>
+            <a:r>
+              <a:rPr lang="fr-FR" sz="1600" dirty="0">
+                <a:solidFill>
+                  <a:srgbClr val="0070C0"/>
+                </a:solidFill>
+              </a:rPr>
+              <a:t>l’allocation</a:t>
+            </a:r>
+            <a:r>
+              <a:rPr lang="fr-FR" sz="1600" dirty="0"/>
+              <a:t> des </a:t>
+            </a:r>
+            <a:r>
+              <a:rPr lang="fr-FR" sz="1600" dirty="0">
+                <a:solidFill>
+                  <a:srgbClr val="0070C0"/>
+                </a:solidFill>
+              </a:rPr>
+              <a:t>ressources</a:t>
+            </a:r>
+            <a:r>
+              <a:rPr lang="fr-FR" sz="1600" dirty="0"/>
+              <a:t> adaptées (dockers, VM, etc.)</a:t>
+            </a:r>
           </a:p>
           <a:p>
             <a:pPr lvl="1"/>
-            <a:endParaRPr lang="fr-FR" sz="2000" dirty="0"/>
+            <a:r>
+              <a:rPr lang="fr-FR" sz="1600" dirty="0">
+                <a:solidFill>
+                  <a:srgbClr val="0070C0"/>
+                </a:solidFill>
+              </a:rPr>
+              <a:t>Gestion</a:t>
+            </a:r>
+            <a:r>
+              <a:rPr lang="fr-FR" sz="1600" dirty="0"/>
+              <a:t> clean des </a:t>
+            </a:r>
+            <a:r>
+              <a:rPr lang="fr-FR" sz="1600" dirty="0" err="1">
+                <a:solidFill>
+                  <a:srgbClr val="0070C0"/>
+                </a:solidFill>
+              </a:rPr>
+              <a:t>credentials</a:t>
+            </a:r>
+            <a:r>
+              <a:rPr lang="fr-FR" sz="1600" dirty="0"/>
+              <a:t> et différents comptes</a:t>
+            </a:r>
           </a:p>
           <a:p>
             <a:pPr lvl="1"/>
-            <a:endParaRPr lang="fr-FR" sz="2000" dirty="0"/>
-          </a:p>
-          <a:p>
-            <a:pPr lvl="1"/>
-            <a:r>
-              <a:rPr lang="fr-FR" sz="2000" dirty="0"/>
-              <a:t>Organisation générale des informations</a:t>
-            </a:r>
-          </a:p>
-          <a:p>
-            <a:pPr lvl="2"/>
+            <a:r>
+              <a:rPr lang="fr-FR" sz="1600" dirty="0">
+                <a:solidFill>
+                  <a:srgbClr val="0070C0"/>
+                </a:solidFill>
+              </a:rPr>
+              <a:t>Génération</a:t>
+            </a:r>
             <a:r>
               <a:rPr lang="fr-FR" sz="1600" dirty="0"/>
-              <a:t>Avoir un style épuré</a:t>
-            </a:r>
-          </a:p>
-          <a:p>
-            <a:pPr lvl="2"/>
+              <a:t> des </a:t>
+            </a:r>
+            <a:r>
+              <a:rPr lang="fr-FR" sz="1600" dirty="0">
+                <a:solidFill>
+                  <a:srgbClr val="0070C0"/>
+                </a:solidFill>
+              </a:rPr>
+              <a:t>scripts</a:t>
+            </a:r>
             <a:r>
               <a:rPr lang="fr-FR" sz="1600" dirty="0"/>
-              <a:t>Avoir un style informatif</a:t>
-            </a:r>
-          </a:p>
-          <a:p>
-            <a:pPr lvl="2"/>
+              <a:t> de </a:t>
+            </a:r>
+            <a:r>
+              <a:rPr lang="fr-FR" sz="1600" dirty="0">
+                <a:solidFill>
+                  <a:srgbClr val="0070C0"/>
+                </a:solidFill>
+              </a:rPr>
+              <a:t>déploiement</a:t>
+            </a:r>
             <a:r>
               <a:rPr lang="fr-FR" sz="1600" dirty="0"/>
-              <a:t>Etc. </a:t>
-            </a:r>
-          </a:p>
-          <a:p>
-            <a:pPr lvl="1"/>
-            <a:endParaRPr lang="fr-FR" sz="2000" dirty="0"/>
+              <a:t> (et leurs fichiers de config)</a:t>
+            </a:r>
           </a:p>
         </p:txBody>
       </p:sp>
@@ -14430,7 +14932,7 @@
           <p:cNvPr id="3" name="Espace réservé du pied de page 2">
             <a:extLst>
               <a:ext uri="{FF2B5EF4-FFF2-40B4-BE49-F238E27FC236}">
-                <a16:creationId xmlns:a16="http://schemas.microsoft.com/office/drawing/2014/main" id="{E3F8CFDB-5067-4D8D-A24C-068EAC0EA5D5}"/>
+                <a16:creationId xmlns:a16="http://schemas.microsoft.com/office/drawing/2014/main" id="{61E4F19E-299A-4DBC-BD43-2B3AA1581E7C}"/>
               </a:ext>
             </a:extLst>
           </p:cNvPr>
@@ -14453,40 +14955,10 @@
           </a:p>
         </p:txBody>
       </p:sp>
-      <p:pic>
-        <p:nvPicPr>
-          <p:cNvPr id="5" name="Image 4">
-            <a:extLst>
-              <a:ext uri="{FF2B5EF4-FFF2-40B4-BE49-F238E27FC236}">
-                <a16:creationId xmlns:a16="http://schemas.microsoft.com/office/drawing/2014/main" id="{9F69DD28-09E0-405B-8721-157FE934524F}"/>
-              </a:ext>
-            </a:extLst>
-          </p:cNvPr>
-          <p:cNvPicPr>
-            <a:picLocks noChangeAspect="1"/>
-          </p:cNvPicPr>
-          <p:nvPr/>
-        </p:nvPicPr>
-        <p:blipFill>
-          <a:blip r:embed="rId3"/>
-          <a:stretch>
-            <a:fillRect/>
-          </a:stretch>
-        </p:blipFill>
-        <p:spPr>
-          <a:xfrm>
-            <a:off x="5850123" y="2983229"/>
-            <a:ext cx="2635600" cy="1634836"/>
-          </a:xfrm>
-          <a:prstGeom prst="rect">
-            <a:avLst/>
-          </a:prstGeom>
-        </p:spPr>
-      </p:pic>
     </p:spTree>
     <p:extLst>
       <p:ext uri="{BB962C8B-B14F-4D97-AF65-F5344CB8AC3E}">
-        <p14:creationId xmlns:p14="http://schemas.microsoft.com/office/powerpoint/2010/main" val="4248321424"/>
+        <p14:creationId xmlns:p14="http://schemas.microsoft.com/office/powerpoint/2010/main" val="2347339549"/>
       </p:ext>
     </p:extLst>
   </p:cSld>
@@ -14537,8 +15009,8 @@
         </p:nvSpPr>
         <p:spPr>
           <a:xfrm>
-            <a:off x="263118" y="781425"/>
-            <a:ext cx="5904656" cy="724942"/>
+            <a:off x="263117" y="781425"/>
+            <a:ext cx="9176447" cy="724942"/>
           </a:xfrm>
         </p:spPr>
         <p:txBody>
@@ -14547,10 +15019,9 @@
           </a:bodyPr>
           <a:lstStyle/>
           <a:p>
-            <a:pPr algn="l"/>
             <a:r>
               <a:rPr lang="fr-FR" sz="3200" dirty="0"/>
-              <a:t>Enregistrement d’un « Design »</a:t>
+              <a:t>Piste 2 : générateur de serveur web/API REST</a:t>
             </a:r>
           </a:p>
         </p:txBody>
@@ -14621,135 +15092,46 @@
           <a:lstStyle/>
           <a:p>
             <a:r>
-              <a:rPr lang="fr-FR" sz="2400" dirty="0"/>
-              <a:t>Un « </a:t>
-            </a:r>
-            <a:r>
-              <a:rPr lang="fr-FR" sz="2400" dirty="0">
+              <a:rPr lang="fr-FR" sz="2000" dirty="0">
                 <a:solidFill>
                   <a:srgbClr val="0070C0"/>
                 </a:solidFill>
               </a:rPr>
-              <a:t>Design</a:t>
-            </a:r>
-            <a:r>
-              <a:rPr lang="fr-FR" sz="2400" dirty="0"/>
-              <a:t> » = </a:t>
-            </a:r>
-            <a:r>
-              <a:rPr lang="fr-FR" sz="2400" dirty="0">
+              <a:t>Générer</a:t>
+            </a:r>
+            <a:r>
+              <a:rPr lang="fr-FR" sz="2000" dirty="0"/>
+              <a:t> – en fonction des ressources – un </a:t>
+            </a:r>
+            <a:r>
+              <a:rPr lang="fr-FR" sz="2000" dirty="0">
                 <a:solidFill>
                   <a:srgbClr val="0070C0"/>
                 </a:solidFill>
               </a:rPr>
-              <a:t>ensemble des composantes artistiques</a:t>
-            </a:r>
-            <a:r>
-              <a:rPr lang="fr-FR" sz="2400" dirty="0"/>
-              <a:t> du site </a:t>
+              <a:t>serveur REST </a:t>
+            </a:r>
+            <a:r>
+              <a:rPr lang="fr-FR" sz="2000" dirty="0"/>
+              <a:t>basique</a:t>
             </a:r>
           </a:p>
           <a:p>
             <a:pPr lvl="1"/>
             <a:r>
-              <a:rPr lang="fr-FR" sz="2000" dirty="0"/>
-              <a:t>Couleur, placement, etc.</a:t>
+              <a:rPr lang="fr-FR" sz="1600" dirty="0"/>
+              <a:t>Complexité logique derrière le REST limitée =&gt; Simple à automatiser + intérêt à l’automatiser grand</a:t>
             </a:r>
           </a:p>
           <a:p>
             <a:pPr lvl="1"/>
             <a:r>
-              <a:rPr lang="fr-FR" sz="2000" dirty="0"/>
-              <a:t>Travail indépendant du contenu</a:t>
-            </a:r>
-          </a:p>
-          <a:p>
-            <a:pPr lvl="1"/>
+              <a:rPr lang="fr-FR" sz="1600" dirty="0"/>
+              <a:t>Générer selon des critères (langage de prog, techno, performances, etc.) le serveur adapté.</a:t>
+            </a:r>
+          </a:p>
+          <a:p>
             <a:endParaRPr lang="fr-FR" sz="2000" dirty="0"/>
-          </a:p>
-          <a:p>
-            <a:r>
-              <a:rPr lang="fr-FR" sz="2400" dirty="0"/>
-              <a:t>Faire des </a:t>
-            </a:r>
-            <a:r>
-              <a:rPr lang="fr-FR" sz="2400" dirty="0" err="1"/>
-              <a:t>preset</a:t>
-            </a:r>
-            <a:r>
-              <a:rPr lang="fr-FR" sz="2400" dirty="0"/>
-              <a:t> de </a:t>
-            </a:r>
-            <a:r>
-              <a:rPr lang="fr-FR" sz="2400" dirty="0" err="1"/>
-              <a:t>superstyles</a:t>
-            </a:r>
-            <a:r>
-              <a:rPr lang="fr-FR" sz="2400" dirty="0"/>
-              <a:t> ?</a:t>
-            </a:r>
-          </a:p>
-          <a:p>
-            <a:pPr lvl="1"/>
-            <a:r>
-              <a:rPr lang="fr-FR" sz="2000" dirty="0">
-                <a:solidFill>
-                  <a:srgbClr val="0070C0"/>
-                </a:solidFill>
-              </a:rPr>
-              <a:t>Combiner</a:t>
-            </a:r>
-            <a:r>
-              <a:rPr lang="fr-FR" sz="2000" dirty="0"/>
-              <a:t> l’ensemble des </a:t>
-            </a:r>
-            <a:r>
-              <a:rPr lang="fr-FR" sz="2000" dirty="0">
-                <a:solidFill>
-                  <a:srgbClr val="0070C0"/>
-                </a:solidFill>
-              </a:rPr>
-              <a:t>composantes stylistiques </a:t>
-            </a:r>
-            <a:r>
-              <a:rPr lang="fr-FR" sz="2000" dirty="0"/>
-              <a:t>sous un seul </a:t>
-            </a:r>
-            <a:r>
-              <a:rPr lang="fr-FR" sz="2000" dirty="0" err="1"/>
-              <a:t>preset</a:t>
-            </a:r>
-            <a:r>
-              <a:rPr lang="fr-FR" sz="2000" dirty="0"/>
-              <a:t> (enregistrable)</a:t>
-            </a:r>
-          </a:p>
-          <a:p>
-            <a:pPr lvl="1"/>
-            <a:r>
-              <a:rPr lang="fr-FR" sz="2000" dirty="0">
-                <a:solidFill>
-                  <a:srgbClr val="0070C0"/>
-                </a:solidFill>
-              </a:rPr>
-              <a:t>Rendre réutilisable </a:t>
-            </a:r>
-            <a:r>
-              <a:rPr lang="fr-FR" sz="2000" dirty="0"/>
-              <a:t>le </a:t>
-            </a:r>
-            <a:r>
-              <a:rPr lang="fr-FR" sz="2000" dirty="0">
-                <a:solidFill>
-                  <a:srgbClr val="0070C0"/>
-                </a:solidFill>
-              </a:rPr>
-              <a:t>travail de l’artiste</a:t>
-            </a:r>
-            <a:r>
-              <a:rPr lang="fr-FR" sz="2000" dirty="0"/>
-              <a:t>/UI/UX designer</a:t>
-            </a:r>
           </a:p>
         </p:txBody>
       </p:sp>
@@ -14918,7 +15300,7 @@
           <p:cNvPr id="3" name="Espace réservé du pied de page 2">
             <a:extLst>
               <a:ext uri="{FF2B5EF4-FFF2-40B4-BE49-F238E27FC236}">
-                <a16:creationId xmlns:a16="http://schemas.microsoft.com/office/drawing/2014/main" id="{E3F8CFDB-5067-4D8D-A24C-068EAC0EA5D5}"/>
+                <a16:creationId xmlns:a16="http://schemas.microsoft.com/office/drawing/2014/main" id="{61E4F19E-299A-4DBC-BD43-2B3AA1581E7C}"/>
               </a:ext>
             </a:extLst>
           </p:cNvPr>
@@ -14944,7 +15326,7 @@
     </p:spTree>
     <p:extLst>
       <p:ext uri="{BB962C8B-B14F-4D97-AF65-F5344CB8AC3E}">
-        <p14:creationId xmlns:p14="http://schemas.microsoft.com/office/powerpoint/2010/main" val="488704100"/>
+        <p14:creationId xmlns:p14="http://schemas.microsoft.com/office/powerpoint/2010/main" val="540988996"/>
       </p:ext>
     </p:extLst>
   </p:cSld>
@@ -14995,8 +15377,8 @@
         </p:nvSpPr>
         <p:spPr>
           <a:xfrm>
-            <a:off x="263118" y="781425"/>
-            <a:ext cx="5904656" cy="724942"/>
+            <a:off x="263117" y="781425"/>
+            <a:ext cx="7890283" cy="724942"/>
           </a:xfrm>
         </p:spPr>
         <p:txBody>
@@ -15005,10 +15387,9 @@
           </a:bodyPr>
           <a:lstStyle/>
           <a:p>
-            <a:pPr algn="l"/>
             <a:r>
               <a:rPr lang="fr-FR" sz="3200" dirty="0"/>
-              <a:t>Système de layer</a:t>
+              <a:t>Piste 3 : Panneau gestion des versions</a:t>
             </a:r>
           </a:p>
         </p:txBody>
@@ -15078,14 +15459,7 @@
           </a:bodyPr>
           <a:lstStyle/>
           <a:p>
-            <a:r>
-              <a:rPr lang="fr-FR" sz="2400" dirty="0"/>
-              <a:t>Faciliter la superposition d’éléments</a:t>
-            </a:r>
-            <a:endParaRPr lang="fr-FR" sz="1200" dirty="0"/>
-          </a:p>
-          <a:p>
-            <a:endParaRPr lang="fr-FR" sz="2400" dirty="0"/>
+            <a:endParaRPr lang="fr-FR" sz="2000" dirty="0"/>
           </a:p>
         </p:txBody>
       </p:sp>
@@ -15254,7 +15628,7 @@
           <p:cNvPr id="3" name="Espace réservé du pied de page 2">
             <a:extLst>
               <a:ext uri="{FF2B5EF4-FFF2-40B4-BE49-F238E27FC236}">
-                <a16:creationId xmlns:a16="http://schemas.microsoft.com/office/drawing/2014/main" id="{E3F8CFDB-5067-4D8D-A24C-068EAC0EA5D5}"/>
+                <a16:creationId xmlns:a16="http://schemas.microsoft.com/office/drawing/2014/main" id="{61E4F19E-299A-4DBC-BD43-2B3AA1581E7C}"/>
               </a:ext>
             </a:extLst>
           </p:cNvPr>
@@ -15280,7 +15654,946 @@
     </p:spTree>
     <p:extLst>
       <p:ext uri="{BB962C8B-B14F-4D97-AF65-F5344CB8AC3E}">
-        <p14:creationId xmlns:p14="http://schemas.microsoft.com/office/powerpoint/2010/main" val="2650847568"/>
+        <p14:creationId xmlns:p14="http://schemas.microsoft.com/office/powerpoint/2010/main" val="1867000722"/>
+      </p:ext>
+    </p:extLst>
+  </p:cSld>
+  <p:clrMapOvr>
+    <a:masterClrMapping/>
+  </p:clrMapOvr>
+  <mc:AlternateContent xmlns:mc="http://schemas.openxmlformats.org/markup-compatibility/2006" xmlns:p14="http://schemas.microsoft.com/office/powerpoint/2010/main">
+    <mc:Choice Requires="p14">
+      <p:transition spd="med" p14:dur="700">
+        <p:fade/>
+      </p:transition>
+    </mc:Choice>
+    <mc:Fallback xmlns="">
+      <p:transition spd="med">
+        <p:fade/>
+      </p:transition>
+    </mc:Fallback>
+  </mc:AlternateContent>
+</p:sld>
+</file>
+
+<file path=ppt/slides/slide28.xml><?xml version="1.0" encoding="utf-8"?>
+<p:sld xmlns:a="http://schemas.openxmlformats.org/drawingml/2006/main" xmlns:r="http://schemas.openxmlformats.org/officeDocument/2006/relationships" xmlns:p="http://schemas.openxmlformats.org/presentationml/2006/main">
+  <p:cSld>
+    <p:spTree>
+      <p:nvGrpSpPr>
+        <p:cNvPr id="1" name=""/>
+        <p:cNvGrpSpPr/>
+        <p:nvPr/>
+      </p:nvGrpSpPr>
+      <p:grpSpPr>
+        <a:xfrm>
+          <a:off x="0" y="0"/>
+          <a:ext cx="0" cy="0"/>
+          <a:chOff x="0" y="0"/>
+          <a:chExt cx="0" cy="0"/>
+        </a:xfrm>
+      </p:grpSpPr>
+      <p:sp>
+        <p:nvSpPr>
+          <p:cNvPr id="2" name="Titre 1"/>
+          <p:cNvSpPr>
+            <a:spLocks noGrp="1"/>
+          </p:cNvSpPr>
+          <p:nvPr>
+            <p:ph type="title"/>
+          </p:nvPr>
+        </p:nvSpPr>
+        <p:spPr>
+          <a:xfrm>
+            <a:off x="263118" y="781425"/>
+            <a:ext cx="5904656" cy="724942"/>
+          </a:xfrm>
+        </p:spPr>
+        <p:txBody>
+          <a:bodyPr>
+            <a:normAutofit/>
+          </a:bodyPr>
+          <a:lstStyle/>
+          <a:p>
+            <a:pPr algn="l"/>
+            <a:r>
+              <a:rPr lang="fr-FR" sz="3200" dirty="0"/>
+              <a:t>Styles</a:t>
+            </a:r>
+          </a:p>
+        </p:txBody>
+      </p:sp>
+      <p:cxnSp>
+        <p:nvCxnSpPr>
+          <p:cNvPr id="10" name="Connecteur droit 9"/>
+          <p:cNvCxnSpPr>
+            <a:cxnSpLocks/>
+          </p:cNvCxnSpPr>
+          <p:nvPr/>
+        </p:nvCxnSpPr>
+        <p:spPr>
+          <a:xfrm>
+            <a:off x="263118" y="1506367"/>
+            <a:ext cx="10709682" cy="0"/>
+          </a:xfrm>
+          <a:prstGeom prst="line">
+            <a:avLst/>
+          </a:prstGeom>
+          <a:ln w="19050">
+            <a:solidFill>
+              <a:schemeClr val="tx1"/>
+            </a:solidFill>
+          </a:ln>
+        </p:spPr>
+        <p:style>
+          <a:lnRef idx="1">
+            <a:schemeClr val="accent1"/>
+          </a:lnRef>
+          <a:fillRef idx="0">
+            <a:schemeClr val="accent1"/>
+          </a:fillRef>
+          <a:effectRef idx="0">
+            <a:schemeClr val="accent1"/>
+          </a:effectRef>
+          <a:fontRef idx="minor">
+            <a:schemeClr val="tx1"/>
+          </a:fontRef>
+        </p:style>
+      </p:cxnSp>
+      <p:sp>
+        <p:nvSpPr>
+          <p:cNvPr id="30" name="Espace réservé du contenu 2">
+            <a:extLst>
+              <a:ext uri="{FF2B5EF4-FFF2-40B4-BE49-F238E27FC236}">
+                <a16:creationId xmlns:a16="http://schemas.microsoft.com/office/drawing/2014/main" id="{17374925-2B5F-48B8-8155-9BB171EB9DDB}"/>
+              </a:ext>
+            </a:extLst>
+          </p:cNvPr>
+          <p:cNvSpPr>
+            <a:spLocks noGrp="1"/>
+          </p:cNvSpPr>
+          <p:nvPr>
+            <p:ph idx="1"/>
+          </p:nvPr>
+        </p:nvSpPr>
+        <p:spPr>
+          <a:xfrm>
+            <a:off x="263117" y="1725237"/>
+            <a:ext cx="11733713" cy="4631112"/>
+          </a:xfrm>
+        </p:spPr>
+        <p:txBody>
+          <a:bodyPr>
+            <a:normAutofit lnSpcReduction="10000"/>
+          </a:bodyPr>
+          <a:lstStyle/>
+          <a:p>
+            <a:r>
+              <a:rPr lang="fr-FR" sz="2400" dirty="0"/>
+              <a:t>Revenir à l’essence d’un style :</a:t>
+            </a:r>
+          </a:p>
+          <a:p>
+            <a:pPr marL="0" indent="0" algn="ctr">
+              <a:buNone/>
+            </a:pPr>
+            <a:r>
+              <a:rPr lang="fr-FR" sz="2400" dirty="0">
+                <a:solidFill>
+                  <a:srgbClr val="0070C0"/>
+                </a:solidFill>
+              </a:rPr>
+              <a:t>Regrouper</a:t>
+            </a:r>
+            <a:r>
+              <a:rPr lang="fr-FR" sz="2400" dirty="0"/>
+              <a:t> un </a:t>
+            </a:r>
+            <a:r>
+              <a:rPr lang="fr-FR" sz="2400" dirty="0">
+                <a:solidFill>
+                  <a:srgbClr val="0070C0"/>
+                </a:solidFill>
+              </a:rPr>
+              <a:t>ensemble cohérent </a:t>
+            </a:r>
+            <a:r>
+              <a:rPr lang="fr-FR" sz="2400" dirty="0"/>
+              <a:t>sous une </a:t>
+            </a:r>
+            <a:r>
+              <a:rPr lang="fr-FR" sz="2400" dirty="0">
+                <a:solidFill>
+                  <a:srgbClr val="0070C0"/>
+                </a:solidFill>
+              </a:rPr>
+              <a:t>même direction artistique</a:t>
+            </a:r>
+          </a:p>
+          <a:p>
+            <a:pPr marL="0" indent="0" algn="ctr">
+              <a:buNone/>
+            </a:pPr>
+            <a:r>
+              <a:rPr lang="fr-FR" sz="2400" dirty="0">
+                <a:solidFill>
+                  <a:srgbClr val="FF0000"/>
+                </a:solidFill>
+              </a:rPr>
+              <a:t>≠ mettre un style différent pour chaque élément !</a:t>
+            </a:r>
+            <a:endParaRPr lang="fr-FR" sz="2000" dirty="0"/>
+          </a:p>
+          <a:p>
+            <a:r>
+              <a:rPr lang="fr-FR" sz="2400" dirty="0"/>
+              <a:t>Revenir à la définition artistique ? </a:t>
+            </a:r>
+            <a:endParaRPr lang="fr-FR" sz="2000" dirty="0"/>
+          </a:p>
+          <a:p>
+            <a:endParaRPr lang="fr-FR" sz="2400" dirty="0"/>
+          </a:p>
+          <a:p>
+            <a:endParaRPr lang="fr-FR" sz="2400" dirty="0"/>
+          </a:p>
+          <a:p>
+            <a:r>
+              <a:rPr lang="fr-FR" sz="2400" dirty="0"/>
+              <a:t>Pistes :</a:t>
+            </a:r>
+          </a:p>
+          <a:p>
+            <a:pPr lvl="1"/>
+            <a:r>
+              <a:rPr lang="fr-FR" sz="2000" dirty="0"/>
+              <a:t>Mix entre CSS dans le HTML (personnalisé/</a:t>
+            </a:r>
+            <a:r>
+              <a:rPr lang="fr-FR" sz="2000" dirty="0" err="1"/>
+              <a:t>styleless</a:t>
+            </a:r>
+            <a:r>
+              <a:rPr lang="fr-FR" sz="2000" dirty="0"/>
+              <a:t>) et Style</a:t>
+            </a:r>
+          </a:p>
+          <a:p>
+            <a:pPr lvl="1"/>
+            <a:r>
+              <a:rPr lang="fr-FR" sz="2000" dirty="0"/>
+              <a:t>Créer des </a:t>
+            </a:r>
+            <a:r>
+              <a:rPr lang="fr-FR" sz="2000" dirty="0" err="1"/>
+              <a:t>superstyles</a:t>
+            </a:r>
+            <a:r>
+              <a:rPr lang="fr-FR" sz="2000" dirty="0"/>
+              <a:t> (des ensembles qui regroupent plusieurs styles CSS)</a:t>
+            </a:r>
+          </a:p>
+          <a:p>
+            <a:pPr lvl="2"/>
+            <a:r>
+              <a:rPr lang="fr-FR" sz="1600" dirty="0"/>
+              <a:t>Pour faire des palettes </a:t>
+            </a:r>
+          </a:p>
+          <a:p>
+            <a:pPr lvl="2"/>
+            <a:r>
+              <a:rPr lang="fr-FR" sz="1600" dirty="0"/>
+              <a:t>Pour faire des organisations riches (positionnements)</a:t>
+            </a:r>
+          </a:p>
+          <a:p>
+            <a:pPr lvl="2"/>
+            <a:r>
+              <a:rPr lang="fr-FR" sz="1600" dirty="0"/>
+              <a:t>Pour donner plus de sémantique/plus de modularité au projet</a:t>
+            </a:r>
+            <a:endParaRPr lang="fr-FR" sz="1200" dirty="0"/>
+          </a:p>
+          <a:p>
+            <a:endParaRPr lang="fr-FR" sz="2400" dirty="0"/>
+          </a:p>
+        </p:txBody>
+      </p:sp>
+      <p:sp>
+        <p:nvSpPr>
+          <p:cNvPr id="8" name="Espace réservé du numéro de diapositive 7">
+            <a:extLst>
+              <a:ext uri="{FF2B5EF4-FFF2-40B4-BE49-F238E27FC236}">
+                <a16:creationId xmlns:a16="http://schemas.microsoft.com/office/drawing/2014/main" id="{B8B2E558-E863-4B5B-959A-AB1349969143}"/>
+              </a:ext>
+            </a:extLst>
+          </p:cNvPr>
+          <p:cNvSpPr>
+            <a:spLocks noGrp="1"/>
+          </p:cNvSpPr>
+          <p:nvPr>
+            <p:ph type="sldNum" sz="quarter" idx="12"/>
+          </p:nvPr>
+        </p:nvSpPr>
+        <p:spPr/>
+        <p:txBody>
+          <a:bodyPr/>
+          <a:lstStyle/>
+          <a:p>
+            <a:fld id="{8BBF28A3-E1F2-408E-9BE0-DB29BF40A39D}" type="slidenum">
+              <a:rPr lang="fr-FR" smtClean="0"/>
+              <a:t>28</a:t>
+            </a:fld>
+            <a:endParaRPr lang="fr-FR"/>
+          </a:p>
+        </p:txBody>
+      </p:sp>
+      <p:sp>
+        <p:nvSpPr>
+          <p:cNvPr id="9" name="Espace réservé du pied de page 3">
+            <a:extLst>
+              <a:ext uri="{FF2B5EF4-FFF2-40B4-BE49-F238E27FC236}">
+                <a16:creationId xmlns:a16="http://schemas.microsoft.com/office/drawing/2014/main" id="{2CD2AF13-957F-4245-8516-C9776ADE7978}"/>
+              </a:ext>
+            </a:extLst>
+          </p:cNvPr>
+          <p:cNvSpPr txBox="1">
+            <a:spLocks/>
+          </p:cNvSpPr>
+          <p:nvPr/>
+        </p:nvSpPr>
+        <p:spPr>
+          <a:xfrm>
+            <a:off x="5445839" y="105090"/>
+            <a:ext cx="1443870" cy="676309"/>
+          </a:xfrm>
+          <a:prstGeom prst="rect">
+            <a:avLst/>
+          </a:prstGeom>
+        </p:spPr>
+        <p:txBody>
+          <a:bodyPr vert="horz" lIns="91440" tIns="45720" rIns="91440" bIns="45720" rtlCol="0" anchor="ctr"/>
+          <a:lstStyle>
+            <a:defPPr>
+              <a:defRPr lang="fr-FR"/>
+            </a:defPPr>
+            <a:lvl1pPr marL="0" algn="ctr" defTabSz="914400" rtl="0" eaLnBrk="1" latinLnBrk="0" hangingPunct="1">
+              <a:defRPr sz="1200" kern="1200">
+                <a:solidFill>
+                  <a:schemeClr val="tx1">
+                    <a:tint val="75000"/>
+                  </a:schemeClr>
+                </a:solidFill>
+                <a:latin typeface="+mn-lt"/>
+                <a:ea typeface="+mn-ea"/>
+                <a:cs typeface="+mn-cs"/>
+              </a:defRPr>
+            </a:lvl1pPr>
+            <a:lvl2pPr marL="457200" algn="l" defTabSz="914400" rtl="0" eaLnBrk="1" latinLnBrk="0" hangingPunct="1">
+              <a:defRPr sz="1800" kern="1200">
+                <a:solidFill>
+                  <a:schemeClr val="tx1"/>
+                </a:solidFill>
+                <a:latin typeface="+mn-lt"/>
+                <a:ea typeface="+mn-ea"/>
+                <a:cs typeface="+mn-cs"/>
+              </a:defRPr>
+            </a:lvl2pPr>
+            <a:lvl3pPr marL="914400" algn="l" defTabSz="914400" rtl="0" eaLnBrk="1" latinLnBrk="0" hangingPunct="1">
+              <a:defRPr sz="1800" kern="1200">
+                <a:solidFill>
+                  <a:schemeClr val="tx1"/>
+                </a:solidFill>
+                <a:latin typeface="+mn-lt"/>
+                <a:ea typeface="+mn-ea"/>
+                <a:cs typeface="+mn-cs"/>
+              </a:defRPr>
+            </a:lvl3pPr>
+            <a:lvl4pPr marL="1371600" algn="l" defTabSz="914400" rtl="0" eaLnBrk="1" latinLnBrk="0" hangingPunct="1">
+              <a:defRPr sz="1800" kern="1200">
+                <a:solidFill>
+                  <a:schemeClr val="tx1"/>
+                </a:solidFill>
+                <a:latin typeface="+mn-lt"/>
+                <a:ea typeface="+mn-ea"/>
+                <a:cs typeface="+mn-cs"/>
+              </a:defRPr>
+            </a:lvl4pPr>
+            <a:lvl5pPr marL="1828800" algn="l" defTabSz="914400" rtl="0" eaLnBrk="1" latinLnBrk="0" hangingPunct="1">
+              <a:defRPr sz="1800" kern="1200">
+                <a:solidFill>
+                  <a:schemeClr val="tx1"/>
+                </a:solidFill>
+                <a:latin typeface="+mn-lt"/>
+                <a:ea typeface="+mn-ea"/>
+                <a:cs typeface="+mn-cs"/>
+              </a:defRPr>
+            </a:lvl5pPr>
+            <a:lvl6pPr marL="2286000" algn="l" defTabSz="914400" rtl="0" eaLnBrk="1" latinLnBrk="0" hangingPunct="1">
+              <a:defRPr sz="1800" kern="1200">
+                <a:solidFill>
+                  <a:schemeClr val="tx1"/>
+                </a:solidFill>
+                <a:latin typeface="+mn-lt"/>
+                <a:ea typeface="+mn-ea"/>
+                <a:cs typeface="+mn-cs"/>
+              </a:defRPr>
+            </a:lvl6pPr>
+            <a:lvl7pPr marL="2743200" algn="l" defTabSz="914400" rtl="0" eaLnBrk="1" latinLnBrk="0" hangingPunct="1">
+              <a:defRPr sz="1800" kern="1200">
+                <a:solidFill>
+                  <a:schemeClr val="tx1"/>
+                </a:solidFill>
+                <a:latin typeface="+mn-lt"/>
+                <a:ea typeface="+mn-ea"/>
+                <a:cs typeface="+mn-cs"/>
+              </a:defRPr>
+            </a:lvl7pPr>
+            <a:lvl8pPr marL="3200400" algn="l" defTabSz="914400" rtl="0" eaLnBrk="1" latinLnBrk="0" hangingPunct="1">
+              <a:defRPr sz="1800" kern="1200">
+                <a:solidFill>
+                  <a:schemeClr val="tx1"/>
+                </a:solidFill>
+                <a:latin typeface="+mn-lt"/>
+                <a:ea typeface="+mn-ea"/>
+                <a:cs typeface="+mn-cs"/>
+              </a:defRPr>
+            </a:lvl8pPr>
+            <a:lvl9pPr marL="3657600" algn="l" defTabSz="914400" rtl="0" eaLnBrk="1" latinLnBrk="0" hangingPunct="1">
+              <a:defRPr sz="1800" kern="1200">
+                <a:solidFill>
+                  <a:schemeClr val="tx1"/>
+                </a:solidFill>
+                <a:latin typeface="+mn-lt"/>
+                <a:ea typeface="+mn-ea"/>
+                <a:cs typeface="+mn-cs"/>
+              </a:defRPr>
+            </a:lvl9pPr>
+          </a:lstStyle>
+          <a:p>
+            <a:r>
+              <a:rPr lang="fr-FR" i="1" u="sng" dirty="0"/>
+              <a:t>Présentation du Web Designer</a:t>
+            </a:r>
+            <a:endParaRPr lang="fr-FR" sz="1000" dirty="0"/>
+          </a:p>
+        </p:txBody>
+      </p:sp>
+      <p:sp>
+        <p:nvSpPr>
+          <p:cNvPr id="3" name="Espace réservé du pied de page 2">
+            <a:extLst>
+              <a:ext uri="{FF2B5EF4-FFF2-40B4-BE49-F238E27FC236}">
+                <a16:creationId xmlns:a16="http://schemas.microsoft.com/office/drawing/2014/main" id="{E3F8CFDB-5067-4D8D-A24C-068EAC0EA5D5}"/>
+              </a:ext>
+            </a:extLst>
+          </p:cNvPr>
+          <p:cNvSpPr>
+            <a:spLocks noGrp="1"/>
+          </p:cNvSpPr>
+          <p:nvPr>
+            <p:ph type="ftr" sz="quarter" idx="11"/>
+          </p:nvPr>
+        </p:nvSpPr>
+        <p:spPr/>
+        <p:txBody>
+          <a:bodyPr/>
+          <a:lstStyle/>
+          <a:p>
+            <a:r>
+              <a:rPr lang="fr-FR"/>
+              <a:t>V0.1</a:t>
+            </a:r>
+          </a:p>
+        </p:txBody>
+      </p:sp>
+      <p:pic>
+        <p:nvPicPr>
+          <p:cNvPr id="5" name="Image 4">
+            <a:extLst>
+              <a:ext uri="{FF2B5EF4-FFF2-40B4-BE49-F238E27FC236}">
+                <a16:creationId xmlns:a16="http://schemas.microsoft.com/office/drawing/2014/main" id="{90AB5946-3D24-444A-8AB4-275C260A4E1F}"/>
+              </a:ext>
+            </a:extLst>
+          </p:cNvPr>
+          <p:cNvPicPr>
+            <a:picLocks noChangeAspect="1"/>
+          </p:cNvPicPr>
+          <p:nvPr/>
+        </p:nvPicPr>
+        <p:blipFill rotWithShape="1">
+          <a:blip r:embed="rId3"/>
+          <a:srcRect r="1600"/>
+          <a:stretch/>
+        </p:blipFill>
+        <p:spPr>
+          <a:xfrm>
+            <a:off x="1205949" y="3305229"/>
+            <a:ext cx="9111069" cy="875971"/>
+          </a:xfrm>
+          <a:prstGeom prst="rect">
+            <a:avLst/>
+          </a:prstGeom>
+        </p:spPr>
+      </p:pic>
+    </p:spTree>
+    <p:extLst>
+      <p:ext uri="{BB962C8B-B14F-4D97-AF65-F5344CB8AC3E}">
+        <p14:creationId xmlns:p14="http://schemas.microsoft.com/office/powerpoint/2010/main" val="1235605715"/>
+      </p:ext>
+    </p:extLst>
+  </p:cSld>
+  <p:clrMapOvr>
+    <a:masterClrMapping/>
+  </p:clrMapOvr>
+  <mc:AlternateContent xmlns:mc="http://schemas.openxmlformats.org/markup-compatibility/2006" xmlns:p14="http://schemas.microsoft.com/office/powerpoint/2010/main">
+    <mc:Choice Requires="p14">
+      <p:transition spd="med" p14:dur="700">
+        <p:fade/>
+      </p:transition>
+    </mc:Choice>
+    <mc:Fallback xmlns="">
+      <p:transition spd="med">
+        <p:fade/>
+      </p:transition>
+    </mc:Fallback>
+  </mc:AlternateContent>
+</p:sld>
+</file>
+
+<file path=ppt/slides/slide29.xml><?xml version="1.0" encoding="utf-8"?>
+<p:sld xmlns:a="http://schemas.openxmlformats.org/drawingml/2006/main" xmlns:r="http://schemas.openxmlformats.org/officeDocument/2006/relationships" xmlns:p="http://schemas.openxmlformats.org/presentationml/2006/main">
+  <p:cSld>
+    <p:spTree>
+      <p:nvGrpSpPr>
+        <p:cNvPr id="1" name=""/>
+        <p:cNvGrpSpPr/>
+        <p:nvPr/>
+      </p:nvGrpSpPr>
+      <p:grpSpPr>
+        <a:xfrm>
+          <a:off x="0" y="0"/>
+          <a:ext cx="0" cy="0"/>
+          <a:chOff x="0" y="0"/>
+          <a:chExt cx="0" cy="0"/>
+        </a:xfrm>
+      </p:grpSpPr>
+      <p:sp>
+        <p:nvSpPr>
+          <p:cNvPr id="2" name="Titre 1"/>
+          <p:cNvSpPr>
+            <a:spLocks noGrp="1"/>
+          </p:cNvSpPr>
+          <p:nvPr>
+            <p:ph type="title"/>
+          </p:nvPr>
+        </p:nvSpPr>
+        <p:spPr>
+          <a:xfrm>
+            <a:off x="263118" y="781425"/>
+            <a:ext cx="5904656" cy="724942"/>
+          </a:xfrm>
+        </p:spPr>
+        <p:txBody>
+          <a:bodyPr>
+            <a:normAutofit/>
+          </a:bodyPr>
+          <a:lstStyle/>
+          <a:p>
+            <a:pPr algn="l"/>
+            <a:r>
+              <a:rPr lang="fr-FR" sz="3200" dirty="0" err="1"/>
+              <a:t>Superstyles</a:t>
+            </a:r>
+            <a:endParaRPr lang="fr-FR" sz="3200" dirty="0"/>
+          </a:p>
+        </p:txBody>
+      </p:sp>
+      <p:cxnSp>
+        <p:nvCxnSpPr>
+          <p:cNvPr id="10" name="Connecteur droit 9"/>
+          <p:cNvCxnSpPr>
+            <a:cxnSpLocks/>
+          </p:cNvCxnSpPr>
+          <p:nvPr/>
+        </p:nvCxnSpPr>
+        <p:spPr>
+          <a:xfrm>
+            <a:off x="263118" y="1506367"/>
+            <a:ext cx="10709682" cy="0"/>
+          </a:xfrm>
+          <a:prstGeom prst="line">
+            <a:avLst/>
+          </a:prstGeom>
+          <a:ln w="19050">
+            <a:solidFill>
+              <a:schemeClr val="tx1"/>
+            </a:solidFill>
+          </a:ln>
+        </p:spPr>
+        <p:style>
+          <a:lnRef idx="1">
+            <a:schemeClr val="accent1"/>
+          </a:lnRef>
+          <a:fillRef idx="0">
+            <a:schemeClr val="accent1"/>
+          </a:fillRef>
+          <a:effectRef idx="0">
+            <a:schemeClr val="accent1"/>
+          </a:effectRef>
+          <a:fontRef idx="minor">
+            <a:schemeClr val="tx1"/>
+          </a:fontRef>
+        </p:style>
+      </p:cxnSp>
+      <p:sp>
+        <p:nvSpPr>
+          <p:cNvPr id="30" name="Espace réservé du contenu 2">
+            <a:extLst>
+              <a:ext uri="{FF2B5EF4-FFF2-40B4-BE49-F238E27FC236}">
+                <a16:creationId xmlns:a16="http://schemas.microsoft.com/office/drawing/2014/main" id="{17374925-2B5F-48B8-8155-9BB171EB9DDB}"/>
+              </a:ext>
+            </a:extLst>
+          </p:cNvPr>
+          <p:cNvSpPr>
+            <a:spLocks noGrp="1"/>
+          </p:cNvSpPr>
+          <p:nvPr>
+            <p:ph idx="1"/>
+          </p:nvPr>
+        </p:nvSpPr>
+        <p:spPr>
+          <a:xfrm>
+            <a:off x="263117" y="1725237"/>
+            <a:ext cx="11733713" cy="4631112"/>
+          </a:xfrm>
+        </p:spPr>
+        <p:txBody>
+          <a:bodyPr>
+            <a:normAutofit/>
+          </a:bodyPr>
+          <a:lstStyle/>
+          <a:p>
+            <a:r>
+              <a:rPr lang="fr-FR" sz="2400" dirty="0"/>
+              <a:t>Souvent dans le design les styles ne sont pas isolés mais ont un lien fort entre eux :</a:t>
+            </a:r>
+          </a:p>
+          <a:p>
+            <a:pPr marL="0" indent="0" algn="ctr">
+              <a:buNone/>
+            </a:pPr>
+            <a:r>
+              <a:rPr lang="fr-FR" sz="2400" dirty="0"/>
+              <a:t>Un « </a:t>
+            </a:r>
+            <a:r>
+              <a:rPr lang="fr-FR" sz="2400" dirty="0" err="1">
+                <a:solidFill>
+                  <a:srgbClr val="0070C0"/>
+                </a:solidFill>
+              </a:rPr>
+              <a:t>Superstyle</a:t>
+            </a:r>
+            <a:r>
+              <a:rPr lang="fr-FR" sz="2400" dirty="0"/>
+              <a:t> » est un ensemble/une </a:t>
+            </a:r>
+            <a:r>
+              <a:rPr lang="fr-FR" sz="2400" dirty="0">
+                <a:solidFill>
+                  <a:srgbClr val="0070C0"/>
+                </a:solidFill>
+              </a:rPr>
+              <a:t>composante cohérent(e) d’un design</a:t>
+            </a:r>
+          </a:p>
+          <a:p>
+            <a:pPr marL="0" indent="0">
+              <a:buNone/>
+            </a:pPr>
+            <a:endParaRPr lang="fr-FR" sz="2400" dirty="0"/>
+          </a:p>
+          <a:p>
+            <a:pPr lvl="1"/>
+            <a:endParaRPr lang="fr-FR" sz="2000" dirty="0"/>
+          </a:p>
+          <a:p>
+            <a:pPr lvl="1"/>
+            <a:r>
+              <a:rPr lang="fr-FR" sz="2000" dirty="0"/>
+              <a:t>Palette de couleurs pour un designer</a:t>
+            </a:r>
+          </a:p>
+          <a:p>
+            <a:pPr lvl="1"/>
+            <a:endParaRPr lang="fr-FR" sz="2000" dirty="0"/>
+          </a:p>
+          <a:p>
+            <a:pPr lvl="1"/>
+            <a:endParaRPr lang="fr-FR" sz="2000" dirty="0"/>
+          </a:p>
+          <a:p>
+            <a:pPr lvl="1"/>
+            <a:endParaRPr lang="fr-FR" sz="2000" dirty="0"/>
+          </a:p>
+          <a:p>
+            <a:pPr lvl="1"/>
+            <a:r>
+              <a:rPr lang="fr-FR" sz="2000" dirty="0"/>
+              <a:t>Organisation générale des informations</a:t>
+            </a:r>
+          </a:p>
+          <a:p>
+            <a:pPr lvl="2"/>
+            <a:r>
+              <a:rPr lang="fr-FR" sz="1600" dirty="0"/>
+              <a:t>Avoir un style épuré</a:t>
+            </a:r>
+          </a:p>
+          <a:p>
+            <a:pPr lvl="2"/>
+            <a:r>
+              <a:rPr lang="fr-FR" sz="1600" dirty="0"/>
+              <a:t>Avoir un style informatif</a:t>
+            </a:r>
+          </a:p>
+          <a:p>
+            <a:pPr lvl="2"/>
+            <a:r>
+              <a:rPr lang="fr-FR" sz="1600" dirty="0"/>
+              <a:t>Etc. </a:t>
+            </a:r>
+          </a:p>
+          <a:p>
+            <a:pPr lvl="1"/>
+            <a:endParaRPr lang="fr-FR" sz="2000" dirty="0"/>
+          </a:p>
+        </p:txBody>
+      </p:sp>
+      <p:sp>
+        <p:nvSpPr>
+          <p:cNvPr id="8" name="Espace réservé du numéro de diapositive 7">
+            <a:extLst>
+              <a:ext uri="{FF2B5EF4-FFF2-40B4-BE49-F238E27FC236}">
+                <a16:creationId xmlns:a16="http://schemas.microsoft.com/office/drawing/2014/main" id="{B8B2E558-E863-4B5B-959A-AB1349969143}"/>
+              </a:ext>
+            </a:extLst>
+          </p:cNvPr>
+          <p:cNvSpPr>
+            <a:spLocks noGrp="1"/>
+          </p:cNvSpPr>
+          <p:nvPr>
+            <p:ph type="sldNum" sz="quarter" idx="12"/>
+          </p:nvPr>
+        </p:nvSpPr>
+        <p:spPr/>
+        <p:txBody>
+          <a:bodyPr/>
+          <a:lstStyle/>
+          <a:p>
+            <a:fld id="{8BBF28A3-E1F2-408E-9BE0-DB29BF40A39D}" type="slidenum">
+              <a:rPr lang="fr-FR" smtClean="0"/>
+              <a:t>29</a:t>
+            </a:fld>
+            <a:endParaRPr lang="fr-FR"/>
+          </a:p>
+        </p:txBody>
+      </p:sp>
+      <p:sp>
+        <p:nvSpPr>
+          <p:cNvPr id="9" name="Espace réservé du pied de page 3">
+            <a:extLst>
+              <a:ext uri="{FF2B5EF4-FFF2-40B4-BE49-F238E27FC236}">
+                <a16:creationId xmlns:a16="http://schemas.microsoft.com/office/drawing/2014/main" id="{2CD2AF13-957F-4245-8516-C9776ADE7978}"/>
+              </a:ext>
+            </a:extLst>
+          </p:cNvPr>
+          <p:cNvSpPr txBox="1">
+            <a:spLocks/>
+          </p:cNvSpPr>
+          <p:nvPr/>
+        </p:nvSpPr>
+        <p:spPr>
+          <a:xfrm>
+            <a:off x="5445839" y="105090"/>
+            <a:ext cx="1443870" cy="676309"/>
+          </a:xfrm>
+          <a:prstGeom prst="rect">
+            <a:avLst/>
+          </a:prstGeom>
+        </p:spPr>
+        <p:txBody>
+          <a:bodyPr vert="horz" lIns="91440" tIns="45720" rIns="91440" bIns="45720" rtlCol="0" anchor="ctr"/>
+          <a:lstStyle>
+            <a:defPPr>
+              <a:defRPr lang="fr-FR"/>
+            </a:defPPr>
+            <a:lvl1pPr marL="0" algn="ctr" defTabSz="914400" rtl="0" eaLnBrk="1" latinLnBrk="0" hangingPunct="1">
+              <a:defRPr sz="1200" kern="1200">
+                <a:solidFill>
+                  <a:schemeClr val="tx1">
+                    <a:tint val="75000"/>
+                  </a:schemeClr>
+                </a:solidFill>
+                <a:latin typeface="+mn-lt"/>
+                <a:ea typeface="+mn-ea"/>
+                <a:cs typeface="+mn-cs"/>
+              </a:defRPr>
+            </a:lvl1pPr>
+            <a:lvl2pPr marL="457200" algn="l" defTabSz="914400" rtl="0" eaLnBrk="1" latinLnBrk="0" hangingPunct="1">
+              <a:defRPr sz="1800" kern="1200">
+                <a:solidFill>
+                  <a:schemeClr val="tx1"/>
+                </a:solidFill>
+                <a:latin typeface="+mn-lt"/>
+                <a:ea typeface="+mn-ea"/>
+                <a:cs typeface="+mn-cs"/>
+              </a:defRPr>
+            </a:lvl2pPr>
+            <a:lvl3pPr marL="914400" algn="l" defTabSz="914400" rtl="0" eaLnBrk="1" latinLnBrk="0" hangingPunct="1">
+              <a:defRPr sz="1800" kern="1200">
+                <a:solidFill>
+                  <a:schemeClr val="tx1"/>
+                </a:solidFill>
+                <a:latin typeface="+mn-lt"/>
+                <a:ea typeface="+mn-ea"/>
+                <a:cs typeface="+mn-cs"/>
+              </a:defRPr>
+            </a:lvl3pPr>
+            <a:lvl4pPr marL="1371600" algn="l" defTabSz="914400" rtl="0" eaLnBrk="1" latinLnBrk="0" hangingPunct="1">
+              <a:defRPr sz="1800" kern="1200">
+                <a:solidFill>
+                  <a:schemeClr val="tx1"/>
+                </a:solidFill>
+                <a:latin typeface="+mn-lt"/>
+                <a:ea typeface="+mn-ea"/>
+                <a:cs typeface="+mn-cs"/>
+              </a:defRPr>
+            </a:lvl4pPr>
+            <a:lvl5pPr marL="1828800" algn="l" defTabSz="914400" rtl="0" eaLnBrk="1" latinLnBrk="0" hangingPunct="1">
+              <a:defRPr sz="1800" kern="1200">
+                <a:solidFill>
+                  <a:schemeClr val="tx1"/>
+                </a:solidFill>
+                <a:latin typeface="+mn-lt"/>
+                <a:ea typeface="+mn-ea"/>
+                <a:cs typeface="+mn-cs"/>
+              </a:defRPr>
+            </a:lvl5pPr>
+            <a:lvl6pPr marL="2286000" algn="l" defTabSz="914400" rtl="0" eaLnBrk="1" latinLnBrk="0" hangingPunct="1">
+              <a:defRPr sz="1800" kern="1200">
+                <a:solidFill>
+                  <a:schemeClr val="tx1"/>
+                </a:solidFill>
+                <a:latin typeface="+mn-lt"/>
+                <a:ea typeface="+mn-ea"/>
+                <a:cs typeface="+mn-cs"/>
+              </a:defRPr>
+            </a:lvl6pPr>
+            <a:lvl7pPr marL="2743200" algn="l" defTabSz="914400" rtl="0" eaLnBrk="1" latinLnBrk="0" hangingPunct="1">
+              <a:defRPr sz="1800" kern="1200">
+                <a:solidFill>
+                  <a:schemeClr val="tx1"/>
+                </a:solidFill>
+                <a:latin typeface="+mn-lt"/>
+                <a:ea typeface="+mn-ea"/>
+                <a:cs typeface="+mn-cs"/>
+              </a:defRPr>
+            </a:lvl7pPr>
+            <a:lvl8pPr marL="3200400" algn="l" defTabSz="914400" rtl="0" eaLnBrk="1" latinLnBrk="0" hangingPunct="1">
+              <a:defRPr sz="1800" kern="1200">
+                <a:solidFill>
+                  <a:schemeClr val="tx1"/>
+                </a:solidFill>
+                <a:latin typeface="+mn-lt"/>
+                <a:ea typeface="+mn-ea"/>
+                <a:cs typeface="+mn-cs"/>
+              </a:defRPr>
+            </a:lvl8pPr>
+            <a:lvl9pPr marL="3657600" algn="l" defTabSz="914400" rtl="0" eaLnBrk="1" latinLnBrk="0" hangingPunct="1">
+              <a:defRPr sz="1800" kern="1200">
+                <a:solidFill>
+                  <a:schemeClr val="tx1"/>
+                </a:solidFill>
+                <a:latin typeface="+mn-lt"/>
+                <a:ea typeface="+mn-ea"/>
+                <a:cs typeface="+mn-cs"/>
+              </a:defRPr>
+            </a:lvl9pPr>
+          </a:lstStyle>
+          <a:p>
+            <a:r>
+              <a:rPr lang="fr-FR" i="1" u="sng" dirty="0"/>
+              <a:t>Présentation du Web Designer</a:t>
+            </a:r>
+            <a:endParaRPr lang="fr-FR" sz="1000" dirty="0"/>
+          </a:p>
+        </p:txBody>
+      </p:sp>
+      <p:sp>
+        <p:nvSpPr>
+          <p:cNvPr id="3" name="Espace réservé du pied de page 2">
+            <a:extLst>
+              <a:ext uri="{FF2B5EF4-FFF2-40B4-BE49-F238E27FC236}">
+                <a16:creationId xmlns:a16="http://schemas.microsoft.com/office/drawing/2014/main" id="{E3F8CFDB-5067-4D8D-A24C-068EAC0EA5D5}"/>
+              </a:ext>
+            </a:extLst>
+          </p:cNvPr>
+          <p:cNvSpPr>
+            <a:spLocks noGrp="1"/>
+          </p:cNvSpPr>
+          <p:nvPr>
+            <p:ph type="ftr" sz="quarter" idx="11"/>
+          </p:nvPr>
+        </p:nvSpPr>
+        <p:spPr/>
+        <p:txBody>
+          <a:bodyPr/>
+          <a:lstStyle/>
+          <a:p>
+            <a:r>
+              <a:rPr lang="fr-FR"/>
+              <a:t>V0.1</a:t>
+            </a:r>
+          </a:p>
+        </p:txBody>
+      </p:sp>
+      <p:pic>
+        <p:nvPicPr>
+          <p:cNvPr id="5" name="Image 4">
+            <a:extLst>
+              <a:ext uri="{FF2B5EF4-FFF2-40B4-BE49-F238E27FC236}">
+                <a16:creationId xmlns:a16="http://schemas.microsoft.com/office/drawing/2014/main" id="{9F69DD28-09E0-405B-8721-157FE934524F}"/>
+              </a:ext>
+            </a:extLst>
+          </p:cNvPr>
+          <p:cNvPicPr>
+            <a:picLocks noChangeAspect="1"/>
+          </p:cNvPicPr>
+          <p:nvPr/>
+        </p:nvPicPr>
+        <p:blipFill>
+          <a:blip r:embed="rId3"/>
+          <a:stretch>
+            <a:fillRect/>
+          </a:stretch>
+        </p:blipFill>
+        <p:spPr>
+          <a:xfrm>
+            <a:off x="5850123" y="2983229"/>
+            <a:ext cx="2635600" cy="1634836"/>
+          </a:xfrm>
+          <a:prstGeom prst="rect">
+            <a:avLst/>
+          </a:prstGeom>
+        </p:spPr>
+      </p:pic>
+    </p:spTree>
+    <p:extLst>
+      <p:ext uri="{BB962C8B-B14F-4D97-AF65-F5344CB8AC3E}">
+        <p14:creationId xmlns:p14="http://schemas.microsoft.com/office/powerpoint/2010/main" val="4248321424"/>
       </p:ext>
     </p:extLst>
   </p:cSld>
@@ -15893,6 +17206,800 @@
     <p:extLst>
       <p:ext uri="{BB962C8B-B14F-4D97-AF65-F5344CB8AC3E}">
         <p14:creationId xmlns:p14="http://schemas.microsoft.com/office/powerpoint/2010/main" val="1566604397"/>
+      </p:ext>
+    </p:extLst>
+  </p:cSld>
+  <p:clrMapOvr>
+    <a:masterClrMapping/>
+  </p:clrMapOvr>
+  <mc:AlternateContent xmlns:mc="http://schemas.openxmlformats.org/markup-compatibility/2006" xmlns:p14="http://schemas.microsoft.com/office/powerpoint/2010/main">
+    <mc:Choice Requires="p14">
+      <p:transition spd="med" p14:dur="700">
+        <p:fade/>
+      </p:transition>
+    </mc:Choice>
+    <mc:Fallback xmlns="">
+      <p:transition spd="med">
+        <p:fade/>
+      </p:transition>
+    </mc:Fallback>
+  </mc:AlternateContent>
+</p:sld>
+</file>
+
+<file path=ppt/slides/slide30.xml><?xml version="1.0" encoding="utf-8"?>
+<p:sld xmlns:a="http://schemas.openxmlformats.org/drawingml/2006/main" xmlns:r="http://schemas.openxmlformats.org/officeDocument/2006/relationships" xmlns:p="http://schemas.openxmlformats.org/presentationml/2006/main">
+  <p:cSld>
+    <p:spTree>
+      <p:nvGrpSpPr>
+        <p:cNvPr id="1" name=""/>
+        <p:cNvGrpSpPr/>
+        <p:nvPr/>
+      </p:nvGrpSpPr>
+      <p:grpSpPr>
+        <a:xfrm>
+          <a:off x="0" y="0"/>
+          <a:ext cx="0" cy="0"/>
+          <a:chOff x="0" y="0"/>
+          <a:chExt cx="0" cy="0"/>
+        </a:xfrm>
+      </p:grpSpPr>
+      <p:sp>
+        <p:nvSpPr>
+          <p:cNvPr id="2" name="Titre 1"/>
+          <p:cNvSpPr>
+            <a:spLocks noGrp="1"/>
+          </p:cNvSpPr>
+          <p:nvPr>
+            <p:ph type="title"/>
+          </p:nvPr>
+        </p:nvSpPr>
+        <p:spPr>
+          <a:xfrm>
+            <a:off x="263118" y="781425"/>
+            <a:ext cx="5904656" cy="724942"/>
+          </a:xfrm>
+        </p:spPr>
+        <p:txBody>
+          <a:bodyPr>
+            <a:normAutofit/>
+          </a:bodyPr>
+          <a:lstStyle/>
+          <a:p>
+            <a:pPr algn="l"/>
+            <a:r>
+              <a:rPr lang="fr-FR" sz="3200" dirty="0"/>
+              <a:t>Enregistrement d’un « Design »</a:t>
+            </a:r>
+          </a:p>
+        </p:txBody>
+      </p:sp>
+      <p:cxnSp>
+        <p:nvCxnSpPr>
+          <p:cNvPr id="10" name="Connecteur droit 9"/>
+          <p:cNvCxnSpPr>
+            <a:cxnSpLocks/>
+          </p:cNvCxnSpPr>
+          <p:nvPr/>
+        </p:nvCxnSpPr>
+        <p:spPr>
+          <a:xfrm>
+            <a:off x="263118" y="1506367"/>
+            <a:ext cx="10709682" cy="0"/>
+          </a:xfrm>
+          <a:prstGeom prst="line">
+            <a:avLst/>
+          </a:prstGeom>
+          <a:ln w="19050">
+            <a:solidFill>
+              <a:schemeClr val="tx1"/>
+            </a:solidFill>
+          </a:ln>
+        </p:spPr>
+        <p:style>
+          <a:lnRef idx="1">
+            <a:schemeClr val="accent1"/>
+          </a:lnRef>
+          <a:fillRef idx="0">
+            <a:schemeClr val="accent1"/>
+          </a:fillRef>
+          <a:effectRef idx="0">
+            <a:schemeClr val="accent1"/>
+          </a:effectRef>
+          <a:fontRef idx="minor">
+            <a:schemeClr val="tx1"/>
+          </a:fontRef>
+        </p:style>
+      </p:cxnSp>
+      <p:sp>
+        <p:nvSpPr>
+          <p:cNvPr id="30" name="Espace réservé du contenu 2">
+            <a:extLst>
+              <a:ext uri="{FF2B5EF4-FFF2-40B4-BE49-F238E27FC236}">
+                <a16:creationId xmlns:a16="http://schemas.microsoft.com/office/drawing/2014/main" id="{17374925-2B5F-48B8-8155-9BB171EB9DDB}"/>
+              </a:ext>
+            </a:extLst>
+          </p:cNvPr>
+          <p:cNvSpPr>
+            <a:spLocks noGrp="1"/>
+          </p:cNvSpPr>
+          <p:nvPr>
+            <p:ph idx="1"/>
+          </p:nvPr>
+        </p:nvSpPr>
+        <p:spPr>
+          <a:xfrm>
+            <a:off x="263117" y="1725237"/>
+            <a:ext cx="11733713" cy="4631112"/>
+          </a:xfrm>
+        </p:spPr>
+        <p:txBody>
+          <a:bodyPr>
+            <a:normAutofit/>
+          </a:bodyPr>
+          <a:lstStyle/>
+          <a:p>
+            <a:r>
+              <a:rPr lang="fr-FR" sz="2400" dirty="0"/>
+              <a:t>Un « </a:t>
+            </a:r>
+            <a:r>
+              <a:rPr lang="fr-FR" sz="2400" dirty="0">
+                <a:solidFill>
+                  <a:srgbClr val="0070C0"/>
+                </a:solidFill>
+              </a:rPr>
+              <a:t>Design</a:t>
+            </a:r>
+            <a:r>
+              <a:rPr lang="fr-FR" sz="2400" dirty="0"/>
+              <a:t> » = </a:t>
+            </a:r>
+            <a:r>
+              <a:rPr lang="fr-FR" sz="2400" dirty="0">
+                <a:solidFill>
+                  <a:srgbClr val="0070C0"/>
+                </a:solidFill>
+              </a:rPr>
+              <a:t>ensemble des composantes artistiques</a:t>
+            </a:r>
+            <a:r>
+              <a:rPr lang="fr-FR" sz="2400" dirty="0"/>
+              <a:t> du site </a:t>
+            </a:r>
+          </a:p>
+          <a:p>
+            <a:pPr lvl="1"/>
+            <a:r>
+              <a:rPr lang="fr-FR" sz="2000" dirty="0"/>
+              <a:t>Couleur, placement, etc.</a:t>
+            </a:r>
+          </a:p>
+          <a:p>
+            <a:pPr lvl="1"/>
+            <a:r>
+              <a:rPr lang="fr-FR" sz="2000" dirty="0"/>
+              <a:t>Travail indépendant du contenu</a:t>
+            </a:r>
+          </a:p>
+          <a:p>
+            <a:pPr lvl="1"/>
+            <a:endParaRPr lang="fr-FR" sz="2000" dirty="0"/>
+          </a:p>
+          <a:p>
+            <a:r>
+              <a:rPr lang="fr-FR" sz="2400" dirty="0"/>
+              <a:t>Faire des </a:t>
+            </a:r>
+            <a:r>
+              <a:rPr lang="fr-FR" sz="2400" dirty="0" err="1"/>
+              <a:t>preset</a:t>
+            </a:r>
+            <a:r>
+              <a:rPr lang="fr-FR" sz="2400" dirty="0"/>
+              <a:t> de </a:t>
+            </a:r>
+            <a:r>
+              <a:rPr lang="fr-FR" sz="2400" dirty="0" err="1"/>
+              <a:t>superstyles</a:t>
+            </a:r>
+            <a:r>
+              <a:rPr lang="fr-FR" sz="2400" dirty="0"/>
+              <a:t> ?</a:t>
+            </a:r>
+          </a:p>
+          <a:p>
+            <a:pPr lvl="1"/>
+            <a:r>
+              <a:rPr lang="fr-FR" sz="2000" dirty="0">
+                <a:solidFill>
+                  <a:srgbClr val="0070C0"/>
+                </a:solidFill>
+              </a:rPr>
+              <a:t>Combiner</a:t>
+            </a:r>
+            <a:r>
+              <a:rPr lang="fr-FR" sz="2000" dirty="0"/>
+              <a:t> l’ensemble des </a:t>
+            </a:r>
+            <a:r>
+              <a:rPr lang="fr-FR" sz="2000" dirty="0">
+                <a:solidFill>
+                  <a:srgbClr val="0070C0"/>
+                </a:solidFill>
+              </a:rPr>
+              <a:t>composantes stylistiques </a:t>
+            </a:r>
+            <a:r>
+              <a:rPr lang="fr-FR" sz="2000" dirty="0"/>
+              <a:t>sous un seul </a:t>
+            </a:r>
+            <a:r>
+              <a:rPr lang="fr-FR" sz="2000" dirty="0" err="1"/>
+              <a:t>preset</a:t>
+            </a:r>
+            <a:r>
+              <a:rPr lang="fr-FR" sz="2000" dirty="0"/>
+              <a:t> (enregistrable)</a:t>
+            </a:r>
+          </a:p>
+          <a:p>
+            <a:pPr lvl="1"/>
+            <a:r>
+              <a:rPr lang="fr-FR" sz="2000" dirty="0">
+                <a:solidFill>
+                  <a:srgbClr val="0070C0"/>
+                </a:solidFill>
+              </a:rPr>
+              <a:t>Rendre réutilisable </a:t>
+            </a:r>
+            <a:r>
+              <a:rPr lang="fr-FR" sz="2000" dirty="0"/>
+              <a:t>le </a:t>
+            </a:r>
+            <a:r>
+              <a:rPr lang="fr-FR" sz="2000" dirty="0">
+                <a:solidFill>
+                  <a:srgbClr val="0070C0"/>
+                </a:solidFill>
+              </a:rPr>
+              <a:t>travail de l’artiste</a:t>
+            </a:r>
+            <a:r>
+              <a:rPr lang="fr-FR" sz="2000" dirty="0"/>
+              <a:t>/UI/UX designer</a:t>
+            </a:r>
+          </a:p>
+        </p:txBody>
+      </p:sp>
+      <p:sp>
+        <p:nvSpPr>
+          <p:cNvPr id="8" name="Espace réservé du numéro de diapositive 7">
+            <a:extLst>
+              <a:ext uri="{FF2B5EF4-FFF2-40B4-BE49-F238E27FC236}">
+                <a16:creationId xmlns:a16="http://schemas.microsoft.com/office/drawing/2014/main" id="{B8B2E558-E863-4B5B-959A-AB1349969143}"/>
+              </a:ext>
+            </a:extLst>
+          </p:cNvPr>
+          <p:cNvSpPr>
+            <a:spLocks noGrp="1"/>
+          </p:cNvSpPr>
+          <p:nvPr>
+            <p:ph type="sldNum" sz="quarter" idx="12"/>
+          </p:nvPr>
+        </p:nvSpPr>
+        <p:spPr/>
+        <p:txBody>
+          <a:bodyPr/>
+          <a:lstStyle/>
+          <a:p>
+            <a:fld id="{8BBF28A3-E1F2-408E-9BE0-DB29BF40A39D}" type="slidenum">
+              <a:rPr lang="fr-FR" smtClean="0"/>
+              <a:t>30</a:t>
+            </a:fld>
+            <a:endParaRPr lang="fr-FR"/>
+          </a:p>
+        </p:txBody>
+      </p:sp>
+      <p:sp>
+        <p:nvSpPr>
+          <p:cNvPr id="9" name="Espace réservé du pied de page 3">
+            <a:extLst>
+              <a:ext uri="{FF2B5EF4-FFF2-40B4-BE49-F238E27FC236}">
+                <a16:creationId xmlns:a16="http://schemas.microsoft.com/office/drawing/2014/main" id="{2CD2AF13-957F-4245-8516-C9776ADE7978}"/>
+              </a:ext>
+            </a:extLst>
+          </p:cNvPr>
+          <p:cNvSpPr txBox="1">
+            <a:spLocks/>
+          </p:cNvSpPr>
+          <p:nvPr/>
+        </p:nvSpPr>
+        <p:spPr>
+          <a:xfrm>
+            <a:off x="5445839" y="105090"/>
+            <a:ext cx="1443870" cy="676309"/>
+          </a:xfrm>
+          <a:prstGeom prst="rect">
+            <a:avLst/>
+          </a:prstGeom>
+        </p:spPr>
+        <p:txBody>
+          <a:bodyPr vert="horz" lIns="91440" tIns="45720" rIns="91440" bIns="45720" rtlCol="0" anchor="ctr"/>
+          <a:lstStyle>
+            <a:defPPr>
+              <a:defRPr lang="fr-FR"/>
+            </a:defPPr>
+            <a:lvl1pPr marL="0" algn="ctr" defTabSz="914400" rtl="0" eaLnBrk="1" latinLnBrk="0" hangingPunct="1">
+              <a:defRPr sz="1200" kern="1200">
+                <a:solidFill>
+                  <a:schemeClr val="tx1">
+                    <a:tint val="75000"/>
+                  </a:schemeClr>
+                </a:solidFill>
+                <a:latin typeface="+mn-lt"/>
+                <a:ea typeface="+mn-ea"/>
+                <a:cs typeface="+mn-cs"/>
+              </a:defRPr>
+            </a:lvl1pPr>
+            <a:lvl2pPr marL="457200" algn="l" defTabSz="914400" rtl="0" eaLnBrk="1" latinLnBrk="0" hangingPunct="1">
+              <a:defRPr sz="1800" kern="1200">
+                <a:solidFill>
+                  <a:schemeClr val="tx1"/>
+                </a:solidFill>
+                <a:latin typeface="+mn-lt"/>
+                <a:ea typeface="+mn-ea"/>
+                <a:cs typeface="+mn-cs"/>
+              </a:defRPr>
+            </a:lvl2pPr>
+            <a:lvl3pPr marL="914400" algn="l" defTabSz="914400" rtl="0" eaLnBrk="1" latinLnBrk="0" hangingPunct="1">
+              <a:defRPr sz="1800" kern="1200">
+                <a:solidFill>
+                  <a:schemeClr val="tx1"/>
+                </a:solidFill>
+                <a:latin typeface="+mn-lt"/>
+                <a:ea typeface="+mn-ea"/>
+                <a:cs typeface="+mn-cs"/>
+              </a:defRPr>
+            </a:lvl3pPr>
+            <a:lvl4pPr marL="1371600" algn="l" defTabSz="914400" rtl="0" eaLnBrk="1" latinLnBrk="0" hangingPunct="1">
+              <a:defRPr sz="1800" kern="1200">
+                <a:solidFill>
+                  <a:schemeClr val="tx1"/>
+                </a:solidFill>
+                <a:latin typeface="+mn-lt"/>
+                <a:ea typeface="+mn-ea"/>
+                <a:cs typeface="+mn-cs"/>
+              </a:defRPr>
+            </a:lvl4pPr>
+            <a:lvl5pPr marL="1828800" algn="l" defTabSz="914400" rtl="0" eaLnBrk="1" latinLnBrk="0" hangingPunct="1">
+              <a:defRPr sz="1800" kern="1200">
+                <a:solidFill>
+                  <a:schemeClr val="tx1"/>
+                </a:solidFill>
+                <a:latin typeface="+mn-lt"/>
+                <a:ea typeface="+mn-ea"/>
+                <a:cs typeface="+mn-cs"/>
+              </a:defRPr>
+            </a:lvl5pPr>
+            <a:lvl6pPr marL="2286000" algn="l" defTabSz="914400" rtl="0" eaLnBrk="1" latinLnBrk="0" hangingPunct="1">
+              <a:defRPr sz="1800" kern="1200">
+                <a:solidFill>
+                  <a:schemeClr val="tx1"/>
+                </a:solidFill>
+                <a:latin typeface="+mn-lt"/>
+                <a:ea typeface="+mn-ea"/>
+                <a:cs typeface="+mn-cs"/>
+              </a:defRPr>
+            </a:lvl6pPr>
+            <a:lvl7pPr marL="2743200" algn="l" defTabSz="914400" rtl="0" eaLnBrk="1" latinLnBrk="0" hangingPunct="1">
+              <a:defRPr sz="1800" kern="1200">
+                <a:solidFill>
+                  <a:schemeClr val="tx1"/>
+                </a:solidFill>
+                <a:latin typeface="+mn-lt"/>
+                <a:ea typeface="+mn-ea"/>
+                <a:cs typeface="+mn-cs"/>
+              </a:defRPr>
+            </a:lvl7pPr>
+            <a:lvl8pPr marL="3200400" algn="l" defTabSz="914400" rtl="0" eaLnBrk="1" latinLnBrk="0" hangingPunct="1">
+              <a:defRPr sz="1800" kern="1200">
+                <a:solidFill>
+                  <a:schemeClr val="tx1"/>
+                </a:solidFill>
+                <a:latin typeface="+mn-lt"/>
+                <a:ea typeface="+mn-ea"/>
+                <a:cs typeface="+mn-cs"/>
+              </a:defRPr>
+            </a:lvl8pPr>
+            <a:lvl9pPr marL="3657600" algn="l" defTabSz="914400" rtl="0" eaLnBrk="1" latinLnBrk="0" hangingPunct="1">
+              <a:defRPr sz="1800" kern="1200">
+                <a:solidFill>
+                  <a:schemeClr val="tx1"/>
+                </a:solidFill>
+                <a:latin typeface="+mn-lt"/>
+                <a:ea typeface="+mn-ea"/>
+                <a:cs typeface="+mn-cs"/>
+              </a:defRPr>
+            </a:lvl9pPr>
+          </a:lstStyle>
+          <a:p>
+            <a:r>
+              <a:rPr lang="fr-FR" i="1" u="sng" dirty="0"/>
+              <a:t>Présentation du Web Designer</a:t>
+            </a:r>
+            <a:endParaRPr lang="fr-FR" sz="1000" dirty="0"/>
+          </a:p>
+        </p:txBody>
+      </p:sp>
+      <p:sp>
+        <p:nvSpPr>
+          <p:cNvPr id="3" name="Espace réservé du pied de page 2">
+            <a:extLst>
+              <a:ext uri="{FF2B5EF4-FFF2-40B4-BE49-F238E27FC236}">
+                <a16:creationId xmlns:a16="http://schemas.microsoft.com/office/drawing/2014/main" id="{E3F8CFDB-5067-4D8D-A24C-068EAC0EA5D5}"/>
+              </a:ext>
+            </a:extLst>
+          </p:cNvPr>
+          <p:cNvSpPr>
+            <a:spLocks noGrp="1"/>
+          </p:cNvSpPr>
+          <p:nvPr>
+            <p:ph type="ftr" sz="quarter" idx="11"/>
+          </p:nvPr>
+        </p:nvSpPr>
+        <p:spPr/>
+        <p:txBody>
+          <a:bodyPr/>
+          <a:lstStyle/>
+          <a:p>
+            <a:r>
+              <a:rPr lang="fr-FR"/>
+              <a:t>V0.1</a:t>
+            </a:r>
+          </a:p>
+        </p:txBody>
+      </p:sp>
+    </p:spTree>
+    <p:extLst>
+      <p:ext uri="{BB962C8B-B14F-4D97-AF65-F5344CB8AC3E}">
+        <p14:creationId xmlns:p14="http://schemas.microsoft.com/office/powerpoint/2010/main" val="488704100"/>
+      </p:ext>
+    </p:extLst>
+  </p:cSld>
+  <p:clrMapOvr>
+    <a:masterClrMapping/>
+  </p:clrMapOvr>
+  <mc:AlternateContent xmlns:mc="http://schemas.openxmlformats.org/markup-compatibility/2006" xmlns:p14="http://schemas.microsoft.com/office/powerpoint/2010/main">
+    <mc:Choice Requires="p14">
+      <p:transition spd="med" p14:dur="700">
+        <p:fade/>
+      </p:transition>
+    </mc:Choice>
+    <mc:Fallback xmlns="">
+      <p:transition spd="med">
+        <p:fade/>
+      </p:transition>
+    </mc:Fallback>
+  </mc:AlternateContent>
+</p:sld>
+</file>
+
+<file path=ppt/slides/slide31.xml><?xml version="1.0" encoding="utf-8"?>
+<p:sld xmlns:a="http://schemas.openxmlformats.org/drawingml/2006/main" xmlns:r="http://schemas.openxmlformats.org/officeDocument/2006/relationships" xmlns:p="http://schemas.openxmlformats.org/presentationml/2006/main">
+  <p:cSld>
+    <p:spTree>
+      <p:nvGrpSpPr>
+        <p:cNvPr id="1" name=""/>
+        <p:cNvGrpSpPr/>
+        <p:nvPr/>
+      </p:nvGrpSpPr>
+      <p:grpSpPr>
+        <a:xfrm>
+          <a:off x="0" y="0"/>
+          <a:ext cx="0" cy="0"/>
+          <a:chOff x="0" y="0"/>
+          <a:chExt cx="0" cy="0"/>
+        </a:xfrm>
+      </p:grpSpPr>
+      <p:sp>
+        <p:nvSpPr>
+          <p:cNvPr id="2" name="Titre 1"/>
+          <p:cNvSpPr>
+            <a:spLocks noGrp="1"/>
+          </p:cNvSpPr>
+          <p:nvPr>
+            <p:ph type="title"/>
+          </p:nvPr>
+        </p:nvSpPr>
+        <p:spPr>
+          <a:xfrm>
+            <a:off x="263118" y="781425"/>
+            <a:ext cx="5904656" cy="724942"/>
+          </a:xfrm>
+        </p:spPr>
+        <p:txBody>
+          <a:bodyPr>
+            <a:normAutofit/>
+          </a:bodyPr>
+          <a:lstStyle/>
+          <a:p>
+            <a:pPr algn="l"/>
+            <a:r>
+              <a:rPr lang="fr-FR" sz="3200" dirty="0"/>
+              <a:t>Système de layer</a:t>
+            </a:r>
+          </a:p>
+        </p:txBody>
+      </p:sp>
+      <p:cxnSp>
+        <p:nvCxnSpPr>
+          <p:cNvPr id="10" name="Connecteur droit 9"/>
+          <p:cNvCxnSpPr>
+            <a:cxnSpLocks/>
+          </p:cNvCxnSpPr>
+          <p:nvPr/>
+        </p:nvCxnSpPr>
+        <p:spPr>
+          <a:xfrm>
+            <a:off x="263118" y="1506367"/>
+            <a:ext cx="10709682" cy="0"/>
+          </a:xfrm>
+          <a:prstGeom prst="line">
+            <a:avLst/>
+          </a:prstGeom>
+          <a:ln w="19050">
+            <a:solidFill>
+              <a:schemeClr val="tx1"/>
+            </a:solidFill>
+          </a:ln>
+        </p:spPr>
+        <p:style>
+          <a:lnRef idx="1">
+            <a:schemeClr val="accent1"/>
+          </a:lnRef>
+          <a:fillRef idx="0">
+            <a:schemeClr val="accent1"/>
+          </a:fillRef>
+          <a:effectRef idx="0">
+            <a:schemeClr val="accent1"/>
+          </a:effectRef>
+          <a:fontRef idx="minor">
+            <a:schemeClr val="tx1"/>
+          </a:fontRef>
+        </p:style>
+      </p:cxnSp>
+      <p:sp>
+        <p:nvSpPr>
+          <p:cNvPr id="30" name="Espace réservé du contenu 2">
+            <a:extLst>
+              <a:ext uri="{FF2B5EF4-FFF2-40B4-BE49-F238E27FC236}">
+                <a16:creationId xmlns:a16="http://schemas.microsoft.com/office/drawing/2014/main" id="{17374925-2B5F-48B8-8155-9BB171EB9DDB}"/>
+              </a:ext>
+            </a:extLst>
+          </p:cNvPr>
+          <p:cNvSpPr>
+            <a:spLocks noGrp="1"/>
+          </p:cNvSpPr>
+          <p:nvPr>
+            <p:ph idx="1"/>
+          </p:nvPr>
+        </p:nvSpPr>
+        <p:spPr>
+          <a:xfrm>
+            <a:off x="263117" y="1725237"/>
+            <a:ext cx="11733713" cy="4631112"/>
+          </a:xfrm>
+        </p:spPr>
+        <p:txBody>
+          <a:bodyPr>
+            <a:normAutofit/>
+          </a:bodyPr>
+          <a:lstStyle/>
+          <a:p>
+            <a:r>
+              <a:rPr lang="fr-FR" sz="2400" dirty="0"/>
+              <a:t>Faciliter la superposition d’éléments</a:t>
+            </a:r>
+            <a:endParaRPr lang="fr-FR" sz="1200" dirty="0"/>
+          </a:p>
+          <a:p>
+            <a:endParaRPr lang="fr-FR" sz="2400" dirty="0"/>
+          </a:p>
+        </p:txBody>
+      </p:sp>
+      <p:sp>
+        <p:nvSpPr>
+          <p:cNvPr id="8" name="Espace réservé du numéro de diapositive 7">
+            <a:extLst>
+              <a:ext uri="{FF2B5EF4-FFF2-40B4-BE49-F238E27FC236}">
+                <a16:creationId xmlns:a16="http://schemas.microsoft.com/office/drawing/2014/main" id="{B8B2E558-E863-4B5B-959A-AB1349969143}"/>
+              </a:ext>
+            </a:extLst>
+          </p:cNvPr>
+          <p:cNvSpPr>
+            <a:spLocks noGrp="1"/>
+          </p:cNvSpPr>
+          <p:nvPr>
+            <p:ph type="sldNum" sz="quarter" idx="12"/>
+          </p:nvPr>
+        </p:nvSpPr>
+        <p:spPr/>
+        <p:txBody>
+          <a:bodyPr/>
+          <a:lstStyle/>
+          <a:p>
+            <a:fld id="{8BBF28A3-E1F2-408E-9BE0-DB29BF40A39D}" type="slidenum">
+              <a:rPr lang="fr-FR" smtClean="0"/>
+              <a:t>31</a:t>
+            </a:fld>
+            <a:endParaRPr lang="fr-FR"/>
+          </a:p>
+        </p:txBody>
+      </p:sp>
+      <p:sp>
+        <p:nvSpPr>
+          <p:cNvPr id="9" name="Espace réservé du pied de page 3">
+            <a:extLst>
+              <a:ext uri="{FF2B5EF4-FFF2-40B4-BE49-F238E27FC236}">
+                <a16:creationId xmlns:a16="http://schemas.microsoft.com/office/drawing/2014/main" id="{2CD2AF13-957F-4245-8516-C9776ADE7978}"/>
+              </a:ext>
+            </a:extLst>
+          </p:cNvPr>
+          <p:cNvSpPr txBox="1">
+            <a:spLocks/>
+          </p:cNvSpPr>
+          <p:nvPr/>
+        </p:nvSpPr>
+        <p:spPr>
+          <a:xfrm>
+            <a:off x="5445839" y="105090"/>
+            <a:ext cx="1443870" cy="676309"/>
+          </a:xfrm>
+          <a:prstGeom prst="rect">
+            <a:avLst/>
+          </a:prstGeom>
+        </p:spPr>
+        <p:txBody>
+          <a:bodyPr vert="horz" lIns="91440" tIns="45720" rIns="91440" bIns="45720" rtlCol="0" anchor="ctr"/>
+          <a:lstStyle>
+            <a:defPPr>
+              <a:defRPr lang="fr-FR"/>
+            </a:defPPr>
+            <a:lvl1pPr marL="0" algn="ctr" defTabSz="914400" rtl="0" eaLnBrk="1" latinLnBrk="0" hangingPunct="1">
+              <a:defRPr sz="1200" kern="1200">
+                <a:solidFill>
+                  <a:schemeClr val="tx1">
+                    <a:tint val="75000"/>
+                  </a:schemeClr>
+                </a:solidFill>
+                <a:latin typeface="+mn-lt"/>
+                <a:ea typeface="+mn-ea"/>
+                <a:cs typeface="+mn-cs"/>
+              </a:defRPr>
+            </a:lvl1pPr>
+            <a:lvl2pPr marL="457200" algn="l" defTabSz="914400" rtl="0" eaLnBrk="1" latinLnBrk="0" hangingPunct="1">
+              <a:defRPr sz="1800" kern="1200">
+                <a:solidFill>
+                  <a:schemeClr val="tx1"/>
+                </a:solidFill>
+                <a:latin typeface="+mn-lt"/>
+                <a:ea typeface="+mn-ea"/>
+                <a:cs typeface="+mn-cs"/>
+              </a:defRPr>
+            </a:lvl2pPr>
+            <a:lvl3pPr marL="914400" algn="l" defTabSz="914400" rtl="0" eaLnBrk="1" latinLnBrk="0" hangingPunct="1">
+              <a:defRPr sz="1800" kern="1200">
+                <a:solidFill>
+                  <a:schemeClr val="tx1"/>
+                </a:solidFill>
+                <a:latin typeface="+mn-lt"/>
+                <a:ea typeface="+mn-ea"/>
+                <a:cs typeface="+mn-cs"/>
+              </a:defRPr>
+            </a:lvl3pPr>
+            <a:lvl4pPr marL="1371600" algn="l" defTabSz="914400" rtl="0" eaLnBrk="1" latinLnBrk="0" hangingPunct="1">
+              <a:defRPr sz="1800" kern="1200">
+                <a:solidFill>
+                  <a:schemeClr val="tx1"/>
+                </a:solidFill>
+                <a:latin typeface="+mn-lt"/>
+                <a:ea typeface="+mn-ea"/>
+                <a:cs typeface="+mn-cs"/>
+              </a:defRPr>
+            </a:lvl4pPr>
+            <a:lvl5pPr marL="1828800" algn="l" defTabSz="914400" rtl="0" eaLnBrk="1" latinLnBrk="0" hangingPunct="1">
+              <a:defRPr sz="1800" kern="1200">
+                <a:solidFill>
+                  <a:schemeClr val="tx1"/>
+                </a:solidFill>
+                <a:latin typeface="+mn-lt"/>
+                <a:ea typeface="+mn-ea"/>
+                <a:cs typeface="+mn-cs"/>
+              </a:defRPr>
+            </a:lvl5pPr>
+            <a:lvl6pPr marL="2286000" algn="l" defTabSz="914400" rtl="0" eaLnBrk="1" latinLnBrk="0" hangingPunct="1">
+              <a:defRPr sz="1800" kern="1200">
+                <a:solidFill>
+                  <a:schemeClr val="tx1"/>
+                </a:solidFill>
+                <a:latin typeface="+mn-lt"/>
+                <a:ea typeface="+mn-ea"/>
+                <a:cs typeface="+mn-cs"/>
+              </a:defRPr>
+            </a:lvl6pPr>
+            <a:lvl7pPr marL="2743200" algn="l" defTabSz="914400" rtl="0" eaLnBrk="1" latinLnBrk="0" hangingPunct="1">
+              <a:defRPr sz="1800" kern="1200">
+                <a:solidFill>
+                  <a:schemeClr val="tx1"/>
+                </a:solidFill>
+                <a:latin typeface="+mn-lt"/>
+                <a:ea typeface="+mn-ea"/>
+                <a:cs typeface="+mn-cs"/>
+              </a:defRPr>
+            </a:lvl7pPr>
+            <a:lvl8pPr marL="3200400" algn="l" defTabSz="914400" rtl="0" eaLnBrk="1" latinLnBrk="0" hangingPunct="1">
+              <a:defRPr sz="1800" kern="1200">
+                <a:solidFill>
+                  <a:schemeClr val="tx1"/>
+                </a:solidFill>
+                <a:latin typeface="+mn-lt"/>
+                <a:ea typeface="+mn-ea"/>
+                <a:cs typeface="+mn-cs"/>
+              </a:defRPr>
+            </a:lvl8pPr>
+            <a:lvl9pPr marL="3657600" algn="l" defTabSz="914400" rtl="0" eaLnBrk="1" latinLnBrk="0" hangingPunct="1">
+              <a:defRPr sz="1800" kern="1200">
+                <a:solidFill>
+                  <a:schemeClr val="tx1"/>
+                </a:solidFill>
+                <a:latin typeface="+mn-lt"/>
+                <a:ea typeface="+mn-ea"/>
+                <a:cs typeface="+mn-cs"/>
+              </a:defRPr>
+            </a:lvl9pPr>
+          </a:lstStyle>
+          <a:p>
+            <a:r>
+              <a:rPr lang="fr-FR" i="1" u="sng" dirty="0"/>
+              <a:t>Présentation du Web Designer</a:t>
+            </a:r>
+            <a:endParaRPr lang="fr-FR" sz="1000" dirty="0"/>
+          </a:p>
+        </p:txBody>
+      </p:sp>
+      <p:sp>
+        <p:nvSpPr>
+          <p:cNvPr id="3" name="Espace réservé du pied de page 2">
+            <a:extLst>
+              <a:ext uri="{FF2B5EF4-FFF2-40B4-BE49-F238E27FC236}">
+                <a16:creationId xmlns:a16="http://schemas.microsoft.com/office/drawing/2014/main" id="{E3F8CFDB-5067-4D8D-A24C-068EAC0EA5D5}"/>
+              </a:ext>
+            </a:extLst>
+          </p:cNvPr>
+          <p:cNvSpPr>
+            <a:spLocks noGrp="1"/>
+          </p:cNvSpPr>
+          <p:nvPr>
+            <p:ph type="ftr" sz="quarter" idx="11"/>
+          </p:nvPr>
+        </p:nvSpPr>
+        <p:spPr/>
+        <p:txBody>
+          <a:bodyPr/>
+          <a:lstStyle/>
+          <a:p>
+            <a:r>
+              <a:rPr lang="fr-FR"/>
+              <a:t>V0.1</a:t>
+            </a:r>
+          </a:p>
+        </p:txBody>
+      </p:sp>
+    </p:spTree>
+    <p:extLst>
+      <p:ext uri="{BB962C8B-B14F-4D97-AF65-F5344CB8AC3E}">
+        <p14:creationId xmlns:p14="http://schemas.microsoft.com/office/powerpoint/2010/main" val="2650847568"/>
       </p:ext>
     </p:extLst>
   </p:cSld>

</xml_diff>